<commit_message>
PP pt2 - Atualizado
</commit_message>
<xml_diff>
--- a/BD_TPgr8-pt2.pptx
+++ b/BD_TPgr8-pt2.pptx
@@ -5,7 +5,7 @@
     <p:sldMasterId id="2147483648" r:id="rId1"/>
   </p:sldMasterIdLst>
   <p:notesMasterIdLst>
-    <p:notesMasterId r:id="rId16"/>
+    <p:notesMasterId r:id="rId20"/>
   </p:notesMasterIdLst>
   <p:sldIdLst>
     <p:sldId id="256" r:id="rId2"/>
@@ -13,15 +13,19 @@
     <p:sldId id="260" r:id="rId4"/>
     <p:sldId id="258" r:id="rId5"/>
     <p:sldId id="259" r:id="rId6"/>
-    <p:sldId id="268" r:id="rId7"/>
-    <p:sldId id="267" r:id="rId8"/>
-    <p:sldId id="266" r:id="rId9"/>
-    <p:sldId id="265" r:id="rId10"/>
-    <p:sldId id="264" r:id="rId11"/>
-    <p:sldId id="263" r:id="rId12"/>
-    <p:sldId id="262" r:id="rId13"/>
-    <p:sldId id="261" r:id="rId14"/>
-    <p:sldId id="269" r:id="rId15"/>
+    <p:sldId id="271" r:id="rId7"/>
+    <p:sldId id="270" r:id="rId8"/>
+    <p:sldId id="272" r:id="rId9"/>
+    <p:sldId id="267" r:id="rId10"/>
+    <p:sldId id="266" r:id="rId11"/>
+    <p:sldId id="273" r:id="rId12"/>
+    <p:sldId id="264" r:id="rId13"/>
+    <p:sldId id="263" r:id="rId14"/>
+    <p:sldId id="262" r:id="rId15"/>
+    <p:sldId id="261" r:id="rId16"/>
+    <p:sldId id="274" r:id="rId17"/>
+    <p:sldId id="275" r:id="rId18"/>
+    <p:sldId id="269" r:id="rId19"/>
   </p:sldIdLst>
   <p:sldSz cx="12192000" cy="6858000"/>
   <p:notesSz cx="7772400" cy="10058400"/>
@@ -4022,6 +4026,794 @@
         <p:cNvPr id="1" name="">
           <a:extLst>
             <a:ext uri="{FF2B5EF4-FFF2-40B4-BE49-F238E27FC236}">
+              <a16:creationId xmlns:a16="http://schemas.microsoft.com/office/drawing/2014/main" id="{7B180201-034C-1E18-AE26-1BE75942B17B}"/>
+            </a:ext>
+          </a:extLst>
+        </p:cNvPr>
+        <p:cNvGrpSpPr/>
+        <p:nvPr/>
+      </p:nvGrpSpPr>
+      <p:grpSpPr>
+        <a:xfrm>
+          <a:off x="0" y="0"/>
+          <a:ext cx="0" cy="0"/>
+          <a:chOff x="0" y="0"/>
+          <a:chExt cx="0" cy="0"/>
+        </a:xfrm>
+      </p:grpSpPr>
+      <p:sp>
+        <p:nvSpPr>
+          <p:cNvPr id="56" name="PlaceHolder 1">
+            <a:extLst>
+              <a:ext uri="{FF2B5EF4-FFF2-40B4-BE49-F238E27FC236}">
+                <a16:creationId xmlns:a16="http://schemas.microsoft.com/office/drawing/2014/main" id="{E659F661-99C9-E2F3-F8A2-C7D5E6EF32A9}"/>
+              </a:ext>
+            </a:extLst>
+          </p:cNvPr>
+          <p:cNvSpPr>
+            <a:spLocks noGrp="1"/>
+          </p:cNvSpPr>
+          <p:nvPr>
+            <p:ph type="title"/>
+          </p:nvPr>
+        </p:nvSpPr>
+        <p:spPr>
+          <a:xfrm>
+            <a:off x="1525680" y="275040"/>
+            <a:ext cx="9141840" cy="1153080"/>
+          </a:xfrm>
+          <a:prstGeom prst="rect">
+            <a:avLst/>
+          </a:prstGeom>
+          <a:noFill/>
+          <a:ln w="0">
+            <a:noFill/>
+          </a:ln>
+        </p:spPr>
+        <p:txBody>
+          <a:bodyPr lIns="0" tIns="0" rIns="0" bIns="0" anchor="b">
+            <a:noAutofit/>
+          </a:bodyPr>
+          <a:lstStyle/>
+          <a:p>
+            <a:pPr algn="ctr">
+              <a:lnSpc>
+                <a:spcPct val="90000"/>
+              </a:lnSpc>
+              <a:buNone/>
+            </a:pPr>
+            <a:r>
+              <a:rPr lang="pt-PT" sz="4000" b="0" strike="noStrike" spc="-1" dirty="0">
+                <a:solidFill>
+                  <a:srgbClr val="870F11"/>
+                </a:solidFill>
+                <a:latin typeface="Calibri"/>
+              </a:rPr>
+              <a:t>Apresentação e explicação da</a:t>
+            </a:r>
+            <a:br>
+              <a:rPr lang="pt-PT" sz="4000" b="0" strike="noStrike" spc="-1" dirty="0">
+                <a:solidFill>
+                  <a:srgbClr val="870F11"/>
+                </a:solidFill>
+                <a:latin typeface="Calibri"/>
+              </a:rPr>
+            </a:br>
+            <a:r>
+              <a:rPr lang="pt-PT" sz="4000" b="0" strike="noStrike" spc="-1" dirty="0">
+                <a:solidFill>
+                  <a:srgbClr val="870F11"/>
+                </a:solidFill>
+                <a:latin typeface="Calibri"/>
+              </a:rPr>
+              <a:t>base de dados implementada</a:t>
+            </a:r>
+            <a:endParaRPr lang="en-US" sz="4000" b="0" strike="noStrike" spc="-1" dirty="0">
+              <a:latin typeface="Arial"/>
+            </a:endParaRPr>
+          </a:p>
+        </p:txBody>
+      </p:sp>
+      <p:sp>
+        <p:nvSpPr>
+          <p:cNvPr id="57" name="Retângulo 4">
+            <a:extLst>
+              <a:ext uri="{FF2B5EF4-FFF2-40B4-BE49-F238E27FC236}">
+                <a16:creationId xmlns:a16="http://schemas.microsoft.com/office/drawing/2014/main" id="{0D6D3843-AE1C-1391-C5BC-320727DE9F9C}"/>
+              </a:ext>
+            </a:extLst>
+          </p:cNvPr>
+          <p:cNvSpPr/>
+          <p:nvPr/>
+        </p:nvSpPr>
+        <p:spPr>
+          <a:xfrm>
+            <a:off x="0" y="6233760"/>
+            <a:ext cx="12189960" cy="622080"/>
+          </a:xfrm>
+          <a:prstGeom prst="rect">
+            <a:avLst/>
+          </a:prstGeom>
+          <a:solidFill>
+            <a:srgbClr val="870F11"/>
+          </a:solidFill>
+          <a:ln>
+            <a:solidFill>
+              <a:srgbClr val="870F11"/>
+            </a:solidFill>
+          </a:ln>
+        </p:spPr>
+        <p:style>
+          <a:lnRef idx="2">
+            <a:schemeClr val="accent1">
+              <a:shade val="50000"/>
+            </a:schemeClr>
+          </a:lnRef>
+          <a:fillRef idx="1">
+            <a:schemeClr val="accent1"/>
+          </a:fillRef>
+          <a:effectRef idx="0">
+            <a:schemeClr val="accent1"/>
+          </a:effectRef>
+          <a:fontRef idx="minor"/>
+        </p:style>
+        <p:txBody>
+          <a:bodyPr/>
+          <a:lstStyle/>
+          <a:p>
+            <a:endParaRPr lang="pt-PT"/>
+          </a:p>
+        </p:txBody>
+      </p:sp>
+      <p:sp>
+        <p:nvSpPr>
+          <p:cNvPr id="58" name="CaixaDeTexto 5">
+            <a:extLst>
+              <a:ext uri="{FF2B5EF4-FFF2-40B4-BE49-F238E27FC236}">
+                <a16:creationId xmlns:a16="http://schemas.microsoft.com/office/drawing/2014/main" id="{3046F5B0-F841-64DA-AC6B-59511F5F9FEB}"/>
+              </a:ext>
+            </a:extLst>
+          </p:cNvPr>
+          <p:cNvSpPr/>
+          <p:nvPr/>
+        </p:nvSpPr>
+        <p:spPr>
+          <a:xfrm>
+            <a:off x="1489680" y="1828800"/>
+            <a:ext cx="9024480" cy="829543"/>
+          </a:xfrm>
+          <a:prstGeom prst="rect">
+            <a:avLst/>
+          </a:prstGeom>
+          <a:noFill/>
+          <a:ln w="0">
+            <a:noFill/>
+          </a:ln>
+        </p:spPr>
+        <p:style>
+          <a:lnRef idx="0">
+            <a:scrgbClr r="0" g="0" b="0"/>
+          </a:lnRef>
+          <a:fillRef idx="0">
+            <a:scrgbClr r="0" g="0" b="0"/>
+          </a:fillRef>
+          <a:effectRef idx="0">
+            <a:scrgbClr r="0" g="0" b="0"/>
+          </a:effectRef>
+          <a:fontRef idx="minor"/>
+        </p:style>
+        <p:txBody>
+          <a:bodyPr vertOverflow="overflow" horzOverflow="overflow" lIns="90000" tIns="45000" rIns="90000" bIns="45000" numCol="1" spcCol="0" anchor="t">
+            <a:spAutoFit/>
+          </a:bodyPr>
+          <a:lstStyle/>
+          <a:p>
+            <a:pPr algn="ctr">
+              <a:lnSpc>
+                <a:spcPct val="100000"/>
+              </a:lnSpc>
+              <a:buNone/>
+            </a:pPr>
+            <a:endParaRPr lang="en-US" sz="2400" b="0" strike="noStrike" spc="-1" dirty="0">
+              <a:latin typeface="Arial"/>
+            </a:endParaRPr>
+          </a:p>
+          <a:p>
+            <a:pPr algn="ctr">
+              <a:lnSpc>
+                <a:spcPct val="100000"/>
+              </a:lnSpc>
+              <a:buNone/>
+            </a:pPr>
+            <a:endParaRPr lang="en-US" sz="2400" b="0" strike="noStrike" spc="-1" dirty="0">
+              <a:latin typeface="Arial"/>
+            </a:endParaRPr>
+          </a:p>
+        </p:txBody>
+      </p:sp>
+      <p:pic>
+        <p:nvPicPr>
+          <p:cNvPr id="59" name="Imagem 3">
+            <a:extLst>
+              <a:ext uri="{FF2B5EF4-FFF2-40B4-BE49-F238E27FC236}">
+                <a16:creationId xmlns:a16="http://schemas.microsoft.com/office/drawing/2014/main" id="{9531AB33-6445-6A35-6AFA-ACC08C9B48C6}"/>
+              </a:ext>
+            </a:extLst>
+          </p:cNvPr>
+          <p:cNvPicPr/>
+          <p:nvPr/>
+        </p:nvPicPr>
+        <p:blipFill>
+          <a:blip r:embed="rId2"/>
+          <a:stretch/>
+        </p:blipFill>
+        <p:spPr>
+          <a:xfrm>
+            <a:off x="3240" y="6261480"/>
+            <a:ext cx="1236960" cy="709200"/>
+          </a:xfrm>
+          <a:prstGeom prst="rect">
+            <a:avLst/>
+          </a:prstGeom>
+          <a:ln w="0">
+            <a:noFill/>
+          </a:ln>
+        </p:spPr>
+      </p:pic>
+      <p:sp>
+        <p:nvSpPr>
+          <p:cNvPr id="60" name="CaixaDeTexto 1">
+            <a:extLst>
+              <a:ext uri="{FF2B5EF4-FFF2-40B4-BE49-F238E27FC236}">
+                <a16:creationId xmlns:a16="http://schemas.microsoft.com/office/drawing/2014/main" id="{F8257343-9309-605D-CA10-C66B1E5278A5}"/>
+              </a:ext>
+            </a:extLst>
+          </p:cNvPr>
+          <p:cNvSpPr/>
+          <p:nvPr/>
+        </p:nvSpPr>
+        <p:spPr>
+          <a:xfrm>
+            <a:off x="6629400" y="6362640"/>
+            <a:ext cx="5855760" cy="337100"/>
+          </a:xfrm>
+          <a:prstGeom prst="rect">
+            <a:avLst/>
+          </a:prstGeom>
+          <a:noFill/>
+          <a:ln w="0">
+            <a:noFill/>
+          </a:ln>
+        </p:spPr>
+        <p:style>
+          <a:lnRef idx="0">
+            <a:scrgbClr r="0" g="0" b="0"/>
+          </a:lnRef>
+          <a:fillRef idx="0">
+            <a:scrgbClr r="0" g="0" b="0"/>
+          </a:fillRef>
+          <a:effectRef idx="0">
+            <a:scrgbClr r="0" g="0" b="0"/>
+          </a:effectRef>
+          <a:fontRef idx="minor"/>
+        </p:style>
+        <p:txBody>
+          <a:bodyPr vertOverflow="overflow" horzOverflow="overflow" lIns="90000" tIns="45000" rIns="90000" bIns="45000" numCol="1" spcCol="0" anchor="t">
+            <a:spAutoFit/>
+          </a:bodyPr>
+          <a:lstStyle/>
+          <a:p>
+            <a:pPr>
+              <a:lnSpc>
+                <a:spcPct val="100000"/>
+              </a:lnSpc>
+              <a:buNone/>
+            </a:pPr>
+            <a:r>
+              <a:rPr lang="pt-PT" sz="1600" b="0" strike="noStrike" spc="-1" dirty="0">
+                <a:solidFill>
+                  <a:srgbClr val="FFFFFF"/>
+                </a:solidFill>
+                <a:latin typeface="Calibri"/>
+                <a:ea typeface="DejaVu Sans"/>
+              </a:rPr>
+              <a:t>Bases de Dados – Jogos Olímpicos   |   Parte 2 - Grupo 8</a:t>
+            </a:r>
+            <a:endParaRPr lang="en-US" sz="1600" b="0" strike="noStrike" spc="-1" dirty="0">
+              <a:latin typeface="Arial"/>
+            </a:endParaRPr>
+          </a:p>
+        </p:txBody>
+      </p:sp>
+      <p:pic>
+        <p:nvPicPr>
+          <p:cNvPr id="4098" name="Picture 2">
+            <a:extLst>
+              <a:ext uri="{FF2B5EF4-FFF2-40B4-BE49-F238E27FC236}">
+                <a16:creationId xmlns:a16="http://schemas.microsoft.com/office/drawing/2014/main" id="{71C183CD-8565-4EDD-7BD7-5855E4F2E6F3}"/>
+              </a:ext>
+            </a:extLst>
+          </p:cNvPr>
+          <p:cNvPicPr>
+            <a:picLocks noChangeAspect="1" noChangeArrowheads="1"/>
+          </p:cNvPicPr>
+          <p:nvPr/>
+        </p:nvPicPr>
+        <p:blipFill>
+          <a:blip r:embed="rId3">
+            <a:extLst>
+              <a:ext uri="{28A0092B-C50C-407E-A947-70E740481C1C}">
+                <a14:useLocalDpi xmlns:a14="http://schemas.microsoft.com/office/drawing/2010/main" val="0"/>
+              </a:ext>
+            </a:extLst>
+          </a:blip>
+          <a:srcRect l="-52" t="-44" r="-52" b="-44"/>
+          <a:stretch>
+            <a:fillRect/>
+          </a:stretch>
+        </p:blipFill>
+        <p:spPr bwMode="auto">
+          <a:xfrm>
+            <a:off x="1525680" y="1859456"/>
+            <a:ext cx="2910383" cy="3365722"/>
+          </a:xfrm>
+          <a:prstGeom prst="rect">
+            <a:avLst/>
+          </a:prstGeom>
+          <a:ln w="38100" cap="sq">
+            <a:solidFill>
+              <a:srgbClr val="000000"/>
+            </a:solidFill>
+            <a:prstDash val="solid"/>
+            <a:miter lim="800000"/>
+          </a:ln>
+          <a:effectLst>
+            <a:outerShdw blurRad="50800" dist="38100" dir="2700000" algn="tl" rotWithShape="0">
+              <a:srgbClr val="000000">
+                <a:alpha val="43000"/>
+              </a:srgbClr>
+            </a:outerShdw>
+          </a:effectLst>
+          <a:extLst>
+            <a:ext uri="{91240B29-F687-4F45-9708-019B960494DF}">
+              <a14:hiddenLine xmlns:a14="http://schemas.microsoft.com/office/drawing/2010/main" w="9525">
+                <a:solidFill>
+                  <a:srgbClr val="000000"/>
+                </a:solidFill>
+                <a:miter lim="800000"/>
+                <a:headEnd/>
+                <a:tailEnd/>
+              </a14:hiddenLine>
+            </a:ext>
+          </a:extLst>
+        </p:spPr>
+      </p:pic>
+      <p:pic>
+        <p:nvPicPr>
+          <p:cNvPr id="3" name="Imagem 2">
+            <a:extLst>
+              <a:ext uri="{FF2B5EF4-FFF2-40B4-BE49-F238E27FC236}">
+                <a16:creationId xmlns:a16="http://schemas.microsoft.com/office/drawing/2014/main" id="{919439CA-2C99-6DE7-79D9-2F8A48B6C4C7}"/>
+              </a:ext>
+            </a:extLst>
+          </p:cNvPr>
+          <p:cNvPicPr>
+            <a:picLocks noChangeAspect="1"/>
+          </p:cNvPicPr>
+          <p:nvPr/>
+        </p:nvPicPr>
+        <p:blipFill>
+          <a:blip r:embed="rId4"/>
+          <a:stretch>
+            <a:fillRect/>
+          </a:stretch>
+        </p:blipFill>
+        <p:spPr>
+          <a:xfrm>
+            <a:off x="5220359" y="1859456"/>
+            <a:ext cx="5481961" cy="3365722"/>
+          </a:xfrm>
+          <a:prstGeom prst="rect">
+            <a:avLst/>
+          </a:prstGeom>
+          <a:ln w="38100" cap="sq">
+            <a:solidFill>
+              <a:srgbClr val="000000"/>
+            </a:solidFill>
+            <a:prstDash val="solid"/>
+            <a:miter lim="800000"/>
+          </a:ln>
+          <a:effectLst>
+            <a:outerShdw blurRad="50800" dist="38100" dir="2700000" algn="tl" rotWithShape="0">
+              <a:srgbClr val="000000">
+                <a:alpha val="43000"/>
+              </a:srgbClr>
+            </a:outerShdw>
+          </a:effectLst>
+        </p:spPr>
+      </p:pic>
+    </p:spTree>
+    <p:extLst>
+      <p:ext uri="{BB962C8B-B14F-4D97-AF65-F5344CB8AC3E}">
+        <p14:creationId xmlns:p14="http://schemas.microsoft.com/office/powerpoint/2010/main" val="2605338962"/>
+      </p:ext>
+    </p:extLst>
+  </p:cSld>
+  <p:clrMapOvr>
+    <a:masterClrMapping/>
+  </p:clrMapOvr>
+</p:sld>
+</file>
+
+<file path=ppt/slides/slide11.xml><?xml version="1.0" encoding="utf-8"?>
+<p:sld xmlns:a="http://schemas.openxmlformats.org/drawingml/2006/main" xmlns:r="http://schemas.openxmlformats.org/officeDocument/2006/relationships" xmlns:p="http://schemas.openxmlformats.org/presentationml/2006/main" show="0">
+  <p:cSld>
+    <p:spTree>
+      <p:nvGrpSpPr>
+        <p:cNvPr id="1" name="">
+          <a:extLst>
+            <a:ext uri="{FF2B5EF4-FFF2-40B4-BE49-F238E27FC236}">
+              <a16:creationId xmlns:a16="http://schemas.microsoft.com/office/drawing/2014/main" id="{ABC4044F-9A5A-F8C9-BA29-5631DD249B17}"/>
+            </a:ext>
+          </a:extLst>
+        </p:cNvPr>
+        <p:cNvGrpSpPr/>
+        <p:nvPr/>
+      </p:nvGrpSpPr>
+      <p:grpSpPr>
+        <a:xfrm>
+          <a:off x="0" y="0"/>
+          <a:ext cx="0" cy="0"/>
+          <a:chOff x="0" y="0"/>
+          <a:chExt cx="0" cy="0"/>
+        </a:xfrm>
+      </p:grpSpPr>
+      <p:sp>
+        <p:nvSpPr>
+          <p:cNvPr id="56" name="PlaceHolder 1">
+            <a:extLst>
+              <a:ext uri="{FF2B5EF4-FFF2-40B4-BE49-F238E27FC236}">
+                <a16:creationId xmlns:a16="http://schemas.microsoft.com/office/drawing/2014/main" id="{1A2D45D8-2995-DCA4-A928-7F37F5E4684A}"/>
+              </a:ext>
+            </a:extLst>
+          </p:cNvPr>
+          <p:cNvSpPr>
+            <a:spLocks noGrp="1"/>
+          </p:cNvSpPr>
+          <p:nvPr>
+            <p:ph type="title"/>
+          </p:nvPr>
+        </p:nvSpPr>
+        <p:spPr>
+          <a:xfrm>
+            <a:off x="1525680" y="275040"/>
+            <a:ext cx="9141840" cy="1153080"/>
+          </a:xfrm>
+          <a:prstGeom prst="rect">
+            <a:avLst/>
+          </a:prstGeom>
+          <a:noFill/>
+          <a:ln w="0">
+            <a:noFill/>
+          </a:ln>
+        </p:spPr>
+        <p:txBody>
+          <a:bodyPr lIns="0" tIns="0" rIns="0" bIns="0" anchor="b">
+            <a:noAutofit/>
+          </a:bodyPr>
+          <a:lstStyle/>
+          <a:p>
+            <a:pPr algn="ctr">
+              <a:lnSpc>
+                <a:spcPct val="90000"/>
+              </a:lnSpc>
+              <a:buNone/>
+            </a:pPr>
+            <a:r>
+              <a:rPr lang="pt-PT" sz="4000" b="0" strike="noStrike" spc="-1" dirty="0">
+                <a:solidFill>
+                  <a:srgbClr val="870F11"/>
+                </a:solidFill>
+                <a:latin typeface="Calibri"/>
+              </a:rPr>
+              <a:t>Apresentação e explicação da</a:t>
+            </a:r>
+            <a:br>
+              <a:rPr lang="pt-PT" sz="4000" b="0" strike="noStrike" spc="-1" dirty="0">
+                <a:solidFill>
+                  <a:srgbClr val="870F11"/>
+                </a:solidFill>
+                <a:latin typeface="Calibri"/>
+              </a:rPr>
+            </a:br>
+            <a:r>
+              <a:rPr lang="pt-PT" sz="4000" b="0" strike="noStrike" spc="-1" dirty="0">
+                <a:solidFill>
+                  <a:srgbClr val="870F11"/>
+                </a:solidFill>
+                <a:latin typeface="Calibri"/>
+              </a:rPr>
+              <a:t>base de dados implementada</a:t>
+            </a:r>
+            <a:endParaRPr lang="en-US" sz="4000" b="0" strike="noStrike" spc="-1" dirty="0">
+              <a:latin typeface="Arial"/>
+            </a:endParaRPr>
+          </a:p>
+        </p:txBody>
+      </p:sp>
+      <p:sp>
+        <p:nvSpPr>
+          <p:cNvPr id="57" name="Retângulo 4">
+            <a:extLst>
+              <a:ext uri="{FF2B5EF4-FFF2-40B4-BE49-F238E27FC236}">
+                <a16:creationId xmlns:a16="http://schemas.microsoft.com/office/drawing/2014/main" id="{3AC10E21-AD38-C39F-917C-677DAA982023}"/>
+              </a:ext>
+            </a:extLst>
+          </p:cNvPr>
+          <p:cNvSpPr/>
+          <p:nvPr/>
+        </p:nvSpPr>
+        <p:spPr>
+          <a:xfrm>
+            <a:off x="0" y="6233760"/>
+            <a:ext cx="12189960" cy="622080"/>
+          </a:xfrm>
+          <a:prstGeom prst="rect">
+            <a:avLst/>
+          </a:prstGeom>
+          <a:solidFill>
+            <a:srgbClr val="870F11"/>
+          </a:solidFill>
+          <a:ln>
+            <a:solidFill>
+              <a:srgbClr val="870F11"/>
+            </a:solidFill>
+          </a:ln>
+        </p:spPr>
+        <p:style>
+          <a:lnRef idx="2">
+            <a:schemeClr val="accent1">
+              <a:shade val="50000"/>
+            </a:schemeClr>
+          </a:lnRef>
+          <a:fillRef idx="1">
+            <a:schemeClr val="accent1"/>
+          </a:fillRef>
+          <a:effectRef idx="0">
+            <a:schemeClr val="accent1"/>
+          </a:effectRef>
+          <a:fontRef idx="minor"/>
+        </p:style>
+        <p:txBody>
+          <a:bodyPr/>
+          <a:lstStyle/>
+          <a:p>
+            <a:endParaRPr lang="pt-PT"/>
+          </a:p>
+        </p:txBody>
+      </p:sp>
+      <p:pic>
+        <p:nvPicPr>
+          <p:cNvPr id="59" name="Imagem 3">
+            <a:extLst>
+              <a:ext uri="{FF2B5EF4-FFF2-40B4-BE49-F238E27FC236}">
+                <a16:creationId xmlns:a16="http://schemas.microsoft.com/office/drawing/2014/main" id="{09C955F4-C77F-7C9C-25E3-03F4567D0F0E}"/>
+              </a:ext>
+            </a:extLst>
+          </p:cNvPr>
+          <p:cNvPicPr/>
+          <p:nvPr/>
+        </p:nvPicPr>
+        <p:blipFill>
+          <a:blip r:embed="rId2"/>
+          <a:stretch/>
+        </p:blipFill>
+        <p:spPr>
+          <a:xfrm>
+            <a:off x="3240" y="6261480"/>
+            <a:ext cx="1236960" cy="709200"/>
+          </a:xfrm>
+          <a:prstGeom prst="rect">
+            <a:avLst/>
+          </a:prstGeom>
+          <a:ln w="0">
+            <a:noFill/>
+          </a:ln>
+        </p:spPr>
+      </p:pic>
+      <p:sp>
+        <p:nvSpPr>
+          <p:cNvPr id="60" name="CaixaDeTexto 1">
+            <a:extLst>
+              <a:ext uri="{FF2B5EF4-FFF2-40B4-BE49-F238E27FC236}">
+                <a16:creationId xmlns:a16="http://schemas.microsoft.com/office/drawing/2014/main" id="{2FC54844-30AC-C77E-93E5-6FBAA25C307E}"/>
+              </a:ext>
+            </a:extLst>
+          </p:cNvPr>
+          <p:cNvSpPr/>
+          <p:nvPr/>
+        </p:nvSpPr>
+        <p:spPr>
+          <a:xfrm>
+            <a:off x="6629400" y="6362640"/>
+            <a:ext cx="5855760" cy="337100"/>
+          </a:xfrm>
+          <a:prstGeom prst="rect">
+            <a:avLst/>
+          </a:prstGeom>
+          <a:noFill/>
+          <a:ln w="0">
+            <a:noFill/>
+          </a:ln>
+        </p:spPr>
+        <p:style>
+          <a:lnRef idx="0">
+            <a:scrgbClr r="0" g="0" b="0"/>
+          </a:lnRef>
+          <a:fillRef idx="0">
+            <a:scrgbClr r="0" g="0" b="0"/>
+          </a:fillRef>
+          <a:effectRef idx="0">
+            <a:scrgbClr r="0" g="0" b="0"/>
+          </a:effectRef>
+          <a:fontRef idx="minor"/>
+        </p:style>
+        <p:txBody>
+          <a:bodyPr vertOverflow="overflow" horzOverflow="overflow" lIns="90000" tIns="45000" rIns="90000" bIns="45000" numCol="1" spcCol="0" anchor="t">
+            <a:spAutoFit/>
+          </a:bodyPr>
+          <a:lstStyle/>
+          <a:p>
+            <a:pPr>
+              <a:lnSpc>
+                <a:spcPct val="100000"/>
+              </a:lnSpc>
+              <a:buNone/>
+            </a:pPr>
+            <a:r>
+              <a:rPr lang="pt-PT" sz="1600" b="0" strike="noStrike" spc="-1" dirty="0">
+                <a:solidFill>
+                  <a:srgbClr val="FFFFFF"/>
+                </a:solidFill>
+                <a:latin typeface="Calibri"/>
+                <a:ea typeface="DejaVu Sans"/>
+              </a:rPr>
+              <a:t>Bases de Dados – Jogos Olímpicos   |   Parte 2 - Grupo 8</a:t>
+            </a:r>
+            <a:endParaRPr lang="en-US" sz="1600" b="0" strike="noStrike" spc="-1" dirty="0">
+              <a:latin typeface="Arial"/>
+            </a:endParaRPr>
+          </a:p>
+        </p:txBody>
+      </p:sp>
+      <p:pic>
+        <p:nvPicPr>
+          <p:cNvPr id="5123" name="Picture 3">
+            <a:extLst>
+              <a:ext uri="{FF2B5EF4-FFF2-40B4-BE49-F238E27FC236}">
+                <a16:creationId xmlns:a16="http://schemas.microsoft.com/office/drawing/2014/main" id="{E1579CDF-B651-C67B-ABEF-85F88F07D56D}"/>
+              </a:ext>
+            </a:extLst>
+          </p:cNvPr>
+          <p:cNvPicPr>
+            <a:picLocks noChangeAspect="1" noChangeArrowheads="1"/>
+          </p:cNvPicPr>
+          <p:nvPr/>
+        </p:nvPicPr>
+        <p:blipFill>
+          <a:blip r:embed="rId3">
+            <a:extLst>
+              <a:ext uri="{28A0092B-C50C-407E-A947-70E740481C1C}">
+                <a14:useLocalDpi xmlns:a14="http://schemas.microsoft.com/office/drawing/2010/main" val="0"/>
+              </a:ext>
+            </a:extLst>
+          </a:blip>
+          <a:srcRect l="-50" t="-52" r="-50" b="-52"/>
+          <a:stretch>
+            <a:fillRect/>
+          </a:stretch>
+        </p:blipFill>
+        <p:spPr bwMode="auto">
+          <a:xfrm>
+            <a:off x="1524480" y="1988588"/>
+            <a:ext cx="2930038" cy="2880824"/>
+          </a:xfrm>
+          <a:prstGeom prst="rect">
+            <a:avLst/>
+          </a:prstGeom>
+          <a:ln w="38100" cap="sq">
+            <a:solidFill>
+              <a:srgbClr val="000000"/>
+            </a:solidFill>
+            <a:prstDash val="solid"/>
+            <a:miter lim="800000"/>
+          </a:ln>
+          <a:effectLst>
+            <a:outerShdw blurRad="50800" dist="38100" dir="2700000" algn="tl" rotWithShape="0">
+              <a:srgbClr val="000000">
+                <a:alpha val="43000"/>
+              </a:srgbClr>
+            </a:outerShdw>
+          </a:effectLst>
+          <a:extLst>
+            <a:ext uri="{91240B29-F687-4F45-9708-019B960494DF}">
+              <a14:hiddenLine xmlns:a14="http://schemas.microsoft.com/office/drawing/2010/main" w="9525">
+                <a:solidFill>
+                  <a:srgbClr val="000000"/>
+                </a:solidFill>
+                <a:miter lim="800000"/>
+                <a:headEnd/>
+                <a:tailEnd/>
+              </a14:hiddenLine>
+            </a:ext>
+          </a:extLst>
+        </p:spPr>
+      </p:pic>
+      <p:pic>
+        <p:nvPicPr>
+          <p:cNvPr id="3" name="Imagem 2">
+            <a:extLst>
+              <a:ext uri="{FF2B5EF4-FFF2-40B4-BE49-F238E27FC236}">
+                <a16:creationId xmlns:a16="http://schemas.microsoft.com/office/drawing/2014/main" id="{63E0154F-C114-1A59-629B-2FC76AA34BC8}"/>
+              </a:ext>
+            </a:extLst>
+          </p:cNvPr>
+          <p:cNvPicPr>
+            <a:picLocks noChangeAspect="1"/>
+          </p:cNvPicPr>
+          <p:nvPr/>
+        </p:nvPicPr>
+        <p:blipFill>
+          <a:blip r:embed="rId4"/>
+          <a:stretch>
+            <a:fillRect/>
+          </a:stretch>
+        </p:blipFill>
+        <p:spPr>
+          <a:xfrm>
+            <a:off x="5823033" y="1988588"/>
+            <a:ext cx="4844487" cy="2880824"/>
+          </a:xfrm>
+          <a:prstGeom prst="rect">
+            <a:avLst/>
+          </a:prstGeom>
+          <a:ln w="38100" cap="sq">
+            <a:solidFill>
+              <a:srgbClr val="000000"/>
+            </a:solidFill>
+            <a:prstDash val="solid"/>
+            <a:miter lim="800000"/>
+          </a:ln>
+          <a:effectLst>
+            <a:outerShdw blurRad="50800" dist="38100" dir="2700000" algn="tl" rotWithShape="0">
+              <a:srgbClr val="000000">
+                <a:alpha val="43000"/>
+              </a:srgbClr>
+            </a:outerShdw>
+          </a:effectLst>
+        </p:spPr>
+      </p:pic>
+    </p:spTree>
+    <p:extLst>
+      <p:ext uri="{BB962C8B-B14F-4D97-AF65-F5344CB8AC3E}">
+        <p14:creationId xmlns:p14="http://schemas.microsoft.com/office/powerpoint/2010/main" val="4228828856"/>
+      </p:ext>
+    </p:extLst>
+  </p:cSld>
+  <p:clrMapOvr>
+    <a:masterClrMapping/>
+  </p:clrMapOvr>
+</p:sld>
+</file>
+
+<file path=ppt/slides/slide12.xml><?xml version="1.0" encoding="utf-8"?>
+<p:sld xmlns:a="http://schemas.openxmlformats.org/drawingml/2006/main" xmlns:r="http://schemas.openxmlformats.org/officeDocument/2006/relationships" xmlns:p="http://schemas.openxmlformats.org/presentationml/2006/main" show="0">
+  <p:cSld>
+    <p:spTree>
+      <p:nvGrpSpPr>
+        <p:cNvPr id="1" name="">
+          <a:extLst>
+            <a:ext uri="{FF2B5EF4-FFF2-40B4-BE49-F238E27FC236}">
               <a16:creationId xmlns:a16="http://schemas.microsoft.com/office/drawing/2014/main" id="{57C557D5-7865-4C71-FFE9-17693824671D}"/>
             </a:ext>
           </a:extLst>
@@ -4158,72 +4950,6 @@
           <a:lstStyle/>
           <a:p>
             <a:endParaRPr lang="pt-PT"/>
-          </a:p>
-        </p:txBody>
-      </p:sp>
-      <p:sp>
-        <p:nvSpPr>
-          <p:cNvPr id="58" name="CaixaDeTexto 5">
-            <a:extLst>
-              <a:ext uri="{FF2B5EF4-FFF2-40B4-BE49-F238E27FC236}">
-                <a16:creationId xmlns:a16="http://schemas.microsoft.com/office/drawing/2014/main" id="{4C15E12B-DA4C-C50E-5037-A39C10756FF9}"/>
-              </a:ext>
-            </a:extLst>
-          </p:cNvPr>
-          <p:cNvSpPr/>
-          <p:nvPr/>
-        </p:nvSpPr>
-        <p:spPr>
-          <a:xfrm>
-            <a:off x="1489680" y="1828800"/>
-            <a:ext cx="9024480" cy="829543"/>
-          </a:xfrm>
-          <a:prstGeom prst="rect">
-            <a:avLst/>
-          </a:prstGeom>
-          <a:noFill/>
-          <a:ln w="0">
-            <a:noFill/>
-          </a:ln>
-        </p:spPr>
-        <p:style>
-          <a:lnRef idx="0">
-            <a:scrgbClr r="0" g="0" b="0"/>
-          </a:lnRef>
-          <a:fillRef idx="0">
-            <a:scrgbClr r="0" g="0" b="0"/>
-          </a:fillRef>
-          <a:effectRef idx="0">
-            <a:scrgbClr r="0" g="0" b="0"/>
-          </a:effectRef>
-          <a:fontRef idx="minor"/>
-        </p:style>
-        <p:txBody>
-          <a:bodyPr vertOverflow="overflow" horzOverflow="overflow" lIns="90000" tIns="45000" rIns="90000" bIns="45000" numCol="1" spcCol="0" anchor="t">
-            <a:spAutoFit/>
-          </a:bodyPr>
-          <a:lstStyle/>
-          <a:p>
-            <a:pPr algn="ctr">
-              <a:lnSpc>
-                <a:spcPct val="100000"/>
-              </a:lnSpc>
-              <a:buNone/>
-            </a:pPr>
-            <a:endParaRPr lang="en-US" sz="2400" b="0" strike="noStrike" spc="-1" dirty="0">
-              <a:latin typeface="Arial"/>
-            </a:endParaRPr>
-          </a:p>
-          <a:p>
-            <a:pPr algn="ctr">
-              <a:lnSpc>
-                <a:spcPct val="100000"/>
-              </a:lnSpc>
-              <a:buNone/>
-            </a:pPr>
-            <a:endParaRPr lang="en-US" sz="2400" b="0" strike="noStrike" spc="-1" dirty="0">
-              <a:latin typeface="Arial"/>
-            </a:endParaRPr>
           </a:p>
         </p:txBody>
       </p:sp>
@@ -4321,6 +5047,113 @@
           </a:p>
         </p:txBody>
       </p:sp>
+      <p:pic>
+        <p:nvPicPr>
+          <p:cNvPr id="3" name="Imagem 2">
+            <a:extLst>
+              <a:ext uri="{FF2B5EF4-FFF2-40B4-BE49-F238E27FC236}">
+                <a16:creationId xmlns:a16="http://schemas.microsoft.com/office/drawing/2014/main" id="{58CD4BC8-673D-6051-CBD4-9E47DC7D821C}"/>
+              </a:ext>
+            </a:extLst>
+          </p:cNvPr>
+          <p:cNvPicPr>
+            <a:picLocks noChangeAspect="1"/>
+          </p:cNvPicPr>
+          <p:nvPr/>
+        </p:nvPicPr>
+        <p:blipFill>
+          <a:blip r:embed="rId3"/>
+          <a:stretch>
+            <a:fillRect/>
+          </a:stretch>
+        </p:blipFill>
+        <p:spPr>
+          <a:xfrm>
+            <a:off x="6043886" y="2249488"/>
+            <a:ext cx="4622435" cy="2764397"/>
+          </a:xfrm>
+          <a:prstGeom prst="rect">
+            <a:avLst/>
+          </a:prstGeom>
+          <a:ln w="38100" cap="sq">
+            <a:solidFill>
+              <a:srgbClr val="000000"/>
+            </a:solidFill>
+            <a:prstDash val="solid"/>
+            <a:miter lim="800000"/>
+          </a:ln>
+          <a:effectLst>
+            <a:outerShdw blurRad="50800" dist="38100" dir="2700000" algn="tl" rotWithShape="0">
+              <a:srgbClr val="000000">
+                <a:alpha val="43000"/>
+              </a:srgbClr>
+            </a:outerShdw>
+          </a:effectLst>
+        </p:spPr>
+      </p:pic>
+      <p:pic>
+        <p:nvPicPr>
+          <p:cNvPr id="6146" name="Picture 2">
+            <a:extLst>
+              <a:ext uri="{FF2B5EF4-FFF2-40B4-BE49-F238E27FC236}">
+                <a16:creationId xmlns:a16="http://schemas.microsoft.com/office/drawing/2014/main" id="{B195B98B-A384-90D0-E616-64860CF4602E}"/>
+              </a:ext>
+            </a:extLst>
+          </p:cNvPr>
+          <p:cNvPicPr>
+            <a:picLocks noChangeAspect="1" noChangeArrowheads="1"/>
+          </p:cNvPicPr>
+          <p:nvPr/>
+        </p:nvPicPr>
+        <p:blipFill>
+          <a:blip r:embed="rId4">
+            <a:extLst>
+              <a:ext uri="{28A0092B-C50C-407E-A947-70E740481C1C}">
+                <a14:useLocalDpi xmlns:a14="http://schemas.microsoft.com/office/drawing/2010/main" val="0"/>
+              </a:ext>
+            </a:extLst>
+          </a:blip>
+          <a:srcRect l="-53" t="-53" r="-53" b="-53"/>
+          <a:stretch>
+            <a:fillRect/>
+          </a:stretch>
+        </p:blipFill>
+        <p:spPr bwMode="auto">
+          <a:xfrm>
+            <a:off x="1525679" y="2249487"/>
+            <a:ext cx="2719749" cy="2764398"/>
+          </a:xfrm>
+          <a:prstGeom prst="rect">
+            <a:avLst/>
+          </a:prstGeom>
+          <a:ln w="38100" cap="sq">
+            <a:solidFill>
+              <a:srgbClr val="000000"/>
+            </a:solidFill>
+            <a:prstDash val="solid"/>
+            <a:miter lim="800000"/>
+          </a:ln>
+          <a:effectLst>
+            <a:outerShdw blurRad="50800" dist="38100" dir="2700000" algn="tl" rotWithShape="0">
+              <a:srgbClr val="000000">
+                <a:alpha val="43000"/>
+              </a:srgbClr>
+            </a:outerShdw>
+          </a:effectLst>
+          <a:extLst>
+            <a:ext uri="{91240B29-F687-4F45-9708-019B960494DF}">
+              <a14:hiddenLine xmlns:a14="http://schemas.microsoft.com/office/drawing/2010/main" w="9525">
+                <a:solidFill>
+                  <a:srgbClr val="000000"/>
+                </a:solidFill>
+                <a:miter lim="800000"/>
+                <a:headEnd/>
+                <a:tailEnd/>
+              </a14:hiddenLine>
+            </a:ext>
+          </a:extLst>
+        </p:spPr>
+      </p:pic>
     </p:spTree>
     <p:extLst>
       <p:ext uri="{BB962C8B-B14F-4D97-AF65-F5344CB8AC3E}">
@@ -4334,7 +5167,7 @@
 </p:sld>
 </file>
 
-<file path=ppt/slides/slide11.xml><?xml version="1.0" encoding="utf-8"?>
+<file path=ppt/slides/slide13.xml><?xml version="1.0" encoding="utf-8"?>
 <p:sld xmlns:a="http://schemas.openxmlformats.org/drawingml/2006/main" xmlns:r="http://schemas.openxmlformats.org/officeDocument/2006/relationships" xmlns:p="http://schemas.openxmlformats.org/presentationml/2006/main" show="0">
   <p:cSld>
     <p:spTree>
@@ -4481,72 +5314,6 @@
           </a:p>
         </p:txBody>
       </p:sp>
-      <p:sp>
-        <p:nvSpPr>
-          <p:cNvPr id="58" name="CaixaDeTexto 5">
-            <a:extLst>
-              <a:ext uri="{FF2B5EF4-FFF2-40B4-BE49-F238E27FC236}">
-                <a16:creationId xmlns:a16="http://schemas.microsoft.com/office/drawing/2014/main" id="{9AB34219-C378-98B4-57B9-F8BDC56CBC32}"/>
-              </a:ext>
-            </a:extLst>
-          </p:cNvPr>
-          <p:cNvSpPr/>
-          <p:nvPr/>
-        </p:nvSpPr>
-        <p:spPr>
-          <a:xfrm>
-            <a:off x="1489680" y="1828800"/>
-            <a:ext cx="9024480" cy="829543"/>
-          </a:xfrm>
-          <a:prstGeom prst="rect">
-            <a:avLst/>
-          </a:prstGeom>
-          <a:noFill/>
-          <a:ln w="0">
-            <a:noFill/>
-          </a:ln>
-        </p:spPr>
-        <p:style>
-          <a:lnRef idx="0">
-            <a:scrgbClr r="0" g="0" b="0"/>
-          </a:lnRef>
-          <a:fillRef idx="0">
-            <a:scrgbClr r="0" g="0" b="0"/>
-          </a:fillRef>
-          <a:effectRef idx="0">
-            <a:scrgbClr r="0" g="0" b="0"/>
-          </a:effectRef>
-          <a:fontRef idx="minor"/>
-        </p:style>
-        <p:txBody>
-          <a:bodyPr vertOverflow="overflow" horzOverflow="overflow" lIns="90000" tIns="45000" rIns="90000" bIns="45000" numCol="1" spcCol="0" anchor="t">
-            <a:spAutoFit/>
-          </a:bodyPr>
-          <a:lstStyle/>
-          <a:p>
-            <a:pPr algn="ctr">
-              <a:lnSpc>
-                <a:spcPct val="100000"/>
-              </a:lnSpc>
-              <a:buNone/>
-            </a:pPr>
-            <a:endParaRPr lang="en-US" sz="2400" b="0" strike="noStrike" spc="-1" dirty="0">
-              <a:latin typeface="Arial"/>
-            </a:endParaRPr>
-          </a:p>
-          <a:p>
-            <a:pPr algn="ctr">
-              <a:lnSpc>
-                <a:spcPct val="100000"/>
-              </a:lnSpc>
-              <a:buNone/>
-            </a:pPr>
-            <a:endParaRPr lang="en-US" sz="2400" b="0" strike="noStrike" spc="-1" dirty="0">
-              <a:latin typeface="Arial"/>
-            </a:endParaRPr>
-          </a:p>
-        </p:txBody>
-      </p:sp>
       <p:pic>
         <p:nvPicPr>
           <p:cNvPr id="59" name="Imagem 3">
@@ -4641,6 +5408,161 @@
           </a:p>
         </p:txBody>
       </p:sp>
+      <p:sp>
+        <p:nvSpPr>
+          <p:cNvPr id="2" name="CaixaDeTexto 9">
+            <a:extLst>
+              <a:ext uri="{FF2B5EF4-FFF2-40B4-BE49-F238E27FC236}">
+                <a16:creationId xmlns:a16="http://schemas.microsoft.com/office/drawing/2014/main" id="{3BD777AD-F551-BADA-3CBF-84C8B226510B}"/>
+              </a:ext>
+            </a:extLst>
+          </p:cNvPr>
+          <p:cNvSpPr/>
+          <p:nvPr/>
+        </p:nvSpPr>
+        <p:spPr>
+          <a:xfrm>
+            <a:off x="1525680" y="2254116"/>
+            <a:ext cx="9024480" cy="2349767"/>
+          </a:xfrm>
+          <a:prstGeom prst="rect">
+            <a:avLst/>
+          </a:prstGeom>
+          <a:noFill/>
+          <a:ln w="0">
+            <a:noFill/>
+          </a:ln>
+        </p:spPr>
+        <p:style>
+          <a:lnRef idx="0">
+            <a:scrgbClr r="0" g="0" b="0"/>
+          </a:lnRef>
+          <a:fillRef idx="0">
+            <a:scrgbClr r="0" g="0" b="0"/>
+          </a:fillRef>
+          <a:effectRef idx="0">
+            <a:scrgbClr r="0" g="0" b="0"/>
+          </a:effectRef>
+          <a:fontRef idx="minor"/>
+        </p:style>
+        <p:txBody>
+          <a:bodyPr vertOverflow="overflow" horzOverflow="overflow" wrap="square" lIns="90000" tIns="45000" rIns="90000" bIns="45000" numCol="1" spcCol="0" anchor="t">
+            <a:spAutoFit/>
+          </a:bodyPr>
+          <a:lstStyle/>
+          <a:p>
+            <a:pPr marL="343080" indent="-343080">
+              <a:lnSpc>
+                <a:spcPct val="150000"/>
+              </a:lnSpc>
+              <a:buClr>
+                <a:srgbClr val="000000"/>
+              </a:buClr>
+              <a:buFont typeface="Arial"/>
+              <a:buChar char="•"/>
+            </a:pPr>
+            <a:r>
+              <a:rPr lang="pt-PT" sz="2000" spc="-1" dirty="0">
+                <a:solidFill>
+                  <a:srgbClr val="000000"/>
+                </a:solidFill>
+                <a:latin typeface="Consolas"/>
+              </a:rPr>
+              <a:t>Seguindo a mesma lógica, podemos criar o resto das tabelas</a:t>
+            </a:r>
+          </a:p>
+          <a:p>
+            <a:pPr marL="343080" indent="-343080">
+              <a:lnSpc>
+                <a:spcPct val="150000"/>
+              </a:lnSpc>
+              <a:buClr>
+                <a:srgbClr val="000000"/>
+              </a:buClr>
+              <a:buFont typeface="Arial"/>
+              <a:buChar char="•"/>
+            </a:pPr>
+            <a:r>
+              <a:rPr lang="pt-PT" sz="2000" spc="-1" dirty="0">
+                <a:solidFill>
+                  <a:srgbClr val="000000"/>
+                </a:solidFill>
+                <a:latin typeface="Consolas"/>
+              </a:rPr>
+              <a:t>As tabelas que faltam são:</a:t>
+            </a:r>
+          </a:p>
+          <a:p>
+            <a:pPr marL="800280" lvl="1" indent="-343080">
+              <a:lnSpc>
+                <a:spcPct val="150000"/>
+              </a:lnSpc>
+              <a:buClr>
+                <a:srgbClr val="000000"/>
+              </a:buClr>
+              <a:buFont typeface="Arial"/>
+              <a:buChar char="•"/>
+            </a:pPr>
+            <a:r>
+              <a:rPr lang="pt-PT" sz="2000" spc="-1" dirty="0">
+                <a:solidFill>
+                  <a:srgbClr val="000000"/>
+                </a:solidFill>
+                <a:latin typeface="Consolas"/>
+              </a:rPr>
+              <a:t>Modalidade e Equipa</a:t>
+            </a:r>
+          </a:p>
+          <a:p>
+            <a:pPr marL="800280" lvl="1" indent="-343080">
+              <a:lnSpc>
+                <a:spcPct val="150000"/>
+              </a:lnSpc>
+              <a:buClr>
+                <a:srgbClr val="000000"/>
+              </a:buClr>
+              <a:buFont typeface="Arial"/>
+              <a:buChar char="•"/>
+            </a:pPr>
+            <a:r>
+              <a:rPr lang="pt-PT" sz="2000" spc="-1" dirty="0">
+                <a:solidFill>
+                  <a:srgbClr val="000000"/>
+                </a:solidFill>
+                <a:latin typeface="Consolas"/>
+              </a:rPr>
+              <a:t>Treinador, Atleta, Evento</a:t>
+            </a:r>
+          </a:p>
+          <a:p>
+            <a:pPr marL="800280" lvl="1" indent="-343080">
+              <a:lnSpc>
+                <a:spcPct val="150000"/>
+              </a:lnSpc>
+              <a:buClr>
+                <a:srgbClr val="000000"/>
+              </a:buClr>
+              <a:buFont typeface="Arial"/>
+              <a:buChar char="•"/>
+            </a:pPr>
+            <a:r>
+              <a:rPr lang="pt-PT" sz="2000" spc="-1" dirty="0">
+                <a:solidFill>
+                  <a:srgbClr val="000000"/>
+                </a:solidFill>
+                <a:latin typeface="Consolas"/>
+              </a:rPr>
+              <a:t>Resultado e Realiza</a:t>
+            </a:r>
+            <a:endParaRPr lang="en" sz="2000" spc="-1" dirty="0">
+              <a:solidFill>
+                <a:srgbClr val="000000"/>
+              </a:solidFill>
+              <a:latin typeface="Consolas"/>
+            </a:endParaRPr>
+          </a:p>
+        </p:txBody>
+      </p:sp>
     </p:spTree>
     <p:extLst>
       <p:ext uri="{BB962C8B-B14F-4D97-AF65-F5344CB8AC3E}">
@@ -4654,7 +5576,7 @@
 </p:sld>
 </file>
 
-<file path=ppt/slides/slide12.xml><?xml version="1.0" encoding="utf-8"?>
+<file path=ppt/slides/slide14.xml><?xml version="1.0" encoding="utf-8"?>
 <p:sld xmlns:a="http://schemas.openxmlformats.org/drawingml/2006/main" xmlns:r="http://schemas.openxmlformats.org/officeDocument/2006/relationships" xmlns:p="http://schemas.openxmlformats.org/presentationml/2006/main" show="0">
   <p:cSld>
     <p:spTree>
@@ -4801,72 +5723,6 @@
           </a:p>
         </p:txBody>
       </p:sp>
-      <p:sp>
-        <p:nvSpPr>
-          <p:cNvPr id="58" name="CaixaDeTexto 5">
-            <a:extLst>
-              <a:ext uri="{FF2B5EF4-FFF2-40B4-BE49-F238E27FC236}">
-                <a16:creationId xmlns:a16="http://schemas.microsoft.com/office/drawing/2014/main" id="{CD1A1F55-1865-F7A2-8D20-B58D2994CC74}"/>
-              </a:ext>
-            </a:extLst>
-          </p:cNvPr>
-          <p:cNvSpPr/>
-          <p:nvPr/>
-        </p:nvSpPr>
-        <p:spPr>
-          <a:xfrm>
-            <a:off x="1489680" y="1828800"/>
-            <a:ext cx="9024480" cy="829543"/>
-          </a:xfrm>
-          <a:prstGeom prst="rect">
-            <a:avLst/>
-          </a:prstGeom>
-          <a:noFill/>
-          <a:ln w="0">
-            <a:noFill/>
-          </a:ln>
-        </p:spPr>
-        <p:style>
-          <a:lnRef idx="0">
-            <a:scrgbClr r="0" g="0" b="0"/>
-          </a:lnRef>
-          <a:fillRef idx="0">
-            <a:scrgbClr r="0" g="0" b="0"/>
-          </a:fillRef>
-          <a:effectRef idx="0">
-            <a:scrgbClr r="0" g="0" b="0"/>
-          </a:effectRef>
-          <a:fontRef idx="minor"/>
-        </p:style>
-        <p:txBody>
-          <a:bodyPr vertOverflow="overflow" horzOverflow="overflow" lIns="90000" tIns="45000" rIns="90000" bIns="45000" numCol="1" spcCol="0" anchor="t">
-            <a:spAutoFit/>
-          </a:bodyPr>
-          <a:lstStyle/>
-          <a:p>
-            <a:pPr algn="ctr">
-              <a:lnSpc>
-                <a:spcPct val="100000"/>
-              </a:lnSpc>
-              <a:buNone/>
-            </a:pPr>
-            <a:endParaRPr lang="en-US" sz="2400" b="0" strike="noStrike" spc="-1" dirty="0">
-              <a:latin typeface="Arial"/>
-            </a:endParaRPr>
-          </a:p>
-          <a:p>
-            <a:pPr algn="ctr">
-              <a:lnSpc>
-                <a:spcPct val="100000"/>
-              </a:lnSpc>
-              <a:buNone/>
-            </a:pPr>
-            <a:endParaRPr lang="en-US" sz="2400" b="0" strike="noStrike" spc="-1" dirty="0">
-              <a:latin typeface="Arial"/>
-            </a:endParaRPr>
-          </a:p>
-        </p:txBody>
-      </p:sp>
       <p:pic>
         <p:nvPicPr>
           <p:cNvPr id="59" name="Imagem 3">
@@ -4961,6 +5817,94 @@
           </a:p>
         </p:txBody>
       </p:sp>
+      <p:pic>
+        <p:nvPicPr>
+          <p:cNvPr id="3" name="Imagem 2">
+            <a:extLst>
+              <a:ext uri="{FF2B5EF4-FFF2-40B4-BE49-F238E27FC236}">
+                <a16:creationId xmlns:a16="http://schemas.microsoft.com/office/drawing/2014/main" id="{912D189D-C7EE-E115-F17B-47D6CDE34202}"/>
+              </a:ext>
+            </a:extLst>
+          </p:cNvPr>
+          <p:cNvPicPr>
+            <a:picLocks noChangeAspect="1"/>
+          </p:cNvPicPr>
+          <p:nvPr/>
+        </p:nvPicPr>
+        <p:blipFill>
+          <a:blip r:embed="rId3"/>
+          <a:stretch>
+            <a:fillRect/>
+          </a:stretch>
+        </p:blipFill>
+        <p:spPr>
+          <a:xfrm>
+            <a:off x="1489680" y="2290602"/>
+            <a:ext cx="3762900" cy="2276793"/>
+          </a:xfrm>
+          <a:prstGeom prst="rect">
+            <a:avLst/>
+          </a:prstGeom>
+          <a:ln w="38100" cap="sq">
+            <a:solidFill>
+              <a:srgbClr val="000000"/>
+            </a:solidFill>
+            <a:prstDash val="solid"/>
+            <a:miter lim="800000"/>
+          </a:ln>
+          <a:effectLst>
+            <a:outerShdw blurRad="50800" dist="38100" dir="2700000" algn="tl" rotWithShape="0">
+              <a:srgbClr val="000000">
+                <a:alpha val="43000"/>
+              </a:srgbClr>
+            </a:outerShdw>
+          </a:effectLst>
+        </p:spPr>
+      </p:pic>
+      <p:pic>
+        <p:nvPicPr>
+          <p:cNvPr id="5" name="Imagem 4">
+            <a:extLst>
+              <a:ext uri="{FF2B5EF4-FFF2-40B4-BE49-F238E27FC236}">
+                <a16:creationId xmlns:a16="http://schemas.microsoft.com/office/drawing/2014/main" id="{964ADE5D-B359-90EC-0A8D-304F7E35144E}"/>
+              </a:ext>
+            </a:extLst>
+          </p:cNvPr>
+          <p:cNvPicPr>
+            <a:picLocks noChangeAspect="1"/>
+          </p:cNvPicPr>
+          <p:nvPr/>
+        </p:nvPicPr>
+        <p:blipFill>
+          <a:blip r:embed="rId4"/>
+          <a:stretch>
+            <a:fillRect/>
+          </a:stretch>
+        </p:blipFill>
+        <p:spPr>
+          <a:xfrm>
+            <a:off x="6741734" y="2009575"/>
+            <a:ext cx="3772426" cy="2838846"/>
+          </a:xfrm>
+          <a:prstGeom prst="rect">
+            <a:avLst/>
+          </a:prstGeom>
+          <a:ln w="38100" cap="sq">
+            <a:solidFill>
+              <a:srgbClr val="000000"/>
+            </a:solidFill>
+            <a:prstDash val="solid"/>
+            <a:miter lim="800000"/>
+          </a:ln>
+          <a:effectLst>
+            <a:outerShdw blurRad="50800" dist="38100" dir="2700000" algn="tl" rotWithShape="0">
+              <a:srgbClr val="000000">
+                <a:alpha val="43000"/>
+              </a:srgbClr>
+            </a:outerShdw>
+          </a:effectLst>
+        </p:spPr>
+      </p:pic>
     </p:spTree>
     <p:extLst>
       <p:ext uri="{BB962C8B-B14F-4D97-AF65-F5344CB8AC3E}">
@@ -4974,7 +5918,7 @@
 </p:sld>
 </file>
 
-<file path=ppt/slides/slide13.xml><?xml version="1.0" encoding="utf-8"?>
+<file path=ppt/slides/slide15.xml><?xml version="1.0" encoding="utf-8"?>
 <p:sld xmlns:a="http://schemas.openxmlformats.org/drawingml/2006/main" xmlns:r="http://schemas.openxmlformats.org/officeDocument/2006/relationships" xmlns:p="http://schemas.openxmlformats.org/presentationml/2006/main" show="0">
   <p:cSld>
     <p:spTree>
@@ -5281,6 +6225,137 @@
           </a:p>
         </p:txBody>
       </p:sp>
+      <p:pic>
+        <p:nvPicPr>
+          <p:cNvPr id="3" name="Imagem 2">
+            <a:extLst>
+              <a:ext uri="{FF2B5EF4-FFF2-40B4-BE49-F238E27FC236}">
+                <a16:creationId xmlns:a16="http://schemas.microsoft.com/office/drawing/2014/main" id="{A1645DA7-1223-A852-03A9-2DC523DAAC62}"/>
+              </a:ext>
+            </a:extLst>
+          </p:cNvPr>
+          <p:cNvPicPr>
+            <a:picLocks noChangeAspect="1"/>
+          </p:cNvPicPr>
+          <p:nvPr/>
+        </p:nvPicPr>
+        <p:blipFill>
+          <a:blip r:embed="rId3"/>
+          <a:srcRect l="1938" r="2627"/>
+          <a:stretch/>
+        </p:blipFill>
+        <p:spPr>
+          <a:xfrm>
+            <a:off x="621720" y="2266788"/>
+            <a:ext cx="3572933" cy="2324424"/>
+          </a:xfrm>
+          <a:prstGeom prst="rect">
+            <a:avLst/>
+          </a:prstGeom>
+          <a:ln w="38100" cap="sq">
+            <a:solidFill>
+              <a:srgbClr val="000000"/>
+            </a:solidFill>
+            <a:prstDash val="solid"/>
+            <a:miter lim="800000"/>
+          </a:ln>
+          <a:effectLst>
+            <a:outerShdw blurRad="50800" dist="38100" dir="2700000" algn="tl" rotWithShape="0">
+              <a:srgbClr val="000000">
+                <a:alpha val="43000"/>
+              </a:srgbClr>
+            </a:outerShdw>
+          </a:effectLst>
+        </p:spPr>
+      </p:pic>
+      <p:pic>
+        <p:nvPicPr>
+          <p:cNvPr id="5" name="Imagem 4">
+            <a:extLst>
+              <a:ext uri="{FF2B5EF4-FFF2-40B4-BE49-F238E27FC236}">
+                <a16:creationId xmlns:a16="http://schemas.microsoft.com/office/drawing/2014/main" id="{9BE8147F-E791-5771-F955-4E2BAB2E4D08}"/>
+              </a:ext>
+            </a:extLst>
+          </p:cNvPr>
+          <p:cNvPicPr>
+            <a:picLocks noChangeAspect="1"/>
+          </p:cNvPicPr>
+          <p:nvPr/>
+        </p:nvPicPr>
+        <p:blipFill>
+          <a:blip r:embed="rId4"/>
+          <a:stretch>
+            <a:fillRect/>
+          </a:stretch>
+        </p:blipFill>
+        <p:spPr>
+          <a:xfrm>
+            <a:off x="4408819" y="1828800"/>
+            <a:ext cx="3372321" cy="3353268"/>
+          </a:xfrm>
+          <a:prstGeom prst="rect">
+            <a:avLst/>
+          </a:prstGeom>
+          <a:ln w="38100" cap="sq">
+            <a:solidFill>
+              <a:srgbClr val="000000"/>
+            </a:solidFill>
+            <a:prstDash val="solid"/>
+            <a:miter lim="800000"/>
+          </a:ln>
+          <a:effectLst>
+            <a:outerShdw blurRad="50800" dist="38100" dir="2700000" algn="tl" rotWithShape="0">
+              <a:srgbClr val="000000">
+                <a:alpha val="43000"/>
+              </a:srgbClr>
+            </a:outerShdw>
+          </a:effectLst>
+        </p:spPr>
+      </p:pic>
+      <p:pic>
+        <p:nvPicPr>
+          <p:cNvPr id="7" name="Imagem 6">
+            <a:extLst>
+              <a:ext uri="{FF2B5EF4-FFF2-40B4-BE49-F238E27FC236}">
+                <a16:creationId xmlns:a16="http://schemas.microsoft.com/office/drawing/2014/main" id="{1F2013A2-0D03-7FCD-B343-782C51886C47}"/>
+              </a:ext>
+            </a:extLst>
+          </p:cNvPr>
+          <p:cNvPicPr>
+            <a:picLocks noChangeAspect="1"/>
+          </p:cNvPicPr>
+          <p:nvPr/>
+        </p:nvPicPr>
+        <p:blipFill>
+          <a:blip r:embed="rId5"/>
+          <a:stretch>
+            <a:fillRect/>
+          </a:stretch>
+        </p:blipFill>
+        <p:spPr>
+          <a:xfrm>
+            <a:off x="7995306" y="2166761"/>
+            <a:ext cx="3829584" cy="2524477"/>
+          </a:xfrm>
+          <a:prstGeom prst="rect">
+            <a:avLst/>
+          </a:prstGeom>
+          <a:ln w="38100" cap="sq">
+            <a:solidFill>
+              <a:srgbClr val="000000"/>
+            </a:solidFill>
+            <a:prstDash val="solid"/>
+            <a:miter lim="800000"/>
+          </a:ln>
+          <a:effectLst>
+            <a:outerShdw blurRad="50800" dist="38100" dir="2700000" algn="tl" rotWithShape="0">
+              <a:srgbClr val="000000">
+                <a:alpha val="43000"/>
+              </a:srgbClr>
+            </a:outerShdw>
+          </a:effectLst>
+        </p:spPr>
+      </p:pic>
     </p:spTree>
     <p:extLst>
       <p:ext uri="{BB962C8B-B14F-4D97-AF65-F5344CB8AC3E}">
@@ -5294,7 +6369,652 @@
 </p:sld>
 </file>
 
-<file path=ppt/slides/slide14.xml><?xml version="1.0" encoding="utf-8"?>
+<file path=ppt/slides/slide16.xml><?xml version="1.0" encoding="utf-8"?>
+<p:sld xmlns:a="http://schemas.openxmlformats.org/drawingml/2006/main" xmlns:r="http://schemas.openxmlformats.org/officeDocument/2006/relationships" xmlns:p="http://schemas.openxmlformats.org/presentationml/2006/main" show="0">
+  <p:cSld>
+    <p:spTree>
+      <p:nvGrpSpPr>
+        <p:cNvPr id="1" name="">
+          <a:extLst>
+            <a:ext uri="{FF2B5EF4-FFF2-40B4-BE49-F238E27FC236}">
+              <a16:creationId xmlns:a16="http://schemas.microsoft.com/office/drawing/2014/main" id="{056E4837-4A72-2EC1-C42C-823AE6FB73C0}"/>
+            </a:ext>
+          </a:extLst>
+        </p:cNvPr>
+        <p:cNvGrpSpPr/>
+        <p:nvPr/>
+      </p:nvGrpSpPr>
+      <p:grpSpPr>
+        <a:xfrm>
+          <a:off x="0" y="0"/>
+          <a:ext cx="0" cy="0"/>
+          <a:chOff x="0" y="0"/>
+          <a:chExt cx="0" cy="0"/>
+        </a:xfrm>
+      </p:grpSpPr>
+      <p:sp>
+        <p:nvSpPr>
+          <p:cNvPr id="56" name="PlaceHolder 1">
+            <a:extLst>
+              <a:ext uri="{FF2B5EF4-FFF2-40B4-BE49-F238E27FC236}">
+                <a16:creationId xmlns:a16="http://schemas.microsoft.com/office/drawing/2014/main" id="{955800E1-82FE-1091-36A9-B24BE36E7A49}"/>
+              </a:ext>
+            </a:extLst>
+          </p:cNvPr>
+          <p:cNvSpPr>
+            <a:spLocks noGrp="1"/>
+          </p:cNvSpPr>
+          <p:nvPr>
+            <p:ph type="title"/>
+          </p:nvPr>
+        </p:nvSpPr>
+        <p:spPr>
+          <a:xfrm>
+            <a:off x="1525680" y="275040"/>
+            <a:ext cx="9141840" cy="1153080"/>
+          </a:xfrm>
+          <a:prstGeom prst="rect">
+            <a:avLst/>
+          </a:prstGeom>
+          <a:noFill/>
+          <a:ln w="0">
+            <a:noFill/>
+          </a:ln>
+        </p:spPr>
+        <p:txBody>
+          <a:bodyPr lIns="0" tIns="0" rIns="0" bIns="0" anchor="b">
+            <a:noAutofit/>
+          </a:bodyPr>
+          <a:lstStyle/>
+          <a:p>
+            <a:pPr algn="ctr">
+              <a:lnSpc>
+                <a:spcPct val="90000"/>
+              </a:lnSpc>
+              <a:buNone/>
+            </a:pPr>
+            <a:r>
+              <a:rPr lang="pt-PT" sz="4000" b="0" strike="noStrike" spc="-1" dirty="0">
+                <a:solidFill>
+                  <a:srgbClr val="870F11"/>
+                </a:solidFill>
+                <a:latin typeface="Calibri"/>
+              </a:rPr>
+              <a:t>Apresentação e explicação da</a:t>
+            </a:r>
+            <a:br>
+              <a:rPr lang="pt-PT" sz="4000" b="0" strike="noStrike" spc="-1" dirty="0">
+                <a:solidFill>
+                  <a:srgbClr val="870F11"/>
+                </a:solidFill>
+                <a:latin typeface="Calibri"/>
+              </a:rPr>
+            </a:br>
+            <a:r>
+              <a:rPr lang="pt-PT" sz="4000" b="0" strike="noStrike" spc="-1" dirty="0">
+                <a:solidFill>
+                  <a:srgbClr val="870F11"/>
+                </a:solidFill>
+                <a:latin typeface="Calibri"/>
+              </a:rPr>
+              <a:t>base de dados implementada</a:t>
+            </a:r>
+            <a:endParaRPr lang="en-US" sz="4000" b="0" strike="noStrike" spc="-1" dirty="0">
+              <a:latin typeface="Arial"/>
+            </a:endParaRPr>
+          </a:p>
+        </p:txBody>
+      </p:sp>
+      <p:sp>
+        <p:nvSpPr>
+          <p:cNvPr id="57" name="Retângulo 4">
+            <a:extLst>
+              <a:ext uri="{FF2B5EF4-FFF2-40B4-BE49-F238E27FC236}">
+                <a16:creationId xmlns:a16="http://schemas.microsoft.com/office/drawing/2014/main" id="{9731862E-DE81-F6A2-E7BB-3087EC8567B4}"/>
+              </a:ext>
+            </a:extLst>
+          </p:cNvPr>
+          <p:cNvSpPr/>
+          <p:nvPr/>
+        </p:nvSpPr>
+        <p:spPr>
+          <a:xfrm>
+            <a:off x="0" y="6233760"/>
+            <a:ext cx="12189960" cy="622080"/>
+          </a:xfrm>
+          <a:prstGeom prst="rect">
+            <a:avLst/>
+          </a:prstGeom>
+          <a:solidFill>
+            <a:srgbClr val="870F11"/>
+          </a:solidFill>
+          <a:ln>
+            <a:solidFill>
+              <a:srgbClr val="870F11"/>
+            </a:solidFill>
+          </a:ln>
+        </p:spPr>
+        <p:style>
+          <a:lnRef idx="2">
+            <a:schemeClr val="accent1">
+              <a:shade val="50000"/>
+            </a:schemeClr>
+          </a:lnRef>
+          <a:fillRef idx="1">
+            <a:schemeClr val="accent1"/>
+          </a:fillRef>
+          <a:effectRef idx="0">
+            <a:schemeClr val="accent1"/>
+          </a:effectRef>
+          <a:fontRef idx="minor"/>
+        </p:style>
+        <p:txBody>
+          <a:bodyPr/>
+          <a:lstStyle/>
+          <a:p>
+            <a:endParaRPr lang="pt-PT"/>
+          </a:p>
+        </p:txBody>
+      </p:sp>
+      <p:pic>
+        <p:nvPicPr>
+          <p:cNvPr id="59" name="Imagem 3">
+            <a:extLst>
+              <a:ext uri="{FF2B5EF4-FFF2-40B4-BE49-F238E27FC236}">
+                <a16:creationId xmlns:a16="http://schemas.microsoft.com/office/drawing/2014/main" id="{B02D5DD0-1053-DBD8-DF6A-B4A55097DDE3}"/>
+              </a:ext>
+            </a:extLst>
+          </p:cNvPr>
+          <p:cNvPicPr/>
+          <p:nvPr/>
+        </p:nvPicPr>
+        <p:blipFill>
+          <a:blip r:embed="rId2"/>
+          <a:stretch/>
+        </p:blipFill>
+        <p:spPr>
+          <a:xfrm>
+            <a:off x="3240" y="6261480"/>
+            <a:ext cx="1236960" cy="709200"/>
+          </a:xfrm>
+          <a:prstGeom prst="rect">
+            <a:avLst/>
+          </a:prstGeom>
+          <a:ln w="0">
+            <a:noFill/>
+          </a:ln>
+        </p:spPr>
+      </p:pic>
+      <p:sp>
+        <p:nvSpPr>
+          <p:cNvPr id="60" name="CaixaDeTexto 1">
+            <a:extLst>
+              <a:ext uri="{FF2B5EF4-FFF2-40B4-BE49-F238E27FC236}">
+                <a16:creationId xmlns:a16="http://schemas.microsoft.com/office/drawing/2014/main" id="{260981F1-9E6F-FAC0-41AF-F4920925F553}"/>
+              </a:ext>
+            </a:extLst>
+          </p:cNvPr>
+          <p:cNvSpPr/>
+          <p:nvPr/>
+        </p:nvSpPr>
+        <p:spPr>
+          <a:xfrm>
+            <a:off x="6629400" y="6362640"/>
+            <a:ext cx="5855760" cy="337100"/>
+          </a:xfrm>
+          <a:prstGeom prst="rect">
+            <a:avLst/>
+          </a:prstGeom>
+          <a:noFill/>
+          <a:ln w="0">
+            <a:noFill/>
+          </a:ln>
+        </p:spPr>
+        <p:style>
+          <a:lnRef idx="0">
+            <a:scrgbClr r="0" g="0" b="0"/>
+          </a:lnRef>
+          <a:fillRef idx="0">
+            <a:scrgbClr r="0" g="0" b="0"/>
+          </a:fillRef>
+          <a:effectRef idx="0">
+            <a:scrgbClr r="0" g="0" b="0"/>
+          </a:effectRef>
+          <a:fontRef idx="minor"/>
+        </p:style>
+        <p:txBody>
+          <a:bodyPr vertOverflow="overflow" horzOverflow="overflow" lIns="90000" tIns="45000" rIns="90000" bIns="45000" numCol="1" spcCol="0" anchor="t">
+            <a:spAutoFit/>
+          </a:bodyPr>
+          <a:lstStyle/>
+          <a:p>
+            <a:pPr>
+              <a:lnSpc>
+                <a:spcPct val="100000"/>
+              </a:lnSpc>
+              <a:buNone/>
+            </a:pPr>
+            <a:r>
+              <a:rPr lang="pt-PT" sz="1600" b="0" strike="noStrike" spc="-1" dirty="0">
+                <a:solidFill>
+                  <a:srgbClr val="FFFFFF"/>
+                </a:solidFill>
+                <a:latin typeface="Calibri"/>
+                <a:ea typeface="DejaVu Sans"/>
+              </a:rPr>
+              <a:t>Bases de Dados – Jogos Olímpicos   |   Parte 2 - Grupo 8</a:t>
+            </a:r>
+            <a:endParaRPr lang="en-US" sz="1600" b="0" strike="noStrike" spc="-1" dirty="0">
+              <a:latin typeface="Arial"/>
+            </a:endParaRPr>
+          </a:p>
+        </p:txBody>
+      </p:sp>
+      <p:pic>
+        <p:nvPicPr>
+          <p:cNvPr id="3" name="Imagem 2">
+            <a:extLst>
+              <a:ext uri="{FF2B5EF4-FFF2-40B4-BE49-F238E27FC236}">
+                <a16:creationId xmlns:a16="http://schemas.microsoft.com/office/drawing/2014/main" id="{7D62E462-7E51-EB9C-2690-8006EC608A59}"/>
+              </a:ext>
+            </a:extLst>
+          </p:cNvPr>
+          <p:cNvPicPr>
+            <a:picLocks noChangeAspect="1"/>
+          </p:cNvPicPr>
+          <p:nvPr/>
+        </p:nvPicPr>
+        <p:blipFill>
+          <a:blip r:embed="rId3"/>
+          <a:stretch>
+            <a:fillRect/>
+          </a:stretch>
+        </p:blipFill>
+        <p:spPr>
+          <a:xfrm>
+            <a:off x="2408291" y="1715812"/>
+            <a:ext cx="3686689" cy="3934374"/>
+          </a:xfrm>
+          <a:prstGeom prst="rect">
+            <a:avLst/>
+          </a:prstGeom>
+          <a:ln w="38100" cap="sq">
+            <a:solidFill>
+              <a:srgbClr val="000000"/>
+            </a:solidFill>
+            <a:prstDash val="solid"/>
+            <a:miter lim="800000"/>
+          </a:ln>
+          <a:effectLst>
+            <a:outerShdw blurRad="50800" dist="38100" dir="2700000" algn="tl" rotWithShape="0">
+              <a:srgbClr val="000000">
+                <a:alpha val="43000"/>
+              </a:srgbClr>
+            </a:outerShdw>
+          </a:effectLst>
+        </p:spPr>
+      </p:pic>
+      <p:pic>
+        <p:nvPicPr>
+          <p:cNvPr id="5" name="Imagem 4">
+            <a:extLst>
+              <a:ext uri="{FF2B5EF4-FFF2-40B4-BE49-F238E27FC236}">
+                <a16:creationId xmlns:a16="http://schemas.microsoft.com/office/drawing/2014/main" id="{84222964-6139-1D28-736B-07F1F7D2C89B}"/>
+              </a:ext>
+            </a:extLst>
+          </p:cNvPr>
+          <p:cNvPicPr>
+            <a:picLocks noChangeAspect="1"/>
+          </p:cNvPicPr>
+          <p:nvPr/>
+        </p:nvPicPr>
+        <p:blipFill>
+          <a:blip r:embed="rId4"/>
+          <a:stretch>
+            <a:fillRect/>
+          </a:stretch>
+        </p:blipFill>
+        <p:spPr>
+          <a:xfrm>
+            <a:off x="6370725" y="2535076"/>
+            <a:ext cx="3867690" cy="2295845"/>
+          </a:xfrm>
+          <a:prstGeom prst="rect">
+            <a:avLst/>
+          </a:prstGeom>
+          <a:ln w="38100" cap="sq">
+            <a:solidFill>
+              <a:srgbClr val="000000"/>
+            </a:solidFill>
+            <a:prstDash val="solid"/>
+            <a:miter lim="800000"/>
+          </a:ln>
+          <a:effectLst>
+            <a:outerShdw blurRad="50800" dist="38100" dir="2700000" algn="tl" rotWithShape="0">
+              <a:srgbClr val="000000">
+                <a:alpha val="43000"/>
+              </a:srgbClr>
+            </a:outerShdw>
+          </a:effectLst>
+        </p:spPr>
+      </p:pic>
+    </p:spTree>
+    <p:extLst>
+      <p:ext uri="{BB962C8B-B14F-4D97-AF65-F5344CB8AC3E}">
+        <p14:creationId xmlns:p14="http://schemas.microsoft.com/office/powerpoint/2010/main" val="132811513"/>
+      </p:ext>
+    </p:extLst>
+  </p:cSld>
+  <p:clrMapOvr>
+    <a:masterClrMapping/>
+  </p:clrMapOvr>
+</p:sld>
+</file>
+
+<file path=ppt/slides/slide17.xml><?xml version="1.0" encoding="utf-8"?>
+<p:sld xmlns:a="http://schemas.openxmlformats.org/drawingml/2006/main" xmlns:r="http://schemas.openxmlformats.org/officeDocument/2006/relationships" xmlns:p="http://schemas.openxmlformats.org/presentationml/2006/main" show="0">
+  <p:cSld>
+    <p:spTree>
+      <p:nvGrpSpPr>
+        <p:cNvPr id="1" name="">
+          <a:extLst>
+            <a:ext uri="{FF2B5EF4-FFF2-40B4-BE49-F238E27FC236}">
+              <a16:creationId xmlns:a16="http://schemas.microsoft.com/office/drawing/2014/main" id="{EC1B02B5-7C5F-1794-ACAA-B80A395903CE}"/>
+            </a:ext>
+          </a:extLst>
+        </p:cNvPr>
+        <p:cNvGrpSpPr/>
+        <p:nvPr/>
+      </p:nvGrpSpPr>
+      <p:grpSpPr>
+        <a:xfrm>
+          <a:off x="0" y="0"/>
+          <a:ext cx="0" cy="0"/>
+          <a:chOff x="0" y="0"/>
+          <a:chExt cx="0" cy="0"/>
+        </a:xfrm>
+      </p:grpSpPr>
+      <p:sp>
+        <p:nvSpPr>
+          <p:cNvPr id="56" name="PlaceHolder 1">
+            <a:extLst>
+              <a:ext uri="{FF2B5EF4-FFF2-40B4-BE49-F238E27FC236}">
+                <a16:creationId xmlns:a16="http://schemas.microsoft.com/office/drawing/2014/main" id="{13D40603-5E11-4974-F709-9BEC01990AFA}"/>
+              </a:ext>
+            </a:extLst>
+          </p:cNvPr>
+          <p:cNvSpPr>
+            <a:spLocks noGrp="1"/>
+          </p:cNvSpPr>
+          <p:nvPr>
+            <p:ph type="title"/>
+          </p:nvPr>
+        </p:nvSpPr>
+        <p:spPr>
+          <a:xfrm>
+            <a:off x="1525680" y="275040"/>
+            <a:ext cx="9141840" cy="1153080"/>
+          </a:xfrm>
+          <a:prstGeom prst="rect">
+            <a:avLst/>
+          </a:prstGeom>
+          <a:noFill/>
+          <a:ln w="0">
+            <a:noFill/>
+          </a:ln>
+        </p:spPr>
+        <p:txBody>
+          <a:bodyPr lIns="0" tIns="0" rIns="0" bIns="0" anchor="b">
+            <a:noAutofit/>
+          </a:bodyPr>
+          <a:lstStyle/>
+          <a:p>
+            <a:pPr algn="ctr">
+              <a:lnSpc>
+                <a:spcPct val="90000"/>
+              </a:lnSpc>
+              <a:buNone/>
+            </a:pPr>
+            <a:r>
+              <a:rPr lang="pt-PT" sz="4000" b="0" strike="noStrike" spc="-1" dirty="0">
+                <a:solidFill>
+                  <a:srgbClr val="870F11"/>
+                </a:solidFill>
+                <a:latin typeface="Calibri"/>
+              </a:rPr>
+              <a:t>Cálculo do …</a:t>
+            </a:r>
+            <a:endParaRPr lang="en-US" sz="4000" b="0" strike="noStrike" spc="-1" dirty="0">
+              <a:latin typeface="Arial"/>
+            </a:endParaRPr>
+          </a:p>
+        </p:txBody>
+      </p:sp>
+      <p:sp>
+        <p:nvSpPr>
+          <p:cNvPr id="57" name="Retângulo 4">
+            <a:extLst>
+              <a:ext uri="{FF2B5EF4-FFF2-40B4-BE49-F238E27FC236}">
+                <a16:creationId xmlns:a16="http://schemas.microsoft.com/office/drawing/2014/main" id="{6BC935C0-F318-ED1B-B924-E43634BA47FA}"/>
+              </a:ext>
+            </a:extLst>
+          </p:cNvPr>
+          <p:cNvSpPr/>
+          <p:nvPr/>
+        </p:nvSpPr>
+        <p:spPr>
+          <a:xfrm>
+            <a:off x="0" y="6233760"/>
+            <a:ext cx="12189960" cy="622080"/>
+          </a:xfrm>
+          <a:prstGeom prst="rect">
+            <a:avLst/>
+          </a:prstGeom>
+          <a:solidFill>
+            <a:srgbClr val="870F11"/>
+          </a:solidFill>
+          <a:ln>
+            <a:solidFill>
+              <a:srgbClr val="870F11"/>
+            </a:solidFill>
+          </a:ln>
+        </p:spPr>
+        <p:style>
+          <a:lnRef idx="2">
+            <a:schemeClr val="accent1">
+              <a:shade val="50000"/>
+            </a:schemeClr>
+          </a:lnRef>
+          <a:fillRef idx="1">
+            <a:schemeClr val="accent1"/>
+          </a:fillRef>
+          <a:effectRef idx="0">
+            <a:schemeClr val="accent1"/>
+          </a:effectRef>
+          <a:fontRef idx="minor"/>
+        </p:style>
+        <p:txBody>
+          <a:bodyPr/>
+          <a:lstStyle/>
+          <a:p>
+            <a:endParaRPr lang="pt-PT"/>
+          </a:p>
+        </p:txBody>
+      </p:sp>
+      <p:sp>
+        <p:nvSpPr>
+          <p:cNvPr id="58" name="CaixaDeTexto 5">
+            <a:extLst>
+              <a:ext uri="{FF2B5EF4-FFF2-40B4-BE49-F238E27FC236}">
+                <a16:creationId xmlns:a16="http://schemas.microsoft.com/office/drawing/2014/main" id="{000EE36B-775F-42E2-7D51-491AAF44DD7D}"/>
+              </a:ext>
+            </a:extLst>
+          </p:cNvPr>
+          <p:cNvSpPr/>
+          <p:nvPr/>
+        </p:nvSpPr>
+        <p:spPr>
+          <a:xfrm>
+            <a:off x="1489680" y="1828800"/>
+            <a:ext cx="9024480" cy="829543"/>
+          </a:xfrm>
+          <a:prstGeom prst="rect">
+            <a:avLst/>
+          </a:prstGeom>
+          <a:noFill/>
+          <a:ln w="0">
+            <a:noFill/>
+          </a:ln>
+        </p:spPr>
+        <p:style>
+          <a:lnRef idx="0">
+            <a:scrgbClr r="0" g="0" b="0"/>
+          </a:lnRef>
+          <a:fillRef idx="0">
+            <a:scrgbClr r="0" g="0" b="0"/>
+          </a:fillRef>
+          <a:effectRef idx="0">
+            <a:scrgbClr r="0" g="0" b="0"/>
+          </a:effectRef>
+          <a:fontRef idx="minor"/>
+        </p:style>
+        <p:txBody>
+          <a:bodyPr vertOverflow="overflow" horzOverflow="overflow" lIns="90000" tIns="45000" rIns="90000" bIns="45000" numCol="1" spcCol="0" anchor="t">
+            <a:spAutoFit/>
+          </a:bodyPr>
+          <a:lstStyle/>
+          <a:p>
+            <a:pPr algn="ctr">
+              <a:lnSpc>
+                <a:spcPct val="100000"/>
+              </a:lnSpc>
+              <a:buNone/>
+            </a:pPr>
+            <a:endParaRPr lang="en-US" sz="2400" b="0" strike="noStrike" spc="-1" dirty="0">
+              <a:latin typeface="Arial"/>
+            </a:endParaRPr>
+          </a:p>
+          <a:p>
+            <a:pPr algn="ctr">
+              <a:lnSpc>
+                <a:spcPct val="100000"/>
+              </a:lnSpc>
+              <a:buNone/>
+            </a:pPr>
+            <a:endParaRPr lang="en-US" sz="2400" b="0" strike="noStrike" spc="-1" dirty="0">
+              <a:latin typeface="Arial"/>
+            </a:endParaRPr>
+          </a:p>
+        </p:txBody>
+      </p:sp>
+      <p:pic>
+        <p:nvPicPr>
+          <p:cNvPr id="59" name="Imagem 3">
+            <a:extLst>
+              <a:ext uri="{FF2B5EF4-FFF2-40B4-BE49-F238E27FC236}">
+                <a16:creationId xmlns:a16="http://schemas.microsoft.com/office/drawing/2014/main" id="{42630B68-09F2-DE78-75F9-2E3190A0CF47}"/>
+              </a:ext>
+            </a:extLst>
+          </p:cNvPr>
+          <p:cNvPicPr/>
+          <p:nvPr/>
+        </p:nvPicPr>
+        <p:blipFill>
+          <a:blip r:embed="rId2"/>
+          <a:stretch/>
+        </p:blipFill>
+        <p:spPr>
+          <a:xfrm>
+            <a:off x="3240" y="6261480"/>
+            <a:ext cx="1236960" cy="709200"/>
+          </a:xfrm>
+          <a:prstGeom prst="rect">
+            <a:avLst/>
+          </a:prstGeom>
+          <a:ln w="0">
+            <a:noFill/>
+          </a:ln>
+        </p:spPr>
+      </p:pic>
+      <p:sp>
+        <p:nvSpPr>
+          <p:cNvPr id="60" name="CaixaDeTexto 1">
+            <a:extLst>
+              <a:ext uri="{FF2B5EF4-FFF2-40B4-BE49-F238E27FC236}">
+                <a16:creationId xmlns:a16="http://schemas.microsoft.com/office/drawing/2014/main" id="{3DB68C47-DD42-7B79-4BC8-37CEC544AD53}"/>
+              </a:ext>
+            </a:extLst>
+          </p:cNvPr>
+          <p:cNvSpPr/>
+          <p:nvPr/>
+        </p:nvSpPr>
+        <p:spPr>
+          <a:xfrm>
+            <a:off x="6629400" y="6362640"/>
+            <a:ext cx="5855760" cy="337100"/>
+          </a:xfrm>
+          <a:prstGeom prst="rect">
+            <a:avLst/>
+          </a:prstGeom>
+          <a:noFill/>
+          <a:ln w="0">
+            <a:noFill/>
+          </a:ln>
+        </p:spPr>
+        <p:style>
+          <a:lnRef idx="0">
+            <a:scrgbClr r="0" g="0" b="0"/>
+          </a:lnRef>
+          <a:fillRef idx="0">
+            <a:scrgbClr r="0" g="0" b="0"/>
+          </a:fillRef>
+          <a:effectRef idx="0">
+            <a:scrgbClr r="0" g="0" b="0"/>
+          </a:effectRef>
+          <a:fontRef idx="minor"/>
+        </p:style>
+        <p:txBody>
+          <a:bodyPr vertOverflow="overflow" horzOverflow="overflow" lIns="90000" tIns="45000" rIns="90000" bIns="45000" numCol="1" spcCol="0" anchor="t">
+            <a:spAutoFit/>
+          </a:bodyPr>
+          <a:lstStyle/>
+          <a:p>
+            <a:pPr>
+              <a:lnSpc>
+                <a:spcPct val="100000"/>
+              </a:lnSpc>
+              <a:buNone/>
+            </a:pPr>
+            <a:r>
+              <a:rPr lang="pt-PT" sz="1600" b="0" strike="noStrike" spc="-1" dirty="0">
+                <a:solidFill>
+                  <a:srgbClr val="FFFFFF"/>
+                </a:solidFill>
+                <a:latin typeface="Calibri"/>
+                <a:ea typeface="DejaVu Sans"/>
+              </a:rPr>
+              <a:t>Bases de Dados – Jogos Olímpicos   |   Parte 2 - Grupo 8</a:t>
+            </a:r>
+            <a:endParaRPr lang="en-US" sz="1600" b="0" strike="noStrike" spc="-1" dirty="0">
+              <a:latin typeface="Arial"/>
+            </a:endParaRPr>
+          </a:p>
+        </p:txBody>
+      </p:sp>
+    </p:spTree>
+    <p:extLst>
+      <p:ext uri="{BB962C8B-B14F-4D97-AF65-F5344CB8AC3E}">
+        <p14:creationId xmlns:p14="http://schemas.microsoft.com/office/powerpoint/2010/main" val="470089919"/>
+      </p:ext>
+    </p:extLst>
+  </p:cSld>
+  <p:clrMapOvr>
+    <a:masterClrMapping/>
+  </p:clrMapOvr>
+</p:sld>
+</file>
+
+<file path=ppt/slides/slide18.xml><?xml version="1.0" encoding="utf-8"?>
 <p:sld xmlns:a="http://schemas.openxmlformats.org/drawingml/2006/main" xmlns:r="http://schemas.openxmlformats.org/officeDocument/2006/relationships" xmlns:p="http://schemas.openxmlformats.org/presentationml/2006/main" show="0">
   <p:cSld>
     <p:spTree>
@@ -7019,66 +8739,6 @@
           </a:p>
         </p:txBody>
       </p:sp>
-      <p:sp>
-        <p:nvSpPr>
-          <p:cNvPr id="58" name="CaixaDeTexto 5"/>
-          <p:cNvSpPr/>
-          <p:nvPr/>
-        </p:nvSpPr>
-        <p:spPr>
-          <a:xfrm>
-            <a:off x="1489680" y="1828800"/>
-            <a:ext cx="9024480" cy="829543"/>
-          </a:xfrm>
-          <a:prstGeom prst="rect">
-            <a:avLst/>
-          </a:prstGeom>
-          <a:noFill/>
-          <a:ln w="0">
-            <a:noFill/>
-          </a:ln>
-        </p:spPr>
-        <p:style>
-          <a:lnRef idx="0">
-            <a:scrgbClr r="0" g="0" b="0"/>
-          </a:lnRef>
-          <a:fillRef idx="0">
-            <a:scrgbClr r="0" g="0" b="0"/>
-          </a:fillRef>
-          <a:effectRef idx="0">
-            <a:scrgbClr r="0" g="0" b="0"/>
-          </a:effectRef>
-          <a:fontRef idx="minor"/>
-        </p:style>
-        <p:txBody>
-          <a:bodyPr vertOverflow="overflow" horzOverflow="overflow" lIns="90000" tIns="45000" rIns="90000" bIns="45000" numCol="1" spcCol="0" anchor="t">
-            <a:spAutoFit/>
-          </a:bodyPr>
-          <a:lstStyle/>
-          <a:p>
-            <a:pPr algn="ctr">
-              <a:lnSpc>
-                <a:spcPct val="100000"/>
-              </a:lnSpc>
-              <a:buNone/>
-            </a:pPr>
-            <a:endParaRPr lang="en-US" sz="2400" b="0" strike="noStrike" spc="-1" dirty="0">
-              <a:latin typeface="Arial"/>
-            </a:endParaRPr>
-          </a:p>
-          <a:p>
-            <a:pPr algn="ctr">
-              <a:lnSpc>
-                <a:spcPct val="100000"/>
-              </a:lnSpc>
-              <a:buNone/>
-            </a:pPr>
-            <a:endParaRPr lang="en-US" sz="2400" b="0" strike="noStrike" spc="-1" dirty="0">
-              <a:latin typeface="Arial"/>
-            </a:endParaRPr>
-          </a:p>
-        </p:txBody>
-      </p:sp>
       <p:pic>
         <p:nvPicPr>
           <p:cNvPr id="59" name="Imagem 3"/>
@@ -7475,7 +9135,7 @@
         <p:cNvPr id="1" name="">
           <a:extLst>
             <a:ext uri="{FF2B5EF4-FFF2-40B4-BE49-F238E27FC236}">
-              <a16:creationId xmlns:a16="http://schemas.microsoft.com/office/drawing/2014/main" id="{307F866C-7FA7-EE65-BADB-B66B7F667A55}"/>
+              <a16:creationId xmlns:a16="http://schemas.microsoft.com/office/drawing/2014/main" id="{55F0B60A-90C2-02B5-B78C-C620608E5C56}"/>
             </a:ext>
           </a:extLst>
         </p:cNvPr>
@@ -7495,7 +9155,7 @@
           <p:cNvPr id="56" name="PlaceHolder 1">
             <a:extLst>
               <a:ext uri="{FF2B5EF4-FFF2-40B4-BE49-F238E27FC236}">
-                <a16:creationId xmlns:a16="http://schemas.microsoft.com/office/drawing/2014/main" id="{D366A124-EF9E-F6D8-3FBC-DACDDB84361F}"/>
+                <a16:creationId xmlns:a16="http://schemas.microsoft.com/office/drawing/2014/main" id="{9AF3B4C5-337F-C61C-7DAB-39F127F964D4}"/>
               </a:ext>
             </a:extLst>
           </p:cNvPr>
@@ -7568,7 +9228,7 @@
           <p:cNvPr id="57" name="Retângulo 4">
             <a:extLst>
               <a:ext uri="{FF2B5EF4-FFF2-40B4-BE49-F238E27FC236}">
-                <a16:creationId xmlns:a16="http://schemas.microsoft.com/office/drawing/2014/main" id="{911C07AA-1CF9-01D3-8FBD-0D770D6351FB}"/>
+                <a16:creationId xmlns:a16="http://schemas.microsoft.com/office/drawing/2014/main" id="{235D3EC9-9C58-C536-EF9E-1A0AEB6EC7C2}"/>
               </a:ext>
             </a:extLst>
           </p:cNvPr>
@@ -7614,12 +9274,41 @@
           </a:p>
         </p:txBody>
       </p:sp>
-      <p:sp>
-        <p:nvSpPr>
-          <p:cNvPr id="58" name="CaixaDeTexto 5">
+      <p:pic>
+        <p:nvPicPr>
+          <p:cNvPr id="59" name="Imagem 3">
             <a:extLst>
               <a:ext uri="{FF2B5EF4-FFF2-40B4-BE49-F238E27FC236}">
-                <a16:creationId xmlns:a16="http://schemas.microsoft.com/office/drawing/2014/main" id="{3A397662-48C6-60DB-7AB8-B1BA4C10564A}"/>
+                <a16:creationId xmlns:a16="http://schemas.microsoft.com/office/drawing/2014/main" id="{ADBD1F41-3ACE-9D23-EE9A-FBB42384D063}"/>
+              </a:ext>
+            </a:extLst>
+          </p:cNvPr>
+          <p:cNvPicPr/>
+          <p:nvPr/>
+        </p:nvPicPr>
+        <p:blipFill>
+          <a:blip r:embed="rId2"/>
+          <a:stretch/>
+        </p:blipFill>
+        <p:spPr>
+          <a:xfrm>
+            <a:off x="3240" y="6261480"/>
+            <a:ext cx="1236960" cy="709200"/>
+          </a:xfrm>
+          <a:prstGeom prst="rect">
+            <a:avLst/>
+          </a:prstGeom>
+          <a:ln w="0">
+            <a:noFill/>
+          </a:ln>
+        </p:spPr>
+      </p:pic>
+      <p:sp>
+        <p:nvSpPr>
+          <p:cNvPr id="60" name="CaixaDeTexto 1">
+            <a:extLst>
+              <a:ext uri="{FF2B5EF4-FFF2-40B4-BE49-F238E27FC236}">
+                <a16:creationId xmlns:a16="http://schemas.microsoft.com/office/drawing/2014/main" id="{89BEDADD-EBD9-7D3C-566F-D0BEE3C45938}"/>
               </a:ext>
             </a:extLst>
           </p:cNvPr>
@@ -7628,8 +9317,8 @@
         </p:nvSpPr>
         <p:spPr>
           <a:xfrm>
-            <a:off x="1489680" y="1828800"/>
-            <a:ext cx="9024480" cy="829543"/>
+            <a:off x="6629400" y="6362640"/>
+            <a:ext cx="5855760" cy="337100"/>
           </a:xfrm>
           <a:prstGeom prst="rect">
             <a:avLst/>
@@ -7657,64 +9346,34 @@
           </a:bodyPr>
           <a:lstStyle/>
           <a:p>
-            <a:pPr algn="ctr">
+            <a:pPr>
               <a:lnSpc>
                 <a:spcPct val="100000"/>
               </a:lnSpc>
               <a:buNone/>
             </a:pPr>
-            <a:endParaRPr lang="en-US" sz="2400" b="0" strike="noStrike" spc="-1" dirty="0">
+            <a:r>
+              <a:rPr lang="pt-PT" sz="1600" b="0" strike="noStrike" spc="-1" dirty="0">
+                <a:solidFill>
+                  <a:srgbClr val="FFFFFF"/>
+                </a:solidFill>
+                <a:latin typeface="Calibri"/>
+                <a:ea typeface="DejaVu Sans"/>
+              </a:rPr>
+              <a:t>Bases de Dados – Jogos Olímpicos   |   Parte 2 - Grupo 8</a:t>
+            </a:r>
+            <a:endParaRPr lang="en-US" sz="1600" b="0" strike="noStrike" spc="-1" dirty="0">
               <a:latin typeface="Arial"/>
             </a:endParaRPr>
           </a:p>
-          <a:p>
-            <a:pPr algn="ctr">
-              <a:lnSpc>
-                <a:spcPct val="100000"/>
-              </a:lnSpc>
-              <a:buNone/>
-            </a:pPr>
-            <a:endParaRPr lang="en-US" sz="2400" b="0" strike="noStrike" spc="-1" dirty="0">
-              <a:latin typeface="Arial"/>
-            </a:endParaRPr>
-          </a:p>
-        </p:txBody>
-      </p:sp>
-      <p:pic>
-        <p:nvPicPr>
-          <p:cNvPr id="59" name="Imagem 3">
+        </p:txBody>
+      </p:sp>
+      <p:sp>
+        <p:nvSpPr>
+          <p:cNvPr id="2" name="CaixaDeTexto 9">
             <a:extLst>
               <a:ext uri="{FF2B5EF4-FFF2-40B4-BE49-F238E27FC236}">
-                <a16:creationId xmlns:a16="http://schemas.microsoft.com/office/drawing/2014/main" id="{C6C4D139-DC0B-58A4-3249-F27D86C031DC}"/>
-              </a:ext>
-            </a:extLst>
-          </p:cNvPr>
-          <p:cNvPicPr/>
-          <p:nvPr/>
-        </p:nvPicPr>
-        <p:blipFill>
-          <a:blip r:embed="rId2"/>
-          <a:stretch/>
-        </p:blipFill>
-        <p:spPr>
-          <a:xfrm>
-            <a:off x="3240" y="6261480"/>
-            <a:ext cx="1236960" cy="709200"/>
-          </a:xfrm>
-          <a:prstGeom prst="rect">
-            <a:avLst/>
-          </a:prstGeom>
-          <a:ln w="0">
-            <a:noFill/>
-          </a:ln>
-        </p:spPr>
-      </p:pic>
-      <p:sp>
-        <p:nvSpPr>
-          <p:cNvPr id="60" name="CaixaDeTexto 1">
-            <a:extLst>
-              <a:ext uri="{FF2B5EF4-FFF2-40B4-BE49-F238E27FC236}">
-                <a16:creationId xmlns:a16="http://schemas.microsoft.com/office/drawing/2014/main" id="{C59B8032-D2A7-8CFC-C9E5-527680FF30B4}"/>
+                <a16:creationId xmlns:a16="http://schemas.microsoft.com/office/drawing/2014/main" id="{6A2A79F4-E176-8041-B83A-C39F5B3D2BF1}"/>
               </a:ext>
             </a:extLst>
           </p:cNvPr>
@@ -7723,8 +9382,8 @@
         </p:nvSpPr>
         <p:spPr>
           <a:xfrm>
-            <a:off x="6629400" y="6362640"/>
-            <a:ext cx="5855760" cy="337100"/>
+            <a:off x="1524060" y="2023284"/>
+            <a:ext cx="9141840" cy="2811432"/>
           </a:xfrm>
           <a:prstGeom prst="rect">
             <a:avLst/>
@@ -7747,37 +9406,109 @@
           <a:fontRef idx="minor"/>
         </p:style>
         <p:txBody>
-          <a:bodyPr vertOverflow="overflow" horzOverflow="overflow" lIns="90000" tIns="45000" rIns="90000" bIns="45000" numCol="1" spcCol="0" anchor="t">
+          <a:bodyPr vertOverflow="overflow" horzOverflow="overflow" wrap="square" lIns="90000" tIns="45000" rIns="90000" bIns="45000" numCol="1" spcCol="0" anchor="t">
             <a:spAutoFit/>
           </a:bodyPr>
           <a:lstStyle/>
           <a:p>
-            <a:pPr>
+            <a:pPr marL="343080" indent="-343080">
               <a:lnSpc>
-                <a:spcPct val="100000"/>
+                <a:spcPct val="150000"/>
               </a:lnSpc>
-              <a:buNone/>
-            </a:pPr>
-            <a:r>
-              <a:rPr lang="pt-PT" sz="1600" b="0" strike="noStrike" spc="-1" dirty="0">
-                <a:solidFill>
-                  <a:srgbClr val="FFFFFF"/>
-                </a:solidFill>
-                <a:latin typeface="Calibri"/>
-                <a:ea typeface="DejaVu Sans"/>
-              </a:rPr>
-              <a:t>Bases de Dados – Jogos Olímpicos   |   Parte 2 - Grupo 8</a:t>
-            </a:r>
-            <a:endParaRPr lang="en-US" sz="1600" b="0" strike="noStrike" spc="-1" dirty="0">
-              <a:latin typeface="Arial"/>
-            </a:endParaRPr>
+              <a:buClr>
+                <a:srgbClr val="000000"/>
+              </a:buClr>
+              <a:buFont typeface="Arial"/>
+              <a:buChar char="•"/>
+            </a:pPr>
+            <a:r>
+              <a:rPr lang="en" sz="2000" spc="-1" dirty="0">
+                <a:solidFill>
+                  <a:srgbClr val="000000"/>
+                </a:solidFill>
+                <a:latin typeface="Consolas"/>
+              </a:rPr>
+              <a:t>A partir deste momento, já podemos começar a inserir as tebelas na base de dados com a instrução: </a:t>
+            </a:r>
+            <a:r>
+              <a:rPr lang="en" sz="2000" b="1" spc="-1" dirty="0">
+                <a:solidFill>
+                  <a:srgbClr val="000000"/>
+                </a:solidFill>
+                <a:latin typeface="Consolas"/>
+              </a:rPr>
+              <a:t>CREATE TABLE</a:t>
+            </a:r>
+          </a:p>
+          <a:p>
+            <a:pPr marL="343080" indent="-343080">
+              <a:lnSpc>
+                <a:spcPct val="150000"/>
+              </a:lnSpc>
+              <a:buClr>
+                <a:srgbClr val="000000"/>
+              </a:buClr>
+              <a:buFont typeface="Arial"/>
+              <a:buChar char="•"/>
+            </a:pPr>
+            <a:r>
+              <a:rPr lang="en" sz="2000" spc="-1" dirty="0">
+                <a:solidFill>
+                  <a:srgbClr val="000000"/>
+                </a:solidFill>
+                <a:latin typeface="Consolas"/>
+              </a:rPr>
+              <a:t>As primeiras tabelas a serem criadas são aquelas que não contem nenhuma chave estrangeira, ou seja:</a:t>
+            </a:r>
+          </a:p>
+          <a:p>
+            <a:pPr marL="800280" lvl="1" indent="-343080">
+              <a:lnSpc>
+                <a:spcPct val="150000"/>
+              </a:lnSpc>
+              <a:buClr>
+                <a:srgbClr val="000000"/>
+              </a:buClr>
+              <a:buFont typeface="Arial"/>
+              <a:buChar char="•"/>
+            </a:pPr>
+            <a:r>
+              <a:rPr lang="en" sz="2000" spc="-1" dirty="0">
+                <a:solidFill>
+                  <a:srgbClr val="000000"/>
+                </a:solidFill>
+                <a:latin typeface="Consolas"/>
+              </a:rPr>
+              <a:t>Competição</a:t>
+            </a:r>
+          </a:p>
+          <a:p>
+            <a:pPr marL="800280" lvl="1" indent="-343080">
+              <a:lnSpc>
+                <a:spcPct val="150000"/>
+              </a:lnSpc>
+              <a:buClr>
+                <a:srgbClr val="000000"/>
+              </a:buClr>
+              <a:buFont typeface="Arial"/>
+              <a:buChar char="•"/>
+            </a:pPr>
+            <a:r>
+              <a:rPr lang="en" sz="2000" spc="-1" dirty="0">
+                <a:solidFill>
+                  <a:srgbClr val="000000"/>
+                </a:solidFill>
+                <a:latin typeface="Consolas"/>
+              </a:rPr>
+              <a:t>Tipo</a:t>
+            </a:r>
           </a:p>
         </p:txBody>
       </p:sp>
     </p:spTree>
     <p:extLst>
       <p:ext uri="{BB962C8B-B14F-4D97-AF65-F5344CB8AC3E}">
-        <p14:creationId xmlns:p14="http://schemas.microsoft.com/office/powerpoint/2010/main" val="3779937618"/>
+        <p14:creationId xmlns:p14="http://schemas.microsoft.com/office/powerpoint/2010/main" val="1435271720"/>
       </p:ext>
     </p:extLst>
   </p:cSld>
@@ -7788,6 +9519,752 @@
 </file>
 
 <file path=ppt/slides/slide7.xml><?xml version="1.0" encoding="utf-8"?>
+<p:sld xmlns:a="http://schemas.openxmlformats.org/drawingml/2006/main" xmlns:r="http://schemas.openxmlformats.org/officeDocument/2006/relationships" xmlns:p="http://schemas.openxmlformats.org/presentationml/2006/main" show="0">
+  <p:cSld>
+    <p:spTree>
+      <p:nvGrpSpPr>
+        <p:cNvPr id="1" name="">
+          <a:extLst>
+            <a:ext uri="{FF2B5EF4-FFF2-40B4-BE49-F238E27FC236}">
+              <a16:creationId xmlns:a16="http://schemas.microsoft.com/office/drawing/2014/main" id="{9F5C86EE-B43B-167F-11A1-3E563A4F975C}"/>
+            </a:ext>
+          </a:extLst>
+        </p:cNvPr>
+        <p:cNvGrpSpPr/>
+        <p:nvPr/>
+      </p:nvGrpSpPr>
+      <p:grpSpPr>
+        <a:xfrm>
+          <a:off x="0" y="0"/>
+          <a:ext cx="0" cy="0"/>
+          <a:chOff x="0" y="0"/>
+          <a:chExt cx="0" cy="0"/>
+        </a:xfrm>
+      </p:grpSpPr>
+      <p:sp>
+        <p:nvSpPr>
+          <p:cNvPr id="56" name="PlaceHolder 1">
+            <a:extLst>
+              <a:ext uri="{FF2B5EF4-FFF2-40B4-BE49-F238E27FC236}">
+                <a16:creationId xmlns:a16="http://schemas.microsoft.com/office/drawing/2014/main" id="{1420C69D-327C-A3E5-ABF2-41968D950D74}"/>
+              </a:ext>
+            </a:extLst>
+          </p:cNvPr>
+          <p:cNvSpPr>
+            <a:spLocks noGrp="1"/>
+          </p:cNvSpPr>
+          <p:nvPr>
+            <p:ph type="title"/>
+          </p:nvPr>
+        </p:nvSpPr>
+        <p:spPr>
+          <a:xfrm>
+            <a:off x="1525680" y="275040"/>
+            <a:ext cx="9141840" cy="1153080"/>
+          </a:xfrm>
+          <a:prstGeom prst="rect">
+            <a:avLst/>
+          </a:prstGeom>
+          <a:noFill/>
+          <a:ln w="0">
+            <a:noFill/>
+          </a:ln>
+        </p:spPr>
+        <p:txBody>
+          <a:bodyPr lIns="0" tIns="0" rIns="0" bIns="0" anchor="b">
+            <a:noAutofit/>
+          </a:bodyPr>
+          <a:lstStyle/>
+          <a:p>
+            <a:pPr algn="ctr">
+              <a:lnSpc>
+                <a:spcPct val="90000"/>
+              </a:lnSpc>
+              <a:buNone/>
+            </a:pPr>
+            <a:r>
+              <a:rPr lang="pt-PT" sz="4000" b="0" strike="noStrike" spc="-1" dirty="0">
+                <a:solidFill>
+                  <a:srgbClr val="870F11"/>
+                </a:solidFill>
+                <a:latin typeface="Calibri"/>
+              </a:rPr>
+              <a:t>Apresentação e explicação da</a:t>
+            </a:r>
+            <a:br>
+              <a:rPr lang="pt-PT" sz="4000" b="0" strike="noStrike" spc="-1" dirty="0">
+                <a:solidFill>
+                  <a:srgbClr val="870F11"/>
+                </a:solidFill>
+                <a:latin typeface="Calibri"/>
+              </a:rPr>
+            </a:br>
+            <a:r>
+              <a:rPr lang="pt-PT" sz="4000" b="0" strike="noStrike" spc="-1" dirty="0">
+                <a:solidFill>
+                  <a:srgbClr val="870F11"/>
+                </a:solidFill>
+                <a:latin typeface="Calibri"/>
+              </a:rPr>
+              <a:t>base de dados implementada</a:t>
+            </a:r>
+            <a:endParaRPr lang="en-US" sz="4000" b="0" strike="noStrike" spc="-1" dirty="0">
+              <a:latin typeface="Arial"/>
+            </a:endParaRPr>
+          </a:p>
+        </p:txBody>
+      </p:sp>
+      <p:sp>
+        <p:nvSpPr>
+          <p:cNvPr id="57" name="Retângulo 4">
+            <a:extLst>
+              <a:ext uri="{FF2B5EF4-FFF2-40B4-BE49-F238E27FC236}">
+                <a16:creationId xmlns:a16="http://schemas.microsoft.com/office/drawing/2014/main" id="{08600912-DECF-2B3B-524F-A9F506F23944}"/>
+              </a:ext>
+            </a:extLst>
+          </p:cNvPr>
+          <p:cNvSpPr/>
+          <p:nvPr/>
+        </p:nvSpPr>
+        <p:spPr>
+          <a:xfrm>
+            <a:off x="0" y="6233760"/>
+            <a:ext cx="12189960" cy="622080"/>
+          </a:xfrm>
+          <a:prstGeom prst="rect">
+            <a:avLst/>
+          </a:prstGeom>
+          <a:solidFill>
+            <a:srgbClr val="870F11"/>
+          </a:solidFill>
+          <a:ln>
+            <a:solidFill>
+              <a:srgbClr val="870F11"/>
+            </a:solidFill>
+          </a:ln>
+        </p:spPr>
+        <p:style>
+          <a:lnRef idx="2">
+            <a:schemeClr val="accent1">
+              <a:shade val="50000"/>
+            </a:schemeClr>
+          </a:lnRef>
+          <a:fillRef idx="1">
+            <a:schemeClr val="accent1"/>
+          </a:fillRef>
+          <a:effectRef idx="0">
+            <a:schemeClr val="accent1"/>
+          </a:effectRef>
+          <a:fontRef idx="minor"/>
+        </p:style>
+        <p:txBody>
+          <a:bodyPr/>
+          <a:lstStyle/>
+          <a:p>
+            <a:endParaRPr lang="pt-PT"/>
+          </a:p>
+        </p:txBody>
+      </p:sp>
+      <p:pic>
+        <p:nvPicPr>
+          <p:cNvPr id="59" name="Imagem 3">
+            <a:extLst>
+              <a:ext uri="{FF2B5EF4-FFF2-40B4-BE49-F238E27FC236}">
+                <a16:creationId xmlns:a16="http://schemas.microsoft.com/office/drawing/2014/main" id="{4BAFF717-5419-96CD-DB10-A6EFCCEF8A44}"/>
+              </a:ext>
+            </a:extLst>
+          </p:cNvPr>
+          <p:cNvPicPr/>
+          <p:nvPr/>
+        </p:nvPicPr>
+        <p:blipFill>
+          <a:blip r:embed="rId2"/>
+          <a:stretch/>
+        </p:blipFill>
+        <p:spPr>
+          <a:xfrm>
+            <a:off x="3240" y="6261480"/>
+            <a:ext cx="1236960" cy="709200"/>
+          </a:xfrm>
+          <a:prstGeom prst="rect">
+            <a:avLst/>
+          </a:prstGeom>
+          <a:ln w="0">
+            <a:noFill/>
+          </a:ln>
+        </p:spPr>
+      </p:pic>
+      <p:sp>
+        <p:nvSpPr>
+          <p:cNvPr id="60" name="CaixaDeTexto 1">
+            <a:extLst>
+              <a:ext uri="{FF2B5EF4-FFF2-40B4-BE49-F238E27FC236}">
+                <a16:creationId xmlns:a16="http://schemas.microsoft.com/office/drawing/2014/main" id="{8623AE10-6F91-24E6-F3C8-DC071E8F0B33}"/>
+              </a:ext>
+            </a:extLst>
+          </p:cNvPr>
+          <p:cNvSpPr/>
+          <p:nvPr/>
+        </p:nvSpPr>
+        <p:spPr>
+          <a:xfrm>
+            <a:off x="6629400" y="6362640"/>
+            <a:ext cx="5855760" cy="337100"/>
+          </a:xfrm>
+          <a:prstGeom prst="rect">
+            <a:avLst/>
+          </a:prstGeom>
+          <a:noFill/>
+          <a:ln w="0">
+            <a:noFill/>
+          </a:ln>
+        </p:spPr>
+        <p:style>
+          <a:lnRef idx="0">
+            <a:scrgbClr r="0" g="0" b="0"/>
+          </a:lnRef>
+          <a:fillRef idx="0">
+            <a:scrgbClr r="0" g="0" b="0"/>
+          </a:fillRef>
+          <a:effectRef idx="0">
+            <a:scrgbClr r="0" g="0" b="0"/>
+          </a:effectRef>
+          <a:fontRef idx="minor"/>
+        </p:style>
+        <p:txBody>
+          <a:bodyPr vertOverflow="overflow" horzOverflow="overflow" lIns="90000" tIns="45000" rIns="90000" bIns="45000" numCol="1" spcCol="0" anchor="t">
+            <a:spAutoFit/>
+          </a:bodyPr>
+          <a:lstStyle/>
+          <a:p>
+            <a:pPr>
+              <a:lnSpc>
+                <a:spcPct val="100000"/>
+              </a:lnSpc>
+              <a:buNone/>
+            </a:pPr>
+            <a:r>
+              <a:rPr lang="pt-PT" sz="1600" b="0" strike="noStrike" spc="-1" dirty="0">
+                <a:solidFill>
+                  <a:srgbClr val="FFFFFF"/>
+                </a:solidFill>
+                <a:latin typeface="Calibri"/>
+                <a:ea typeface="DejaVu Sans"/>
+              </a:rPr>
+              <a:t>Bases de Dados – Jogos Olímpicos   |   Parte 2 - Grupo 8</a:t>
+            </a:r>
+            <a:endParaRPr lang="en-US" sz="1600" b="0" strike="noStrike" spc="-1" dirty="0">
+              <a:latin typeface="Arial"/>
+            </a:endParaRPr>
+          </a:p>
+        </p:txBody>
+      </p:sp>
+      <p:pic>
+        <p:nvPicPr>
+          <p:cNvPr id="2050" name="Picture 2">
+            <a:extLst>
+              <a:ext uri="{FF2B5EF4-FFF2-40B4-BE49-F238E27FC236}">
+                <a16:creationId xmlns:a16="http://schemas.microsoft.com/office/drawing/2014/main" id="{0805E91B-AB55-B2BD-0558-6D0040F4AA51}"/>
+              </a:ext>
+            </a:extLst>
+          </p:cNvPr>
+          <p:cNvPicPr>
+            <a:picLocks noChangeAspect="1" noChangeArrowheads="1"/>
+          </p:cNvPicPr>
+          <p:nvPr/>
+        </p:nvPicPr>
+        <p:blipFill>
+          <a:blip r:embed="rId3">
+            <a:extLst>
+              <a:ext uri="{28A0092B-C50C-407E-A947-70E740481C1C}">
+                <a14:useLocalDpi xmlns:a14="http://schemas.microsoft.com/office/drawing/2010/main" val="0"/>
+              </a:ext>
+            </a:extLst>
+          </a:blip>
+          <a:srcRect l="-23" t="-37" r="1476" b="-37"/>
+          <a:stretch>
+            <a:fillRect/>
+          </a:stretch>
+        </p:blipFill>
+        <p:spPr bwMode="auto">
+          <a:xfrm>
+            <a:off x="6012018" y="2126754"/>
+            <a:ext cx="4655502" cy="2780964"/>
+          </a:xfrm>
+          <a:prstGeom prst="rect">
+            <a:avLst/>
+          </a:prstGeom>
+          <a:ln w="38100" cap="sq">
+            <a:solidFill>
+              <a:srgbClr val="000000"/>
+            </a:solidFill>
+            <a:prstDash val="solid"/>
+            <a:miter lim="800000"/>
+          </a:ln>
+          <a:effectLst>
+            <a:outerShdw blurRad="50800" dist="38100" dir="2700000" algn="tl" rotWithShape="0">
+              <a:srgbClr val="000000">
+                <a:alpha val="43000"/>
+              </a:srgbClr>
+            </a:outerShdw>
+          </a:effectLst>
+          <a:extLst>
+            <a:ext uri="{91240B29-F687-4F45-9708-019B960494DF}">
+              <a14:hiddenLine xmlns:a14="http://schemas.microsoft.com/office/drawing/2010/main" w="9525">
+                <a:solidFill>
+                  <a:srgbClr val="000000"/>
+                </a:solidFill>
+                <a:miter lim="800000"/>
+                <a:headEnd/>
+                <a:tailEnd/>
+              </a14:hiddenLine>
+            </a:ext>
+          </a:extLst>
+        </p:spPr>
+      </p:pic>
+      <p:pic>
+        <p:nvPicPr>
+          <p:cNvPr id="2052" name="Picture 4">
+            <a:extLst>
+              <a:ext uri="{FF2B5EF4-FFF2-40B4-BE49-F238E27FC236}">
+                <a16:creationId xmlns:a16="http://schemas.microsoft.com/office/drawing/2014/main" id="{022E5746-6B2B-C9FE-96C1-241E89DE4E31}"/>
+              </a:ext>
+            </a:extLst>
+          </p:cNvPr>
+          <p:cNvPicPr>
+            <a:picLocks noChangeAspect="1" noChangeArrowheads="1"/>
+          </p:cNvPicPr>
+          <p:nvPr/>
+        </p:nvPicPr>
+        <p:blipFill>
+          <a:blip r:embed="rId4">
+            <a:extLst>
+              <a:ext uri="{28A0092B-C50C-407E-A947-70E740481C1C}">
+                <a14:useLocalDpi xmlns:a14="http://schemas.microsoft.com/office/drawing/2010/main" val="0"/>
+              </a:ext>
+            </a:extLst>
+          </a:blip>
+          <a:srcRect l="-50" t="-38" r="-50" b="-38"/>
+          <a:stretch>
+            <a:fillRect/>
+          </a:stretch>
+        </p:blipFill>
+        <p:spPr bwMode="auto">
+          <a:xfrm>
+            <a:off x="1240200" y="1706886"/>
+            <a:ext cx="2760300" cy="3620700"/>
+          </a:xfrm>
+          <a:prstGeom prst="rect">
+            <a:avLst/>
+          </a:prstGeom>
+          <a:ln w="38100" cap="sq">
+            <a:solidFill>
+              <a:srgbClr val="000000"/>
+            </a:solidFill>
+            <a:prstDash val="solid"/>
+            <a:miter lim="800000"/>
+          </a:ln>
+          <a:effectLst>
+            <a:outerShdw blurRad="50800" dist="38100" dir="2700000" algn="tl" rotWithShape="0">
+              <a:srgbClr val="000000">
+                <a:alpha val="43000"/>
+              </a:srgbClr>
+            </a:outerShdw>
+          </a:effectLst>
+          <a:extLst>
+            <a:ext uri="{91240B29-F687-4F45-9708-019B960494DF}">
+              <a14:hiddenLine xmlns:a14="http://schemas.microsoft.com/office/drawing/2010/main" w="9525">
+                <a:solidFill>
+                  <a:srgbClr val="000000"/>
+                </a:solidFill>
+                <a:miter lim="800000"/>
+                <a:headEnd/>
+                <a:tailEnd/>
+              </a14:hiddenLine>
+            </a:ext>
+          </a:extLst>
+        </p:spPr>
+      </p:pic>
+    </p:spTree>
+    <p:extLst>
+      <p:ext uri="{BB962C8B-B14F-4D97-AF65-F5344CB8AC3E}">
+        <p14:creationId xmlns:p14="http://schemas.microsoft.com/office/powerpoint/2010/main" val="943133234"/>
+      </p:ext>
+    </p:extLst>
+  </p:cSld>
+  <p:clrMapOvr>
+    <a:masterClrMapping/>
+  </p:clrMapOvr>
+</p:sld>
+</file>
+
+<file path=ppt/slides/slide8.xml><?xml version="1.0" encoding="utf-8"?>
+<p:sld xmlns:a="http://schemas.openxmlformats.org/drawingml/2006/main" xmlns:r="http://schemas.openxmlformats.org/officeDocument/2006/relationships" xmlns:p="http://schemas.openxmlformats.org/presentationml/2006/main" show="0">
+  <p:cSld>
+    <p:spTree>
+      <p:nvGrpSpPr>
+        <p:cNvPr id="1" name="">
+          <a:extLst>
+            <a:ext uri="{FF2B5EF4-FFF2-40B4-BE49-F238E27FC236}">
+              <a16:creationId xmlns:a16="http://schemas.microsoft.com/office/drawing/2014/main" id="{E4F80E4E-564B-0EB7-948D-DA5F14842AE3}"/>
+            </a:ext>
+          </a:extLst>
+        </p:cNvPr>
+        <p:cNvGrpSpPr/>
+        <p:nvPr/>
+      </p:nvGrpSpPr>
+      <p:grpSpPr>
+        <a:xfrm>
+          <a:off x="0" y="0"/>
+          <a:ext cx="0" cy="0"/>
+          <a:chOff x="0" y="0"/>
+          <a:chExt cx="0" cy="0"/>
+        </a:xfrm>
+      </p:grpSpPr>
+      <p:sp>
+        <p:nvSpPr>
+          <p:cNvPr id="56" name="PlaceHolder 1">
+            <a:extLst>
+              <a:ext uri="{FF2B5EF4-FFF2-40B4-BE49-F238E27FC236}">
+                <a16:creationId xmlns:a16="http://schemas.microsoft.com/office/drawing/2014/main" id="{7FB47C38-40E4-DCA8-482E-CCBB62FA02A6}"/>
+              </a:ext>
+            </a:extLst>
+          </p:cNvPr>
+          <p:cNvSpPr>
+            <a:spLocks noGrp="1"/>
+          </p:cNvSpPr>
+          <p:nvPr>
+            <p:ph type="title"/>
+          </p:nvPr>
+        </p:nvSpPr>
+        <p:spPr>
+          <a:xfrm>
+            <a:off x="1525680" y="275040"/>
+            <a:ext cx="9141840" cy="1153080"/>
+          </a:xfrm>
+          <a:prstGeom prst="rect">
+            <a:avLst/>
+          </a:prstGeom>
+          <a:noFill/>
+          <a:ln w="0">
+            <a:noFill/>
+          </a:ln>
+        </p:spPr>
+        <p:txBody>
+          <a:bodyPr lIns="0" tIns="0" rIns="0" bIns="0" anchor="b">
+            <a:noAutofit/>
+          </a:bodyPr>
+          <a:lstStyle/>
+          <a:p>
+            <a:pPr algn="ctr">
+              <a:lnSpc>
+                <a:spcPct val="90000"/>
+              </a:lnSpc>
+              <a:buNone/>
+            </a:pPr>
+            <a:r>
+              <a:rPr lang="pt-PT" sz="4000" b="0" strike="noStrike" spc="-1" dirty="0">
+                <a:solidFill>
+                  <a:srgbClr val="870F11"/>
+                </a:solidFill>
+                <a:latin typeface="Calibri"/>
+              </a:rPr>
+              <a:t>Apresentação e explicação da</a:t>
+            </a:r>
+            <a:br>
+              <a:rPr lang="pt-PT" sz="4000" b="0" strike="noStrike" spc="-1" dirty="0">
+                <a:solidFill>
+                  <a:srgbClr val="870F11"/>
+                </a:solidFill>
+                <a:latin typeface="Calibri"/>
+              </a:rPr>
+            </a:br>
+            <a:r>
+              <a:rPr lang="pt-PT" sz="4000" b="0" strike="noStrike" spc="-1" dirty="0">
+                <a:solidFill>
+                  <a:srgbClr val="870F11"/>
+                </a:solidFill>
+                <a:latin typeface="Calibri"/>
+              </a:rPr>
+              <a:t>base de dados implementada</a:t>
+            </a:r>
+            <a:endParaRPr lang="en-US" sz="4000" b="0" strike="noStrike" spc="-1" dirty="0">
+              <a:latin typeface="Arial"/>
+            </a:endParaRPr>
+          </a:p>
+        </p:txBody>
+      </p:sp>
+      <p:sp>
+        <p:nvSpPr>
+          <p:cNvPr id="57" name="Retângulo 4">
+            <a:extLst>
+              <a:ext uri="{FF2B5EF4-FFF2-40B4-BE49-F238E27FC236}">
+                <a16:creationId xmlns:a16="http://schemas.microsoft.com/office/drawing/2014/main" id="{3D14162F-2C19-F694-F576-ED7D3598266C}"/>
+              </a:ext>
+            </a:extLst>
+          </p:cNvPr>
+          <p:cNvSpPr/>
+          <p:nvPr/>
+        </p:nvSpPr>
+        <p:spPr>
+          <a:xfrm>
+            <a:off x="0" y="6233760"/>
+            <a:ext cx="12189960" cy="622080"/>
+          </a:xfrm>
+          <a:prstGeom prst="rect">
+            <a:avLst/>
+          </a:prstGeom>
+          <a:solidFill>
+            <a:srgbClr val="870F11"/>
+          </a:solidFill>
+          <a:ln>
+            <a:solidFill>
+              <a:srgbClr val="870F11"/>
+            </a:solidFill>
+          </a:ln>
+        </p:spPr>
+        <p:style>
+          <a:lnRef idx="2">
+            <a:schemeClr val="accent1">
+              <a:shade val="50000"/>
+            </a:schemeClr>
+          </a:lnRef>
+          <a:fillRef idx="1">
+            <a:schemeClr val="accent1"/>
+          </a:fillRef>
+          <a:effectRef idx="0">
+            <a:schemeClr val="accent1"/>
+          </a:effectRef>
+          <a:fontRef idx="minor"/>
+        </p:style>
+        <p:txBody>
+          <a:bodyPr/>
+          <a:lstStyle/>
+          <a:p>
+            <a:endParaRPr lang="pt-PT"/>
+          </a:p>
+        </p:txBody>
+      </p:sp>
+      <p:pic>
+        <p:nvPicPr>
+          <p:cNvPr id="59" name="Imagem 3">
+            <a:extLst>
+              <a:ext uri="{FF2B5EF4-FFF2-40B4-BE49-F238E27FC236}">
+                <a16:creationId xmlns:a16="http://schemas.microsoft.com/office/drawing/2014/main" id="{734D3820-1A39-C8FE-B10D-BDC7D9F8FC7A}"/>
+              </a:ext>
+            </a:extLst>
+          </p:cNvPr>
+          <p:cNvPicPr/>
+          <p:nvPr/>
+        </p:nvPicPr>
+        <p:blipFill>
+          <a:blip r:embed="rId2"/>
+          <a:stretch/>
+        </p:blipFill>
+        <p:spPr>
+          <a:xfrm>
+            <a:off x="3240" y="6261480"/>
+            <a:ext cx="1236960" cy="709200"/>
+          </a:xfrm>
+          <a:prstGeom prst="rect">
+            <a:avLst/>
+          </a:prstGeom>
+          <a:ln w="0">
+            <a:noFill/>
+          </a:ln>
+        </p:spPr>
+      </p:pic>
+      <p:sp>
+        <p:nvSpPr>
+          <p:cNvPr id="60" name="CaixaDeTexto 1">
+            <a:extLst>
+              <a:ext uri="{FF2B5EF4-FFF2-40B4-BE49-F238E27FC236}">
+                <a16:creationId xmlns:a16="http://schemas.microsoft.com/office/drawing/2014/main" id="{F3F402BD-F8EA-AA3C-7D41-9BBA6DB63166}"/>
+              </a:ext>
+            </a:extLst>
+          </p:cNvPr>
+          <p:cNvSpPr/>
+          <p:nvPr/>
+        </p:nvSpPr>
+        <p:spPr>
+          <a:xfrm>
+            <a:off x="6629400" y="6362640"/>
+            <a:ext cx="5855760" cy="337100"/>
+          </a:xfrm>
+          <a:prstGeom prst="rect">
+            <a:avLst/>
+          </a:prstGeom>
+          <a:noFill/>
+          <a:ln w="0">
+            <a:noFill/>
+          </a:ln>
+        </p:spPr>
+        <p:style>
+          <a:lnRef idx="0">
+            <a:scrgbClr r="0" g="0" b="0"/>
+          </a:lnRef>
+          <a:fillRef idx="0">
+            <a:scrgbClr r="0" g="0" b="0"/>
+          </a:fillRef>
+          <a:effectRef idx="0">
+            <a:scrgbClr r="0" g="0" b="0"/>
+          </a:effectRef>
+          <a:fontRef idx="minor"/>
+        </p:style>
+        <p:txBody>
+          <a:bodyPr vertOverflow="overflow" horzOverflow="overflow" lIns="90000" tIns="45000" rIns="90000" bIns="45000" numCol="1" spcCol="0" anchor="t">
+            <a:spAutoFit/>
+          </a:bodyPr>
+          <a:lstStyle/>
+          <a:p>
+            <a:pPr>
+              <a:lnSpc>
+                <a:spcPct val="100000"/>
+              </a:lnSpc>
+              <a:buNone/>
+            </a:pPr>
+            <a:r>
+              <a:rPr lang="pt-PT" sz="1600" b="0" strike="noStrike" spc="-1" dirty="0">
+                <a:solidFill>
+                  <a:srgbClr val="FFFFFF"/>
+                </a:solidFill>
+                <a:latin typeface="Calibri"/>
+                <a:ea typeface="DejaVu Sans"/>
+              </a:rPr>
+              <a:t>Bases de Dados – Jogos Olímpicos   |   Parte 2 - Grupo 8</a:t>
+            </a:r>
+            <a:endParaRPr lang="en-US" sz="1600" b="0" strike="noStrike" spc="-1" dirty="0">
+              <a:latin typeface="Arial"/>
+            </a:endParaRPr>
+          </a:p>
+        </p:txBody>
+      </p:sp>
+      <p:pic>
+        <p:nvPicPr>
+          <p:cNvPr id="2051" name="Picture 3">
+            <a:extLst>
+              <a:ext uri="{FF2B5EF4-FFF2-40B4-BE49-F238E27FC236}">
+                <a16:creationId xmlns:a16="http://schemas.microsoft.com/office/drawing/2014/main" id="{54B4D73C-2D43-B9C4-9ABB-FF73BB90C11D}"/>
+              </a:ext>
+            </a:extLst>
+          </p:cNvPr>
+          <p:cNvPicPr>
+            <a:picLocks noChangeAspect="1" noChangeArrowheads="1"/>
+          </p:cNvPicPr>
+          <p:nvPr/>
+        </p:nvPicPr>
+        <p:blipFill>
+          <a:blip r:embed="rId3">
+            <a:extLst>
+              <a:ext uri="{28A0092B-C50C-407E-A947-70E740481C1C}">
+                <a14:useLocalDpi xmlns:a14="http://schemas.microsoft.com/office/drawing/2010/main" val="0"/>
+              </a:ext>
+            </a:extLst>
+          </a:blip>
+          <a:srcRect l="3760" t="-64" r="2447" b="-64"/>
+          <a:stretch/>
+        </p:blipFill>
+        <p:spPr bwMode="auto">
+          <a:xfrm>
+            <a:off x="4963886" y="2038518"/>
+            <a:ext cx="6384471" cy="2780964"/>
+          </a:xfrm>
+          <a:prstGeom prst="rect">
+            <a:avLst/>
+          </a:prstGeom>
+          <a:ln w="38100" cap="sq">
+            <a:solidFill>
+              <a:srgbClr val="000000"/>
+            </a:solidFill>
+            <a:prstDash val="solid"/>
+            <a:miter lim="800000"/>
+          </a:ln>
+          <a:effectLst>
+            <a:outerShdw blurRad="50800" dist="38100" dir="2700000" algn="tl" rotWithShape="0">
+              <a:srgbClr val="000000">
+                <a:alpha val="43000"/>
+              </a:srgbClr>
+            </a:outerShdw>
+          </a:effectLst>
+        </p:spPr>
+      </p:pic>
+      <p:pic>
+        <p:nvPicPr>
+          <p:cNvPr id="3074" name="Picture 2">
+            <a:extLst>
+              <a:ext uri="{FF2B5EF4-FFF2-40B4-BE49-F238E27FC236}">
+                <a16:creationId xmlns:a16="http://schemas.microsoft.com/office/drawing/2014/main" id="{FE98F254-3DD4-006B-593C-518DFC11C9FB}"/>
+              </a:ext>
+            </a:extLst>
+          </p:cNvPr>
+          <p:cNvPicPr>
+            <a:picLocks noChangeAspect="1" noChangeArrowheads="1"/>
+          </p:cNvPicPr>
+          <p:nvPr/>
+        </p:nvPicPr>
+        <p:blipFill>
+          <a:blip r:embed="rId4">
+            <a:extLst>
+              <a:ext uri="{28A0092B-C50C-407E-A947-70E740481C1C}">
+                <a14:useLocalDpi xmlns:a14="http://schemas.microsoft.com/office/drawing/2010/main" val="0"/>
+              </a:ext>
+            </a:extLst>
+          </a:blip>
+          <a:srcRect l="-44" t="-64" r="-44" b="-64"/>
+          <a:stretch>
+            <a:fillRect/>
+          </a:stretch>
+        </p:blipFill>
+        <p:spPr bwMode="auto">
+          <a:xfrm>
+            <a:off x="1240200" y="2521487"/>
+            <a:ext cx="2629873" cy="1815025"/>
+          </a:xfrm>
+          <a:prstGeom prst="rect">
+            <a:avLst/>
+          </a:prstGeom>
+          <a:ln w="38100" cap="sq">
+            <a:solidFill>
+              <a:srgbClr val="000000"/>
+            </a:solidFill>
+            <a:prstDash val="solid"/>
+            <a:miter lim="800000"/>
+          </a:ln>
+          <a:effectLst>
+            <a:outerShdw blurRad="50800" dist="38100" dir="2700000" algn="tl" rotWithShape="0">
+              <a:srgbClr val="000000">
+                <a:alpha val="43000"/>
+              </a:srgbClr>
+            </a:outerShdw>
+          </a:effectLst>
+          <a:extLst>
+            <a:ext uri="{91240B29-F687-4F45-9708-019B960494DF}">
+              <a14:hiddenLine xmlns:a14="http://schemas.microsoft.com/office/drawing/2010/main" w="9525">
+                <a:solidFill>
+                  <a:srgbClr val="000000"/>
+                </a:solidFill>
+                <a:miter lim="800000"/>
+                <a:headEnd/>
+                <a:tailEnd/>
+              </a14:hiddenLine>
+            </a:ext>
+          </a:extLst>
+        </p:spPr>
+      </p:pic>
+    </p:spTree>
+    <p:extLst>
+      <p:ext uri="{BB962C8B-B14F-4D97-AF65-F5344CB8AC3E}">
+        <p14:creationId xmlns:p14="http://schemas.microsoft.com/office/powerpoint/2010/main" val="870610295"/>
+      </p:ext>
+    </p:extLst>
+  </p:cSld>
+  <p:clrMapOvr>
+    <a:masterClrMapping/>
+  </p:clrMapOvr>
+</p:sld>
+</file>
+
+<file path=ppt/slides/slide9.xml><?xml version="1.0" encoding="utf-8"?>
 <p:sld xmlns:a="http://schemas.openxmlformats.org/drawingml/2006/main" xmlns:r="http://schemas.openxmlformats.org/officeDocument/2006/relationships" xmlns:p="http://schemas.openxmlformats.org/presentationml/2006/main" show="0">
   <p:cSld>
     <p:spTree>
@@ -8094,121 +10571,12 @@
           </a:p>
         </p:txBody>
       </p:sp>
-    </p:spTree>
-    <p:extLst>
-      <p:ext uri="{BB962C8B-B14F-4D97-AF65-F5344CB8AC3E}">
-        <p14:creationId xmlns:p14="http://schemas.microsoft.com/office/powerpoint/2010/main" val="367112552"/>
-      </p:ext>
-    </p:extLst>
-  </p:cSld>
-  <p:clrMapOvr>
-    <a:masterClrMapping/>
-  </p:clrMapOvr>
-</p:sld>
-</file>
-
-<file path=ppt/slides/slide8.xml><?xml version="1.0" encoding="utf-8"?>
-<p:sld xmlns:a="http://schemas.openxmlformats.org/drawingml/2006/main" xmlns:r="http://schemas.openxmlformats.org/officeDocument/2006/relationships" xmlns:p="http://schemas.openxmlformats.org/presentationml/2006/main" show="0">
-  <p:cSld>
-    <p:spTree>
-      <p:nvGrpSpPr>
-        <p:cNvPr id="1" name="">
-          <a:extLst>
-            <a:ext uri="{FF2B5EF4-FFF2-40B4-BE49-F238E27FC236}">
-              <a16:creationId xmlns:a16="http://schemas.microsoft.com/office/drawing/2014/main" id="{7B180201-034C-1E18-AE26-1BE75942B17B}"/>
-            </a:ext>
-          </a:extLst>
-        </p:cNvPr>
-        <p:cNvGrpSpPr/>
-        <p:nvPr/>
-      </p:nvGrpSpPr>
-      <p:grpSpPr>
-        <a:xfrm>
-          <a:off x="0" y="0"/>
-          <a:ext cx="0" cy="0"/>
-          <a:chOff x="0" y="0"/>
-          <a:chExt cx="0" cy="0"/>
-        </a:xfrm>
-      </p:grpSpPr>
-      <p:sp>
-        <p:nvSpPr>
-          <p:cNvPr id="56" name="PlaceHolder 1">
+      <p:sp>
+        <p:nvSpPr>
+          <p:cNvPr id="2" name="CaixaDeTexto 9">
             <a:extLst>
               <a:ext uri="{FF2B5EF4-FFF2-40B4-BE49-F238E27FC236}">
-                <a16:creationId xmlns:a16="http://schemas.microsoft.com/office/drawing/2014/main" id="{E659F661-99C9-E2F3-F8A2-C7D5E6EF32A9}"/>
-              </a:ext>
-            </a:extLst>
-          </p:cNvPr>
-          <p:cNvSpPr>
-            <a:spLocks noGrp="1"/>
-          </p:cNvSpPr>
-          <p:nvPr>
-            <p:ph type="title"/>
-          </p:nvPr>
-        </p:nvSpPr>
-        <p:spPr>
-          <a:xfrm>
-            <a:off x="1525680" y="275040"/>
-            <a:ext cx="9141840" cy="1153080"/>
-          </a:xfrm>
-          <a:prstGeom prst="rect">
-            <a:avLst/>
-          </a:prstGeom>
-          <a:noFill/>
-          <a:ln w="0">
-            <a:noFill/>
-          </a:ln>
-        </p:spPr>
-        <p:txBody>
-          <a:bodyPr lIns="0" tIns="0" rIns="0" bIns="0" anchor="b">
-            <a:noAutofit/>
-          </a:bodyPr>
-          <a:lstStyle/>
-          <a:p>
-            <a:pPr algn="ctr">
-              <a:lnSpc>
-                <a:spcPct val="90000"/>
-              </a:lnSpc>
-              <a:buNone/>
-            </a:pPr>
-            <a:r>
-              <a:rPr lang="pt-PT" sz="4000" b="0" strike="noStrike" spc="-1" dirty="0">
-                <a:solidFill>
-                  <a:srgbClr val="870F11"/>
-                </a:solidFill>
-                <a:latin typeface="Calibri"/>
-              </a:rPr>
-              <a:t>Apresentação e explicação da</a:t>
-            </a:r>
-            <a:br>
-              <a:rPr lang="pt-PT" sz="4000" b="0" strike="noStrike" spc="-1" dirty="0">
-                <a:solidFill>
-                  <a:srgbClr val="870F11"/>
-                </a:solidFill>
-                <a:latin typeface="Calibri"/>
-              </a:rPr>
-            </a:br>
-            <a:r>
-              <a:rPr lang="pt-PT" sz="4000" b="0" strike="noStrike" spc="-1" dirty="0">
-                <a:solidFill>
-                  <a:srgbClr val="870F11"/>
-                </a:solidFill>
-                <a:latin typeface="Calibri"/>
-              </a:rPr>
-              <a:t>base de dados implementada</a:t>
-            </a:r>
-            <a:endParaRPr lang="en-US" sz="4000" b="0" strike="noStrike" spc="-1" dirty="0">
-              <a:latin typeface="Arial"/>
-            </a:endParaRPr>
-          </a:p>
-        </p:txBody>
-      </p:sp>
-      <p:sp>
-        <p:nvSpPr>
-          <p:cNvPr id="57" name="Retângulo 4">
-            <a:extLst>
-              <a:ext uri="{FF2B5EF4-FFF2-40B4-BE49-F238E27FC236}">
-                <a16:creationId xmlns:a16="http://schemas.microsoft.com/office/drawing/2014/main" id="{0D6D3843-AE1C-1391-C5BC-320727DE9F9C}"/>
+                <a16:creationId xmlns:a16="http://schemas.microsoft.com/office/drawing/2014/main" id="{6A07BA16-DD96-AD22-4256-B089B4662DE9}"/>
               </a:ext>
             </a:extLst>
           </p:cNvPr>
@@ -8217,59 +10585,8 @@
         </p:nvSpPr>
         <p:spPr>
           <a:xfrm>
-            <a:off x="0" y="6233760"/>
-            <a:ext cx="12189960" cy="622080"/>
-          </a:xfrm>
-          <a:prstGeom prst="rect">
-            <a:avLst/>
-          </a:prstGeom>
-          <a:solidFill>
-            <a:srgbClr val="870F11"/>
-          </a:solidFill>
-          <a:ln>
-            <a:solidFill>
-              <a:srgbClr val="870F11"/>
-            </a:solidFill>
-          </a:ln>
-        </p:spPr>
-        <p:style>
-          <a:lnRef idx="2">
-            <a:schemeClr val="accent1">
-              <a:shade val="50000"/>
-            </a:schemeClr>
-          </a:lnRef>
-          <a:fillRef idx="1">
-            <a:schemeClr val="accent1"/>
-          </a:fillRef>
-          <a:effectRef idx="0">
-            <a:schemeClr val="accent1"/>
-          </a:effectRef>
-          <a:fontRef idx="minor"/>
-        </p:style>
-        <p:txBody>
-          <a:bodyPr/>
-          <a:lstStyle/>
-          <a:p>
-            <a:endParaRPr lang="pt-PT"/>
-          </a:p>
-        </p:txBody>
-      </p:sp>
-      <p:sp>
-        <p:nvSpPr>
-          <p:cNvPr id="58" name="CaixaDeTexto 5">
-            <a:extLst>
-              <a:ext uri="{FF2B5EF4-FFF2-40B4-BE49-F238E27FC236}">
-                <a16:creationId xmlns:a16="http://schemas.microsoft.com/office/drawing/2014/main" id="{3046F5B0-F841-64DA-AC6B-59511F5F9FEB}"/>
-              </a:ext>
-            </a:extLst>
-          </p:cNvPr>
-          <p:cNvSpPr/>
-          <p:nvPr/>
-        </p:nvSpPr>
-        <p:spPr>
-          <a:xfrm>
-            <a:off x="1489680" y="1828800"/>
-            <a:ext cx="9024480" cy="829543"/>
+            <a:off x="1524060" y="2023284"/>
+            <a:ext cx="9024480" cy="3734762"/>
           </a:xfrm>
           <a:prstGeom prst="rect">
             <a:avLst/>
@@ -8292,452 +10609,184 @@
           <a:fontRef idx="minor"/>
         </p:style>
         <p:txBody>
-          <a:bodyPr vertOverflow="overflow" horzOverflow="overflow" lIns="90000" tIns="45000" rIns="90000" bIns="45000" numCol="1" spcCol="0" anchor="t">
+          <a:bodyPr vertOverflow="overflow" horzOverflow="overflow" wrap="square" lIns="90000" tIns="45000" rIns="90000" bIns="45000" numCol="1" spcCol="0" anchor="t">
             <a:spAutoFit/>
           </a:bodyPr>
           <a:lstStyle/>
           <a:p>
-            <a:pPr algn="ctr">
+            <a:pPr marL="343080" indent="-343080">
               <a:lnSpc>
-                <a:spcPct val="100000"/>
+                <a:spcPct val="150000"/>
               </a:lnSpc>
-              <a:buNone/>
-            </a:pPr>
-            <a:endParaRPr lang="en-US" sz="2400" b="0" strike="noStrike" spc="-1" dirty="0">
-              <a:latin typeface="Arial"/>
+              <a:buClr>
+                <a:srgbClr val="000000"/>
+              </a:buClr>
+              <a:buFont typeface="Arial"/>
+              <a:buChar char="•"/>
+            </a:pPr>
+            <a:r>
+              <a:rPr lang="en" sz="2000" spc="-1" dirty="0">
+                <a:solidFill>
+                  <a:srgbClr val="000000"/>
+                </a:solidFill>
+                <a:latin typeface="Consolas"/>
+              </a:rPr>
+              <a:t>Em seguida, podemos criar as tabelas que possuem chaves estrangeiras</a:t>
+            </a:r>
+          </a:p>
+          <a:p>
+            <a:pPr marL="800280" lvl="1" indent="-343080">
+              <a:lnSpc>
+                <a:spcPct val="150000"/>
+              </a:lnSpc>
+              <a:buClr>
+                <a:srgbClr val="000000"/>
+              </a:buClr>
+              <a:buFont typeface="Arial"/>
+              <a:buChar char="•"/>
+            </a:pPr>
+            <a:r>
+              <a:rPr lang="pt-PT" sz="2000" spc="-1" dirty="0">
+                <a:solidFill>
+                  <a:srgbClr val="000000"/>
+                </a:solidFill>
+                <a:latin typeface="Consolas"/>
+              </a:rPr>
+              <a:t>M</a:t>
+            </a:r>
+            <a:r>
+              <a:rPr lang="en" sz="2000" spc="-1" dirty="0">
+                <a:solidFill>
+                  <a:srgbClr val="000000"/>
+                </a:solidFill>
+                <a:latin typeface="Consolas"/>
+              </a:rPr>
+              <a:t>as apenas aquelas que fazem referência à tabela </a:t>
+            </a:r>
+            <a:r>
+              <a:rPr lang="en" sz="2000" b="1" spc="-1" dirty="0">
+                <a:solidFill>
+                  <a:srgbClr val="000000"/>
+                </a:solidFill>
+                <a:latin typeface="Consolas"/>
+              </a:rPr>
+              <a:t>Competição </a:t>
+            </a:r>
+            <a:r>
+              <a:rPr lang="en" sz="2000" spc="-1" dirty="0">
+                <a:solidFill>
+                  <a:srgbClr val="000000"/>
+                </a:solidFill>
+                <a:latin typeface="Consolas"/>
+              </a:rPr>
+              <a:t>e/ou à tabela </a:t>
+            </a:r>
+            <a:r>
+              <a:rPr lang="en" sz="2000" b="1" spc="-1" dirty="0">
+                <a:solidFill>
+                  <a:srgbClr val="000000"/>
+                </a:solidFill>
+                <a:latin typeface="Consolas"/>
+              </a:rPr>
+              <a:t>Tipo</a:t>
+            </a:r>
+            <a:endParaRPr lang="en" sz="2000" spc="-1" dirty="0">
+              <a:solidFill>
+                <a:srgbClr val="000000"/>
+              </a:solidFill>
+              <a:latin typeface="Consolas"/>
             </a:endParaRPr>
           </a:p>
           <a:p>
-            <a:pPr algn="ctr">
+            <a:pPr marL="343080" indent="-343080">
               <a:lnSpc>
-                <a:spcPct val="100000"/>
+                <a:spcPct val="150000"/>
               </a:lnSpc>
-              <a:buNone/>
-            </a:pPr>
-            <a:endParaRPr lang="en-US" sz="2400" b="0" strike="noStrike" spc="-1" dirty="0">
-              <a:latin typeface="Arial"/>
-            </a:endParaRPr>
-          </a:p>
-        </p:txBody>
-      </p:sp>
-      <p:pic>
-        <p:nvPicPr>
-          <p:cNvPr id="59" name="Imagem 3">
-            <a:extLst>
-              <a:ext uri="{FF2B5EF4-FFF2-40B4-BE49-F238E27FC236}">
-                <a16:creationId xmlns:a16="http://schemas.microsoft.com/office/drawing/2014/main" id="{9531AB33-6445-6A35-6AFA-ACC08C9B48C6}"/>
-              </a:ext>
-            </a:extLst>
-          </p:cNvPr>
-          <p:cNvPicPr/>
-          <p:nvPr/>
-        </p:nvPicPr>
-        <p:blipFill>
-          <a:blip r:embed="rId2"/>
-          <a:stretch/>
-        </p:blipFill>
-        <p:spPr>
-          <a:xfrm>
-            <a:off x="3240" y="6261480"/>
-            <a:ext cx="1236960" cy="709200"/>
-          </a:xfrm>
-          <a:prstGeom prst="rect">
-            <a:avLst/>
-          </a:prstGeom>
-          <a:ln w="0">
-            <a:noFill/>
-          </a:ln>
-        </p:spPr>
-      </p:pic>
-      <p:sp>
-        <p:nvSpPr>
-          <p:cNvPr id="60" name="CaixaDeTexto 1">
-            <a:extLst>
-              <a:ext uri="{FF2B5EF4-FFF2-40B4-BE49-F238E27FC236}">
-                <a16:creationId xmlns:a16="http://schemas.microsoft.com/office/drawing/2014/main" id="{F8257343-9309-605D-CA10-C66B1E5278A5}"/>
-              </a:ext>
-            </a:extLst>
-          </p:cNvPr>
-          <p:cNvSpPr/>
-          <p:nvPr/>
-        </p:nvSpPr>
-        <p:spPr>
-          <a:xfrm>
-            <a:off x="6629400" y="6362640"/>
-            <a:ext cx="5855760" cy="337100"/>
-          </a:xfrm>
-          <a:prstGeom prst="rect">
-            <a:avLst/>
-          </a:prstGeom>
-          <a:noFill/>
-          <a:ln w="0">
-            <a:noFill/>
-          </a:ln>
-        </p:spPr>
-        <p:style>
-          <a:lnRef idx="0">
-            <a:scrgbClr r="0" g="0" b="0"/>
-          </a:lnRef>
-          <a:fillRef idx="0">
-            <a:scrgbClr r="0" g="0" b="0"/>
-          </a:fillRef>
-          <a:effectRef idx="0">
-            <a:scrgbClr r="0" g="0" b="0"/>
-          </a:effectRef>
-          <a:fontRef idx="minor"/>
-        </p:style>
-        <p:txBody>
-          <a:bodyPr vertOverflow="overflow" horzOverflow="overflow" lIns="90000" tIns="45000" rIns="90000" bIns="45000" numCol="1" spcCol="0" anchor="t">
-            <a:spAutoFit/>
-          </a:bodyPr>
-          <a:lstStyle/>
-          <a:p>
-            <a:pPr>
+              <a:buClr>
+                <a:srgbClr val="000000"/>
+              </a:buClr>
+              <a:buFont typeface="Arial"/>
+              <a:buChar char="•"/>
+            </a:pPr>
+            <a:r>
+              <a:rPr lang="en" sz="2000" spc="-1" dirty="0">
+                <a:solidFill>
+                  <a:srgbClr val="000000"/>
+                </a:solidFill>
+                <a:latin typeface="Consolas"/>
+              </a:rPr>
+              <a:t>As tabelas em questão são:</a:t>
+            </a:r>
+          </a:p>
+          <a:p>
+            <a:pPr marL="800280" lvl="1" indent="-343080">
               <a:lnSpc>
-                <a:spcPct val="100000"/>
+                <a:spcPct val="150000"/>
               </a:lnSpc>
-              <a:buNone/>
-            </a:pPr>
-            <a:r>
-              <a:rPr lang="pt-PT" sz="1600" b="0" strike="noStrike" spc="-1" dirty="0">
-                <a:solidFill>
-                  <a:srgbClr val="FFFFFF"/>
-                </a:solidFill>
-                <a:latin typeface="Calibri"/>
-                <a:ea typeface="DejaVu Sans"/>
-              </a:rPr>
-              <a:t>Bases de Dados – Jogos Olímpicos   |   Parte 2 - Grupo 8</a:t>
-            </a:r>
-            <a:endParaRPr lang="en-US" sz="1600" b="0" strike="noStrike" spc="-1" dirty="0">
-              <a:latin typeface="Arial"/>
-            </a:endParaRPr>
+              <a:buClr>
+                <a:srgbClr val="000000"/>
+              </a:buClr>
+              <a:buFont typeface="Arial"/>
+              <a:buChar char="•"/>
+            </a:pPr>
+            <a:r>
+              <a:rPr lang="en" sz="2000" spc="-1" dirty="0">
+                <a:solidFill>
+                  <a:srgbClr val="000000"/>
+                </a:solidFill>
+                <a:latin typeface="Consolas"/>
+              </a:rPr>
+              <a:t>Funcionário</a:t>
+            </a:r>
+          </a:p>
+          <a:p>
+            <a:pPr marL="800280" lvl="1" indent="-343080">
+              <a:lnSpc>
+                <a:spcPct val="150000"/>
+              </a:lnSpc>
+              <a:buClr>
+                <a:srgbClr val="000000"/>
+              </a:buClr>
+              <a:buFont typeface="Arial"/>
+              <a:buChar char="•"/>
+            </a:pPr>
+            <a:r>
+              <a:rPr lang="en" sz="2000" spc="-1" dirty="0">
+                <a:solidFill>
+                  <a:srgbClr val="000000"/>
+                </a:solidFill>
+                <a:latin typeface="Consolas"/>
+              </a:rPr>
+              <a:t>Esporte</a:t>
+            </a:r>
+          </a:p>
+          <a:p>
+            <a:pPr marL="800280" lvl="1" indent="-343080">
+              <a:lnSpc>
+                <a:spcPct val="150000"/>
+              </a:lnSpc>
+              <a:buClr>
+                <a:srgbClr val="000000"/>
+              </a:buClr>
+              <a:buFont typeface="Arial"/>
+              <a:buChar char="•"/>
+            </a:pPr>
+            <a:r>
+              <a:rPr lang="en" sz="2000" spc="-1" dirty="0">
+                <a:solidFill>
+                  <a:srgbClr val="000000"/>
+                </a:solidFill>
+                <a:latin typeface="Consolas"/>
+              </a:rPr>
+              <a:t>Delegação</a:t>
+            </a:r>
           </a:p>
         </p:txBody>
       </p:sp>
     </p:spTree>
     <p:extLst>
       <p:ext uri="{BB962C8B-B14F-4D97-AF65-F5344CB8AC3E}">
-        <p14:creationId xmlns:p14="http://schemas.microsoft.com/office/powerpoint/2010/main" val="2605338962"/>
-      </p:ext>
-    </p:extLst>
-  </p:cSld>
-  <p:clrMapOvr>
-    <a:masterClrMapping/>
-  </p:clrMapOvr>
-</p:sld>
-</file>
-
-<file path=ppt/slides/slide9.xml><?xml version="1.0" encoding="utf-8"?>
-<p:sld xmlns:a="http://schemas.openxmlformats.org/drawingml/2006/main" xmlns:r="http://schemas.openxmlformats.org/officeDocument/2006/relationships" xmlns:p="http://schemas.openxmlformats.org/presentationml/2006/main" show="0">
-  <p:cSld>
-    <p:spTree>
-      <p:nvGrpSpPr>
-        <p:cNvPr id="1" name="">
-          <a:extLst>
-            <a:ext uri="{FF2B5EF4-FFF2-40B4-BE49-F238E27FC236}">
-              <a16:creationId xmlns:a16="http://schemas.microsoft.com/office/drawing/2014/main" id="{EAD45256-5E4E-43AC-E5E5-972ED32B8AD4}"/>
-            </a:ext>
-          </a:extLst>
-        </p:cNvPr>
-        <p:cNvGrpSpPr/>
-        <p:nvPr/>
-      </p:nvGrpSpPr>
-      <p:grpSpPr>
-        <a:xfrm>
-          <a:off x="0" y="0"/>
-          <a:ext cx="0" cy="0"/>
-          <a:chOff x="0" y="0"/>
-          <a:chExt cx="0" cy="0"/>
-        </a:xfrm>
-      </p:grpSpPr>
-      <p:sp>
-        <p:nvSpPr>
-          <p:cNvPr id="56" name="PlaceHolder 1">
-            <a:extLst>
-              <a:ext uri="{FF2B5EF4-FFF2-40B4-BE49-F238E27FC236}">
-                <a16:creationId xmlns:a16="http://schemas.microsoft.com/office/drawing/2014/main" id="{182203AC-D9FD-3273-F421-FA3A4C83D4B1}"/>
-              </a:ext>
-            </a:extLst>
-          </p:cNvPr>
-          <p:cNvSpPr>
-            <a:spLocks noGrp="1"/>
-          </p:cNvSpPr>
-          <p:nvPr>
-            <p:ph type="title"/>
-          </p:nvPr>
-        </p:nvSpPr>
-        <p:spPr>
-          <a:xfrm>
-            <a:off x="1525680" y="275040"/>
-            <a:ext cx="9141840" cy="1153080"/>
-          </a:xfrm>
-          <a:prstGeom prst="rect">
-            <a:avLst/>
-          </a:prstGeom>
-          <a:noFill/>
-          <a:ln w="0">
-            <a:noFill/>
-          </a:ln>
-        </p:spPr>
-        <p:txBody>
-          <a:bodyPr lIns="0" tIns="0" rIns="0" bIns="0" anchor="b">
-            <a:noAutofit/>
-          </a:bodyPr>
-          <a:lstStyle/>
-          <a:p>
-            <a:pPr algn="ctr">
-              <a:lnSpc>
-                <a:spcPct val="90000"/>
-              </a:lnSpc>
-              <a:buNone/>
-            </a:pPr>
-            <a:r>
-              <a:rPr lang="pt-PT" sz="4000" b="0" strike="noStrike" spc="-1" dirty="0">
-                <a:solidFill>
-                  <a:srgbClr val="870F11"/>
-                </a:solidFill>
-                <a:latin typeface="Calibri"/>
-              </a:rPr>
-              <a:t>Apresentação e explicação da</a:t>
-            </a:r>
-            <a:br>
-              <a:rPr lang="pt-PT" sz="4000" b="0" strike="noStrike" spc="-1" dirty="0">
-                <a:solidFill>
-                  <a:srgbClr val="870F11"/>
-                </a:solidFill>
-                <a:latin typeface="Calibri"/>
-              </a:rPr>
-            </a:br>
-            <a:r>
-              <a:rPr lang="pt-PT" sz="4000" b="0" strike="noStrike" spc="-1" dirty="0">
-                <a:solidFill>
-                  <a:srgbClr val="870F11"/>
-                </a:solidFill>
-                <a:latin typeface="Calibri"/>
-              </a:rPr>
-              <a:t>base de dados implementada</a:t>
-            </a:r>
-            <a:endParaRPr lang="en-US" sz="4000" b="0" strike="noStrike" spc="-1" dirty="0">
-              <a:latin typeface="Arial"/>
-            </a:endParaRPr>
-          </a:p>
-        </p:txBody>
-      </p:sp>
-      <p:sp>
-        <p:nvSpPr>
-          <p:cNvPr id="57" name="Retângulo 4">
-            <a:extLst>
-              <a:ext uri="{FF2B5EF4-FFF2-40B4-BE49-F238E27FC236}">
-                <a16:creationId xmlns:a16="http://schemas.microsoft.com/office/drawing/2014/main" id="{3D6462E1-95BB-0FD7-9ED3-BA60806897F3}"/>
-              </a:ext>
-            </a:extLst>
-          </p:cNvPr>
-          <p:cNvSpPr/>
-          <p:nvPr/>
-        </p:nvSpPr>
-        <p:spPr>
-          <a:xfrm>
-            <a:off x="0" y="6233760"/>
-            <a:ext cx="12189960" cy="622080"/>
-          </a:xfrm>
-          <a:prstGeom prst="rect">
-            <a:avLst/>
-          </a:prstGeom>
-          <a:solidFill>
-            <a:srgbClr val="870F11"/>
-          </a:solidFill>
-          <a:ln>
-            <a:solidFill>
-              <a:srgbClr val="870F11"/>
-            </a:solidFill>
-          </a:ln>
-        </p:spPr>
-        <p:style>
-          <a:lnRef idx="2">
-            <a:schemeClr val="accent1">
-              <a:shade val="50000"/>
-            </a:schemeClr>
-          </a:lnRef>
-          <a:fillRef idx="1">
-            <a:schemeClr val="accent1"/>
-          </a:fillRef>
-          <a:effectRef idx="0">
-            <a:schemeClr val="accent1"/>
-          </a:effectRef>
-          <a:fontRef idx="minor"/>
-        </p:style>
-        <p:txBody>
-          <a:bodyPr/>
-          <a:lstStyle/>
-          <a:p>
-            <a:endParaRPr lang="pt-PT"/>
-          </a:p>
-        </p:txBody>
-      </p:sp>
-      <p:sp>
-        <p:nvSpPr>
-          <p:cNvPr id="58" name="CaixaDeTexto 5">
-            <a:extLst>
-              <a:ext uri="{FF2B5EF4-FFF2-40B4-BE49-F238E27FC236}">
-                <a16:creationId xmlns:a16="http://schemas.microsoft.com/office/drawing/2014/main" id="{1B6A78CC-787D-E453-22CC-EEE2DBEFDABF}"/>
-              </a:ext>
-            </a:extLst>
-          </p:cNvPr>
-          <p:cNvSpPr/>
-          <p:nvPr/>
-        </p:nvSpPr>
-        <p:spPr>
-          <a:xfrm>
-            <a:off x="1489680" y="1828800"/>
-            <a:ext cx="9024480" cy="829543"/>
-          </a:xfrm>
-          <a:prstGeom prst="rect">
-            <a:avLst/>
-          </a:prstGeom>
-          <a:noFill/>
-          <a:ln w="0">
-            <a:noFill/>
-          </a:ln>
-        </p:spPr>
-        <p:style>
-          <a:lnRef idx="0">
-            <a:scrgbClr r="0" g="0" b="0"/>
-          </a:lnRef>
-          <a:fillRef idx="0">
-            <a:scrgbClr r="0" g="0" b="0"/>
-          </a:fillRef>
-          <a:effectRef idx="0">
-            <a:scrgbClr r="0" g="0" b="0"/>
-          </a:effectRef>
-          <a:fontRef idx="minor"/>
-        </p:style>
-        <p:txBody>
-          <a:bodyPr vertOverflow="overflow" horzOverflow="overflow" lIns="90000" tIns="45000" rIns="90000" bIns="45000" numCol="1" spcCol="0" anchor="t">
-            <a:spAutoFit/>
-          </a:bodyPr>
-          <a:lstStyle/>
-          <a:p>
-            <a:pPr algn="ctr">
-              <a:lnSpc>
-                <a:spcPct val="100000"/>
-              </a:lnSpc>
-              <a:buNone/>
-            </a:pPr>
-            <a:endParaRPr lang="en-US" sz="2400" b="0" strike="noStrike" spc="-1" dirty="0">
-              <a:latin typeface="Arial"/>
-            </a:endParaRPr>
-          </a:p>
-          <a:p>
-            <a:pPr algn="ctr">
-              <a:lnSpc>
-                <a:spcPct val="100000"/>
-              </a:lnSpc>
-              <a:buNone/>
-            </a:pPr>
-            <a:endParaRPr lang="en-US" sz="2400" b="0" strike="noStrike" spc="-1" dirty="0">
-              <a:latin typeface="Arial"/>
-            </a:endParaRPr>
-          </a:p>
-        </p:txBody>
-      </p:sp>
-      <p:pic>
-        <p:nvPicPr>
-          <p:cNvPr id="59" name="Imagem 3">
-            <a:extLst>
-              <a:ext uri="{FF2B5EF4-FFF2-40B4-BE49-F238E27FC236}">
-                <a16:creationId xmlns:a16="http://schemas.microsoft.com/office/drawing/2014/main" id="{43DCB346-6D50-17ED-16D6-EDBED7B59E1F}"/>
-              </a:ext>
-            </a:extLst>
-          </p:cNvPr>
-          <p:cNvPicPr/>
-          <p:nvPr/>
-        </p:nvPicPr>
-        <p:blipFill>
-          <a:blip r:embed="rId2"/>
-          <a:stretch/>
-        </p:blipFill>
-        <p:spPr>
-          <a:xfrm>
-            <a:off x="3240" y="6261480"/>
-            <a:ext cx="1236960" cy="709200"/>
-          </a:xfrm>
-          <a:prstGeom prst="rect">
-            <a:avLst/>
-          </a:prstGeom>
-          <a:ln w="0">
-            <a:noFill/>
-          </a:ln>
-        </p:spPr>
-      </p:pic>
-      <p:sp>
-        <p:nvSpPr>
-          <p:cNvPr id="60" name="CaixaDeTexto 1">
-            <a:extLst>
-              <a:ext uri="{FF2B5EF4-FFF2-40B4-BE49-F238E27FC236}">
-                <a16:creationId xmlns:a16="http://schemas.microsoft.com/office/drawing/2014/main" id="{02BE17A1-33F9-AD2A-9804-D7B5E2EDC34E}"/>
-              </a:ext>
-            </a:extLst>
-          </p:cNvPr>
-          <p:cNvSpPr/>
-          <p:nvPr/>
-        </p:nvSpPr>
-        <p:spPr>
-          <a:xfrm>
-            <a:off x="6629400" y="6362640"/>
-            <a:ext cx="5855760" cy="337100"/>
-          </a:xfrm>
-          <a:prstGeom prst="rect">
-            <a:avLst/>
-          </a:prstGeom>
-          <a:noFill/>
-          <a:ln w="0">
-            <a:noFill/>
-          </a:ln>
-        </p:spPr>
-        <p:style>
-          <a:lnRef idx="0">
-            <a:scrgbClr r="0" g="0" b="0"/>
-          </a:lnRef>
-          <a:fillRef idx="0">
-            <a:scrgbClr r="0" g="0" b="0"/>
-          </a:fillRef>
-          <a:effectRef idx="0">
-            <a:scrgbClr r="0" g="0" b="0"/>
-          </a:effectRef>
-          <a:fontRef idx="minor"/>
-        </p:style>
-        <p:txBody>
-          <a:bodyPr vertOverflow="overflow" horzOverflow="overflow" lIns="90000" tIns="45000" rIns="90000" bIns="45000" numCol="1" spcCol="0" anchor="t">
-            <a:spAutoFit/>
-          </a:bodyPr>
-          <a:lstStyle/>
-          <a:p>
-            <a:pPr>
-              <a:lnSpc>
-                <a:spcPct val="100000"/>
-              </a:lnSpc>
-              <a:buNone/>
-            </a:pPr>
-            <a:r>
-              <a:rPr lang="pt-PT" sz="1600" b="0" strike="noStrike" spc="-1" dirty="0">
-                <a:solidFill>
-                  <a:srgbClr val="FFFFFF"/>
-                </a:solidFill>
-                <a:latin typeface="Calibri"/>
-                <a:ea typeface="DejaVu Sans"/>
-              </a:rPr>
-              <a:t>Bases de Dados – Jogos Olímpicos   |   Parte 2 - Grupo 8</a:t>
-            </a:r>
-            <a:endParaRPr lang="en-US" sz="1600" b="0" strike="noStrike" spc="-1" dirty="0">
-              <a:latin typeface="Arial"/>
-            </a:endParaRPr>
-          </a:p>
-        </p:txBody>
-      </p:sp>
-    </p:spTree>
-    <p:extLst>
-      <p:ext uri="{BB962C8B-B14F-4D97-AF65-F5344CB8AC3E}">
-        <p14:creationId xmlns:p14="http://schemas.microsoft.com/office/powerpoint/2010/main" val="3212710649"/>
+        <p14:creationId xmlns:p14="http://schemas.microsoft.com/office/powerpoint/2010/main" val="367112552"/>
       </p:ext>
     </p:extLst>
   </p:cSld>

</xml_diff>

<commit_message>
Queries de exploração adicionadas
</commit_message>
<xml_diff>
--- a/BD_TPgr8-pt2.pptx
+++ b/BD_TPgr8-pt2.pptx
@@ -5,7 +5,7 @@
     <p:sldMasterId id="2147483648" r:id="rId1"/>
   </p:sldMasterIdLst>
   <p:notesMasterIdLst>
-    <p:notesMasterId r:id="rId36"/>
+    <p:notesMasterId r:id="rId42"/>
   </p:notesMasterIdLst>
   <p:sldIdLst>
     <p:sldId id="256" r:id="rId2"/>
@@ -41,7 +41,13 @@
     <p:sldId id="288" r:id="rId32"/>
     <p:sldId id="291" r:id="rId33"/>
     <p:sldId id="289" r:id="rId34"/>
-    <p:sldId id="269" r:id="rId35"/>
+    <p:sldId id="292" r:id="rId35"/>
+    <p:sldId id="296" r:id="rId36"/>
+    <p:sldId id="293" r:id="rId37"/>
+    <p:sldId id="294" r:id="rId38"/>
+    <p:sldId id="295" r:id="rId39"/>
+    <p:sldId id="297" r:id="rId40"/>
+    <p:sldId id="269" r:id="rId41"/>
   </p:sldIdLst>
   <p:sldSz cx="12192000" cy="6858000"/>
   <p:notesSz cx="7772400" cy="10058400"/>
@@ -16640,6 +16646,65 @@
           </a:p>
         </p:txBody>
       </p:sp>
+      <p:sp>
+        <p:nvSpPr>
+          <p:cNvPr id="3" name="CaixaDeTexto 2">
+            <a:extLst>
+              <a:ext uri="{FF2B5EF4-FFF2-40B4-BE49-F238E27FC236}">
+                <a16:creationId xmlns:a16="http://schemas.microsoft.com/office/drawing/2014/main" id="{0711F713-5D9B-3C40-CF01-5B3CDA92E072}"/>
+              </a:ext>
+            </a:extLst>
+          </p:cNvPr>
+          <p:cNvSpPr txBox="1"/>
+          <p:nvPr/>
+        </p:nvSpPr>
+        <p:spPr>
+          <a:xfrm>
+            <a:off x="2156697" y="1672699"/>
+            <a:ext cx="7690446" cy="4659545"/>
+          </a:xfrm>
+          <a:prstGeom prst="rect">
+            <a:avLst/>
+          </a:prstGeom>
+          <a:noFill/>
+        </p:spPr>
+        <p:txBody>
+          <a:bodyPr wrap="square">
+            <a:spAutoFit/>
+          </a:bodyPr>
+          <a:lstStyle/>
+          <a:p>
+            <a:pPr indent="457200" algn="just">
+              <a:lnSpc>
+                <a:spcPct val="150000"/>
+              </a:lnSpc>
+            </a:pPr>
+            <a:r>
+              <a:rPr lang="pt-PT" sz="2000" dirty="0">
+                <a:effectLst/>
+                <a:latin typeface="Consolas" panose="020B0609020204030204" pitchFamily="49" charset="0"/>
+                <a:ea typeface="Times New Roman" panose="02020603050405020304" pitchFamily="18" charset="0"/>
+              </a:rPr>
+              <a:t>Depois de realizar o povoamento das tabelas, começamos a elaborar e a executar algumas queries para testar a estrutura e verificar se os dados estavam organizados de forma correta. Essas consultas foram desenvolvidas com o objetivo de explorar as informações armazenadas, garantindo que a modelagem atenda às necessidades propostas inicialmente.</a:t>
+            </a:r>
+          </a:p>
+          <a:p>
+            <a:pPr indent="457200" algn="just">
+              <a:lnSpc>
+                <a:spcPct val="150000"/>
+              </a:lnSpc>
+            </a:pPr>
+            <a:r>
+              <a:rPr lang="pt-PT" sz="2000" dirty="0">
+                <a:effectLst/>
+                <a:latin typeface="Consolas" panose="020B0609020204030204" pitchFamily="49" charset="0"/>
+                <a:ea typeface="Times New Roman" panose="02020603050405020304" pitchFamily="18" charset="0"/>
+              </a:rPr>
+              <a:t>Tendo isto dito apresentamos aqui algumas das queries que utilizamos como testes para a base de dados.</a:t>
+            </a:r>
+          </a:p>
+        </p:txBody>
+      </p:sp>
     </p:spTree>
     <p:extLst>
       <p:ext uri="{BB962C8B-B14F-4D97-AF65-F5344CB8AC3E}">
@@ -16661,7 +16726,7 @@
         <p:cNvPr id="1" name="">
           <a:extLst>
             <a:ext uri="{FF2B5EF4-FFF2-40B4-BE49-F238E27FC236}">
-              <a16:creationId xmlns:a16="http://schemas.microsoft.com/office/drawing/2014/main" id="{8EA051DF-9370-6E1F-A966-FCFFF3AFAA4E}"/>
+              <a16:creationId xmlns:a16="http://schemas.microsoft.com/office/drawing/2014/main" id="{32FE0F7C-989B-02E2-D4B7-D7D48AFE2912}"/>
             </a:ext>
           </a:extLst>
         </p:cNvPr>
@@ -16678,10 +16743,10 @@
       </p:grpSpPr>
       <p:sp>
         <p:nvSpPr>
-          <p:cNvPr id="51" name="PlaceHolder 1">
+          <p:cNvPr id="56" name="PlaceHolder 1">
             <a:extLst>
               <a:ext uri="{FF2B5EF4-FFF2-40B4-BE49-F238E27FC236}">
-                <a16:creationId xmlns:a16="http://schemas.microsoft.com/office/drawing/2014/main" id="{F5167765-DEF6-8118-1BA0-EACD0A05728A}"/>
+                <a16:creationId xmlns:a16="http://schemas.microsoft.com/office/drawing/2014/main" id="{9E516310-F963-96A3-8B3A-738F98D4DF67}"/>
               </a:ext>
             </a:extLst>
           </p:cNvPr>
@@ -16694,8 +16759,8 @@
         </p:nvSpPr>
         <p:spPr>
           <a:xfrm>
-            <a:off x="1525680" y="275040"/>
-            <a:ext cx="9141840" cy="1153080"/>
+            <a:off x="1489680" y="576562"/>
+            <a:ext cx="9024480" cy="1096137"/>
           </a:xfrm>
           <a:prstGeom prst="rect">
             <a:avLst/>
@@ -16718,16 +16783,15 @@
               <a:buNone/>
             </a:pPr>
             <a:r>
-              <a:rPr lang="pt-PT" sz="4400" b="0" u="sng" strike="noStrike" spc="-1" dirty="0">
+              <a:rPr lang="pt-PT" sz="4000" b="0" strike="noStrike" spc="-1" dirty="0">
                 <a:solidFill>
                   <a:srgbClr val="870F11"/>
                 </a:solidFill>
-                <a:uFillTx/>
                 <a:latin typeface="Calibri"/>
               </a:rPr>
-              <a:t>Conclusão e Trabalho Futuro</a:t>
+              <a:t>Tradução das interrogações do utilizador para SQL</a:t>
             </a:r>
-            <a:endParaRPr lang="en-US" sz="4400" b="0" strike="noStrike" spc="-1" dirty="0">
+            <a:endParaRPr lang="en-US" sz="4000" b="0" strike="noStrike" spc="-1" dirty="0">
               <a:latin typeface="Arial"/>
             </a:endParaRPr>
           </a:p>
@@ -16735,10 +16799,10 @@
       </p:sp>
       <p:sp>
         <p:nvSpPr>
-          <p:cNvPr id="52" name="Retângulo 4">
+          <p:cNvPr id="57" name="Retângulo 4">
             <a:extLst>
               <a:ext uri="{FF2B5EF4-FFF2-40B4-BE49-F238E27FC236}">
-                <a16:creationId xmlns:a16="http://schemas.microsoft.com/office/drawing/2014/main" id="{69301A0B-E77F-3789-C9E4-6579746AE1F2}"/>
+                <a16:creationId xmlns:a16="http://schemas.microsoft.com/office/drawing/2014/main" id="{FCBEB019-D30B-5B47-A18E-697CA6D3C54A}"/>
               </a:ext>
             </a:extLst>
           </p:cNvPr>
@@ -16786,10 +16850,10 @@
       </p:sp>
       <p:sp>
         <p:nvSpPr>
-          <p:cNvPr id="53" name="CaixaDeTexto 5">
+          <p:cNvPr id="58" name="CaixaDeTexto 5">
             <a:extLst>
               <a:ext uri="{FF2B5EF4-FFF2-40B4-BE49-F238E27FC236}">
-                <a16:creationId xmlns:a16="http://schemas.microsoft.com/office/drawing/2014/main" id="{9627A777-B39B-0638-8DF6-212D4B3F7B50}"/>
+                <a16:creationId xmlns:a16="http://schemas.microsoft.com/office/drawing/2014/main" id="{EB33FF6E-F0F1-DD77-AC6A-DEC930861CCA}"/>
               </a:ext>
             </a:extLst>
           </p:cNvPr>
@@ -16798,8 +16862,8 @@
         </p:nvSpPr>
         <p:spPr>
           <a:xfrm>
-            <a:off x="1814400" y="1845720"/>
-            <a:ext cx="6792840" cy="1598984"/>
+            <a:off x="1489680" y="1828800"/>
+            <a:ext cx="9024480" cy="829543"/>
           </a:xfrm>
           <a:prstGeom prst="rect">
             <a:avLst/>
@@ -16826,28 +16890,6 @@
             <a:spAutoFit/>
           </a:bodyPr>
           <a:lstStyle/>
-          <a:p>
-            <a:pPr>
-              <a:lnSpc>
-                <a:spcPct val="150000"/>
-              </a:lnSpc>
-              <a:buNone/>
-            </a:pPr>
-            <a:endParaRPr lang="en-US" sz="2000" b="0" strike="noStrike" spc="-1" dirty="0">
-              <a:latin typeface="Arial"/>
-            </a:endParaRPr>
-          </a:p>
-          <a:p>
-            <a:pPr>
-              <a:lnSpc>
-                <a:spcPct val="100000"/>
-              </a:lnSpc>
-              <a:buNone/>
-            </a:pPr>
-            <a:endParaRPr lang="en-US" sz="2000" b="0" strike="noStrike" spc="-1" dirty="0">
-              <a:latin typeface="Arial"/>
-            </a:endParaRPr>
-          </a:p>
           <a:p>
             <a:pPr algn="ctr">
               <a:lnSpc>
@@ -16874,10 +16916,10 @@
       </p:sp>
       <p:pic>
         <p:nvPicPr>
-          <p:cNvPr id="54" name="Imagem 3">
+          <p:cNvPr id="59" name="Imagem 3">
             <a:extLst>
               <a:ext uri="{FF2B5EF4-FFF2-40B4-BE49-F238E27FC236}">
-                <a16:creationId xmlns:a16="http://schemas.microsoft.com/office/drawing/2014/main" id="{6E7FEA2B-DBA8-4F6D-6745-525908B5D127}"/>
+                <a16:creationId xmlns:a16="http://schemas.microsoft.com/office/drawing/2014/main" id="{E0D0ABD6-333D-5AF5-90AA-3092B4D605CB}"/>
               </a:ext>
             </a:extLst>
           </p:cNvPr>
@@ -16903,10 +16945,10 @@
       </p:pic>
       <p:sp>
         <p:nvSpPr>
-          <p:cNvPr id="55" name="CaixaDeTexto 3">
+          <p:cNvPr id="60" name="CaixaDeTexto 1">
             <a:extLst>
               <a:ext uri="{FF2B5EF4-FFF2-40B4-BE49-F238E27FC236}">
-                <a16:creationId xmlns:a16="http://schemas.microsoft.com/office/drawing/2014/main" id="{BF610D12-74BC-50E5-A694-277F36CC9E56}"/>
+                <a16:creationId xmlns:a16="http://schemas.microsoft.com/office/drawing/2014/main" id="{A952F90D-C50D-9B92-0BA0-B9357181768B}"/>
               </a:ext>
             </a:extLst>
           </p:cNvPr>
@@ -16966,10 +17008,1826 @@
           </a:p>
         </p:txBody>
       </p:sp>
+      <p:pic>
+        <p:nvPicPr>
+          <p:cNvPr id="15362" name="Picture 2">
+            <a:extLst>
+              <a:ext uri="{FF2B5EF4-FFF2-40B4-BE49-F238E27FC236}">
+                <a16:creationId xmlns:a16="http://schemas.microsoft.com/office/drawing/2014/main" id="{B3394DD3-F7B5-B57D-9A4C-347C33CD25B2}"/>
+              </a:ext>
+            </a:extLst>
+          </p:cNvPr>
+          <p:cNvPicPr>
+            <a:picLocks noChangeAspect="1" noChangeArrowheads="1"/>
+          </p:cNvPicPr>
+          <p:nvPr/>
+        </p:nvPicPr>
+        <p:blipFill>
+          <a:blip r:embed="rId3">
+            <a:extLst>
+              <a:ext uri="{28A0092B-C50C-407E-A947-70E740481C1C}">
+                <a14:useLocalDpi xmlns:a14="http://schemas.microsoft.com/office/drawing/2010/main" val="0"/>
+              </a:ext>
+            </a:extLst>
+          </a:blip>
+          <a:srcRect l="-12" t="-40" r="-12" b="-40"/>
+          <a:stretch>
+            <a:fillRect/>
+          </a:stretch>
+        </p:blipFill>
+        <p:spPr bwMode="auto">
+          <a:xfrm>
+            <a:off x="1592223" y="2381592"/>
+            <a:ext cx="9007553" cy="3004545"/>
+          </a:xfrm>
+          <a:prstGeom prst="rect">
+            <a:avLst/>
+          </a:prstGeom>
+          <a:ln w="38100" cap="sq">
+            <a:solidFill>
+              <a:srgbClr val="000000"/>
+            </a:solidFill>
+            <a:prstDash val="solid"/>
+            <a:miter lim="800000"/>
+          </a:ln>
+          <a:effectLst>
+            <a:outerShdw blurRad="50800" dist="38100" dir="2700000" algn="tl" rotWithShape="0">
+              <a:srgbClr val="000000">
+                <a:alpha val="43000"/>
+              </a:srgbClr>
+            </a:outerShdw>
+          </a:effectLst>
+          <a:extLst>
+            <a:ext uri="{91240B29-F687-4F45-9708-019B960494DF}">
+              <a14:hiddenLine xmlns:a14="http://schemas.microsoft.com/office/drawing/2010/main" w="9525">
+                <a:solidFill>
+                  <a:srgbClr val="000000"/>
+                </a:solidFill>
+                <a:miter lim="800000"/>
+                <a:headEnd/>
+                <a:tailEnd/>
+              </a14:hiddenLine>
+            </a:ext>
+          </a:extLst>
+        </p:spPr>
+      </p:pic>
     </p:spTree>
     <p:extLst>
       <p:ext uri="{BB962C8B-B14F-4D97-AF65-F5344CB8AC3E}">
-        <p14:creationId xmlns:p14="http://schemas.microsoft.com/office/powerpoint/2010/main" val="106293796"/>
+        <p14:creationId xmlns:p14="http://schemas.microsoft.com/office/powerpoint/2010/main" val="97567918"/>
+      </p:ext>
+    </p:extLst>
+  </p:cSld>
+  <p:clrMapOvr>
+    <a:masterClrMapping/>
+  </p:clrMapOvr>
+</p:sld>
+</file>
+
+<file path=ppt/slides/slide35.xml><?xml version="1.0" encoding="utf-8"?>
+<p:sld xmlns:a="http://schemas.openxmlformats.org/drawingml/2006/main" xmlns:r="http://schemas.openxmlformats.org/officeDocument/2006/relationships" xmlns:p="http://schemas.openxmlformats.org/presentationml/2006/main" show="0">
+  <p:cSld>
+    <p:spTree>
+      <p:nvGrpSpPr>
+        <p:cNvPr id="1" name="">
+          <a:extLst>
+            <a:ext uri="{FF2B5EF4-FFF2-40B4-BE49-F238E27FC236}">
+              <a16:creationId xmlns:a16="http://schemas.microsoft.com/office/drawing/2014/main" id="{83521F07-4E1F-49F9-2D02-DD55B77794D9}"/>
+            </a:ext>
+          </a:extLst>
+        </p:cNvPr>
+        <p:cNvGrpSpPr/>
+        <p:nvPr/>
+      </p:nvGrpSpPr>
+      <p:grpSpPr>
+        <a:xfrm>
+          <a:off x="0" y="0"/>
+          <a:ext cx="0" cy="0"/>
+          <a:chOff x="0" y="0"/>
+          <a:chExt cx="0" cy="0"/>
+        </a:xfrm>
+      </p:grpSpPr>
+      <p:sp>
+        <p:nvSpPr>
+          <p:cNvPr id="56" name="PlaceHolder 1">
+            <a:extLst>
+              <a:ext uri="{FF2B5EF4-FFF2-40B4-BE49-F238E27FC236}">
+                <a16:creationId xmlns:a16="http://schemas.microsoft.com/office/drawing/2014/main" id="{A5DAF35C-CED3-5228-6B82-0AB26D2BA57D}"/>
+              </a:ext>
+            </a:extLst>
+          </p:cNvPr>
+          <p:cNvSpPr>
+            <a:spLocks noGrp="1"/>
+          </p:cNvSpPr>
+          <p:nvPr>
+            <p:ph type="title"/>
+          </p:nvPr>
+        </p:nvSpPr>
+        <p:spPr>
+          <a:xfrm>
+            <a:off x="1489680" y="576562"/>
+            <a:ext cx="9024480" cy="1096137"/>
+          </a:xfrm>
+          <a:prstGeom prst="rect">
+            <a:avLst/>
+          </a:prstGeom>
+          <a:noFill/>
+          <a:ln w="0">
+            <a:noFill/>
+          </a:ln>
+        </p:spPr>
+        <p:txBody>
+          <a:bodyPr lIns="0" tIns="0" rIns="0" bIns="0" anchor="b">
+            <a:noAutofit/>
+          </a:bodyPr>
+          <a:lstStyle/>
+          <a:p>
+            <a:pPr algn="ctr">
+              <a:lnSpc>
+                <a:spcPct val="90000"/>
+              </a:lnSpc>
+              <a:buNone/>
+            </a:pPr>
+            <a:r>
+              <a:rPr lang="pt-PT" sz="4000" b="0" strike="noStrike" spc="-1" dirty="0">
+                <a:solidFill>
+                  <a:srgbClr val="870F11"/>
+                </a:solidFill>
+                <a:latin typeface="Calibri"/>
+              </a:rPr>
+              <a:t>Tradução das interrogações do utilizador para SQL</a:t>
+            </a:r>
+            <a:endParaRPr lang="en-US" sz="4000" b="0" strike="noStrike" spc="-1" dirty="0">
+              <a:latin typeface="Arial"/>
+            </a:endParaRPr>
+          </a:p>
+        </p:txBody>
+      </p:sp>
+      <p:sp>
+        <p:nvSpPr>
+          <p:cNvPr id="57" name="Retângulo 4">
+            <a:extLst>
+              <a:ext uri="{FF2B5EF4-FFF2-40B4-BE49-F238E27FC236}">
+                <a16:creationId xmlns:a16="http://schemas.microsoft.com/office/drawing/2014/main" id="{C13E8AAB-9159-12D3-0020-B11C619A75C7}"/>
+              </a:ext>
+            </a:extLst>
+          </p:cNvPr>
+          <p:cNvSpPr/>
+          <p:nvPr/>
+        </p:nvSpPr>
+        <p:spPr>
+          <a:xfrm>
+            <a:off x="0" y="6233760"/>
+            <a:ext cx="12189960" cy="622080"/>
+          </a:xfrm>
+          <a:prstGeom prst="rect">
+            <a:avLst/>
+          </a:prstGeom>
+          <a:solidFill>
+            <a:srgbClr val="870F11"/>
+          </a:solidFill>
+          <a:ln>
+            <a:solidFill>
+              <a:srgbClr val="870F11"/>
+            </a:solidFill>
+          </a:ln>
+        </p:spPr>
+        <p:style>
+          <a:lnRef idx="2">
+            <a:schemeClr val="accent1">
+              <a:shade val="50000"/>
+            </a:schemeClr>
+          </a:lnRef>
+          <a:fillRef idx="1">
+            <a:schemeClr val="accent1"/>
+          </a:fillRef>
+          <a:effectRef idx="0">
+            <a:schemeClr val="accent1"/>
+          </a:effectRef>
+          <a:fontRef idx="minor"/>
+        </p:style>
+        <p:txBody>
+          <a:bodyPr/>
+          <a:lstStyle/>
+          <a:p>
+            <a:endParaRPr lang="pt-PT"/>
+          </a:p>
+        </p:txBody>
+      </p:sp>
+      <p:sp>
+        <p:nvSpPr>
+          <p:cNvPr id="58" name="CaixaDeTexto 5">
+            <a:extLst>
+              <a:ext uri="{FF2B5EF4-FFF2-40B4-BE49-F238E27FC236}">
+                <a16:creationId xmlns:a16="http://schemas.microsoft.com/office/drawing/2014/main" id="{C67CD105-BD21-B63B-E0C9-A4328B074B28}"/>
+              </a:ext>
+            </a:extLst>
+          </p:cNvPr>
+          <p:cNvSpPr/>
+          <p:nvPr/>
+        </p:nvSpPr>
+        <p:spPr>
+          <a:xfrm>
+            <a:off x="1489680" y="1828800"/>
+            <a:ext cx="9024480" cy="829543"/>
+          </a:xfrm>
+          <a:prstGeom prst="rect">
+            <a:avLst/>
+          </a:prstGeom>
+          <a:noFill/>
+          <a:ln w="0">
+            <a:noFill/>
+          </a:ln>
+        </p:spPr>
+        <p:style>
+          <a:lnRef idx="0">
+            <a:scrgbClr r="0" g="0" b="0"/>
+          </a:lnRef>
+          <a:fillRef idx="0">
+            <a:scrgbClr r="0" g="0" b="0"/>
+          </a:fillRef>
+          <a:effectRef idx="0">
+            <a:scrgbClr r="0" g="0" b="0"/>
+          </a:effectRef>
+          <a:fontRef idx="minor"/>
+        </p:style>
+        <p:txBody>
+          <a:bodyPr vertOverflow="overflow" horzOverflow="overflow" lIns="90000" tIns="45000" rIns="90000" bIns="45000" numCol="1" spcCol="0" anchor="t">
+            <a:spAutoFit/>
+          </a:bodyPr>
+          <a:lstStyle/>
+          <a:p>
+            <a:pPr algn="ctr">
+              <a:lnSpc>
+                <a:spcPct val="100000"/>
+              </a:lnSpc>
+              <a:buNone/>
+            </a:pPr>
+            <a:endParaRPr lang="en-US" sz="2400" b="0" strike="noStrike" spc="-1" dirty="0">
+              <a:latin typeface="Arial"/>
+            </a:endParaRPr>
+          </a:p>
+          <a:p>
+            <a:pPr algn="ctr">
+              <a:lnSpc>
+                <a:spcPct val="100000"/>
+              </a:lnSpc>
+              <a:buNone/>
+            </a:pPr>
+            <a:endParaRPr lang="en-US" sz="2400" b="0" strike="noStrike" spc="-1" dirty="0">
+              <a:latin typeface="Arial"/>
+            </a:endParaRPr>
+          </a:p>
+        </p:txBody>
+      </p:sp>
+      <p:pic>
+        <p:nvPicPr>
+          <p:cNvPr id="59" name="Imagem 3">
+            <a:extLst>
+              <a:ext uri="{FF2B5EF4-FFF2-40B4-BE49-F238E27FC236}">
+                <a16:creationId xmlns:a16="http://schemas.microsoft.com/office/drawing/2014/main" id="{26E5CAE5-3538-39E7-6D88-DB23ECF76F87}"/>
+              </a:ext>
+            </a:extLst>
+          </p:cNvPr>
+          <p:cNvPicPr/>
+          <p:nvPr/>
+        </p:nvPicPr>
+        <p:blipFill>
+          <a:blip r:embed="rId2"/>
+          <a:stretch/>
+        </p:blipFill>
+        <p:spPr>
+          <a:xfrm>
+            <a:off x="3240" y="6261480"/>
+            <a:ext cx="1236960" cy="709200"/>
+          </a:xfrm>
+          <a:prstGeom prst="rect">
+            <a:avLst/>
+          </a:prstGeom>
+          <a:ln w="0">
+            <a:noFill/>
+          </a:ln>
+        </p:spPr>
+      </p:pic>
+      <p:sp>
+        <p:nvSpPr>
+          <p:cNvPr id="60" name="CaixaDeTexto 1">
+            <a:extLst>
+              <a:ext uri="{FF2B5EF4-FFF2-40B4-BE49-F238E27FC236}">
+                <a16:creationId xmlns:a16="http://schemas.microsoft.com/office/drawing/2014/main" id="{DC1ADE9C-4860-F386-9DAA-1FD78C39BA4F}"/>
+              </a:ext>
+            </a:extLst>
+          </p:cNvPr>
+          <p:cNvSpPr/>
+          <p:nvPr/>
+        </p:nvSpPr>
+        <p:spPr>
+          <a:xfrm>
+            <a:off x="6629400" y="6362640"/>
+            <a:ext cx="5855760" cy="337100"/>
+          </a:xfrm>
+          <a:prstGeom prst="rect">
+            <a:avLst/>
+          </a:prstGeom>
+          <a:noFill/>
+          <a:ln w="0">
+            <a:noFill/>
+          </a:ln>
+        </p:spPr>
+        <p:style>
+          <a:lnRef idx="0">
+            <a:scrgbClr r="0" g="0" b="0"/>
+          </a:lnRef>
+          <a:fillRef idx="0">
+            <a:scrgbClr r="0" g="0" b="0"/>
+          </a:fillRef>
+          <a:effectRef idx="0">
+            <a:scrgbClr r="0" g="0" b="0"/>
+          </a:effectRef>
+          <a:fontRef idx="minor"/>
+        </p:style>
+        <p:txBody>
+          <a:bodyPr vertOverflow="overflow" horzOverflow="overflow" lIns="90000" tIns="45000" rIns="90000" bIns="45000" numCol="1" spcCol="0" anchor="t">
+            <a:spAutoFit/>
+          </a:bodyPr>
+          <a:lstStyle/>
+          <a:p>
+            <a:pPr>
+              <a:lnSpc>
+                <a:spcPct val="100000"/>
+              </a:lnSpc>
+              <a:buNone/>
+            </a:pPr>
+            <a:r>
+              <a:rPr lang="pt-PT" sz="1600" b="0" strike="noStrike" spc="-1" dirty="0">
+                <a:solidFill>
+                  <a:srgbClr val="FFFFFF"/>
+                </a:solidFill>
+                <a:latin typeface="Calibri"/>
+                <a:ea typeface="DejaVu Sans"/>
+              </a:rPr>
+              <a:t>Bases de Dados – Jogos Olímpicos   |   Parte 2 - Grupo 8</a:t>
+            </a:r>
+            <a:endParaRPr lang="en-US" sz="1600" b="0" strike="noStrike" spc="-1" dirty="0">
+              <a:latin typeface="Arial"/>
+            </a:endParaRPr>
+          </a:p>
+        </p:txBody>
+      </p:sp>
+      <p:pic>
+        <p:nvPicPr>
+          <p:cNvPr id="17411" name="Picture 3">
+            <a:extLst>
+              <a:ext uri="{FF2B5EF4-FFF2-40B4-BE49-F238E27FC236}">
+                <a16:creationId xmlns:a16="http://schemas.microsoft.com/office/drawing/2014/main" id="{69F11D26-0C59-F105-2FC5-EE80BDF7E14B}"/>
+              </a:ext>
+            </a:extLst>
+          </p:cNvPr>
+          <p:cNvPicPr>
+            <a:picLocks noChangeAspect="1" noChangeArrowheads="1"/>
+          </p:cNvPicPr>
+          <p:nvPr/>
+        </p:nvPicPr>
+        <p:blipFill>
+          <a:blip r:embed="rId3">
+            <a:extLst>
+              <a:ext uri="{28A0092B-C50C-407E-A947-70E740481C1C}">
+                <a14:useLocalDpi xmlns:a14="http://schemas.microsoft.com/office/drawing/2010/main" val="0"/>
+              </a:ext>
+            </a:extLst>
+          </a:blip>
+          <a:srcRect l="-14" t="-55" r="-14" b="-55"/>
+          <a:stretch>
+            <a:fillRect/>
+          </a:stretch>
+        </p:blipFill>
+        <p:spPr bwMode="auto">
+          <a:xfrm>
+            <a:off x="1332751" y="2171982"/>
+            <a:ext cx="9526498" cy="2514035"/>
+          </a:xfrm>
+          <a:prstGeom prst="rect">
+            <a:avLst/>
+          </a:prstGeom>
+          <a:ln w="38100" cap="sq">
+            <a:solidFill>
+              <a:srgbClr val="000000"/>
+            </a:solidFill>
+            <a:prstDash val="solid"/>
+            <a:miter lim="800000"/>
+          </a:ln>
+          <a:effectLst>
+            <a:outerShdw blurRad="50800" dist="38100" dir="2700000" algn="tl" rotWithShape="0">
+              <a:srgbClr val="000000">
+                <a:alpha val="43000"/>
+              </a:srgbClr>
+            </a:outerShdw>
+          </a:effectLst>
+          <a:extLst>
+            <a:ext uri="{91240B29-F687-4F45-9708-019B960494DF}">
+              <a14:hiddenLine xmlns:a14="http://schemas.microsoft.com/office/drawing/2010/main" w="9525">
+                <a:solidFill>
+                  <a:srgbClr val="000000"/>
+                </a:solidFill>
+                <a:miter lim="800000"/>
+                <a:headEnd/>
+                <a:tailEnd/>
+              </a14:hiddenLine>
+            </a:ext>
+          </a:extLst>
+        </p:spPr>
+      </p:pic>
+    </p:spTree>
+    <p:extLst>
+      <p:ext uri="{BB962C8B-B14F-4D97-AF65-F5344CB8AC3E}">
+        <p14:creationId xmlns:p14="http://schemas.microsoft.com/office/powerpoint/2010/main" val="1184171978"/>
+      </p:ext>
+    </p:extLst>
+  </p:cSld>
+  <p:clrMapOvr>
+    <a:masterClrMapping/>
+  </p:clrMapOvr>
+</p:sld>
+</file>
+
+<file path=ppt/slides/slide36.xml><?xml version="1.0" encoding="utf-8"?>
+<p:sld xmlns:a="http://schemas.openxmlformats.org/drawingml/2006/main" xmlns:r="http://schemas.openxmlformats.org/officeDocument/2006/relationships" xmlns:p="http://schemas.openxmlformats.org/presentationml/2006/main" show="0">
+  <p:cSld>
+    <p:spTree>
+      <p:nvGrpSpPr>
+        <p:cNvPr id="1" name="">
+          <a:extLst>
+            <a:ext uri="{FF2B5EF4-FFF2-40B4-BE49-F238E27FC236}">
+              <a16:creationId xmlns:a16="http://schemas.microsoft.com/office/drawing/2014/main" id="{834EE7F9-8458-9B60-049F-5C2630696827}"/>
+            </a:ext>
+          </a:extLst>
+        </p:cNvPr>
+        <p:cNvGrpSpPr/>
+        <p:nvPr/>
+      </p:nvGrpSpPr>
+      <p:grpSpPr>
+        <a:xfrm>
+          <a:off x="0" y="0"/>
+          <a:ext cx="0" cy="0"/>
+          <a:chOff x="0" y="0"/>
+          <a:chExt cx="0" cy="0"/>
+        </a:xfrm>
+      </p:grpSpPr>
+      <p:sp>
+        <p:nvSpPr>
+          <p:cNvPr id="56" name="PlaceHolder 1">
+            <a:extLst>
+              <a:ext uri="{FF2B5EF4-FFF2-40B4-BE49-F238E27FC236}">
+                <a16:creationId xmlns:a16="http://schemas.microsoft.com/office/drawing/2014/main" id="{3D2CBB03-3468-59F0-31CB-183AE0046D96}"/>
+              </a:ext>
+            </a:extLst>
+          </p:cNvPr>
+          <p:cNvSpPr>
+            <a:spLocks noGrp="1"/>
+          </p:cNvSpPr>
+          <p:nvPr>
+            <p:ph type="title"/>
+          </p:nvPr>
+        </p:nvSpPr>
+        <p:spPr>
+          <a:xfrm>
+            <a:off x="1489680" y="576562"/>
+            <a:ext cx="9024480" cy="1096137"/>
+          </a:xfrm>
+          <a:prstGeom prst="rect">
+            <a:avLst/>
+          </a:prstGeom>
+          <a:noFill/>
+          <a:ln w="0">
+            <a:noFill/>
+          </a:ln>
+        </p:spPr>
+        <p:txBody>
+          <a:bodyPr lIns="0" tIns="0" rIns="0" bIns="0" anchor="b">
+            <a:noAutofit/>
+          </a:bodyPr>
+          <a:lstStyle/>
+          <a:p>
+            <a:pPr algn="ctr">
+              <a:lnSpc>
+                <a:spcPct val="90000"/>
+              </a:lnSpc>
+              <a:buNone/>
+            </a:pPr>
+            <a:r>
+              <a:rPr lang="pt-PT" sz="4000" b="0" strike="noStrike" spc="-1" dirty="0">
+                <a:solidFill>
+                  <a:srgbClr val="870F11"/>
+                </a:solidFill>
+                <a:latin typeface="Calibri"/>
+              </a:rPr>
+              <a:t>Tradução das interrogações do utilizador para SQL</a:t>
+            </a:r>
+            <a:endParaRPr lang="en-US" sz="4000" b="0" strike="noStrike" spc="-1" dirty="0">
+              <a:latin typeface="Arial"/>
+            </a:endParaRPr>
+          </a:p>
+        </p:txBody>
+      </p:sp>
+      <p:sp>
+        <p:nvSpPr>
+          <p:cNvPr id="57" name="Retângulo 4">
+            <a:extLst>
+              <a:ext uri="{FF2B5EF4-FFF2-40B4-BE49-F238E27FC236}">
+                <a16:creationId xmlns:a16="http://schemas.microsoft.com/office/drawing/2014/main" id="{01BA3BCF-1EF4-2C62-FA00-815BCEEE5A0E}"/>
+              </a:ext>
+            </a:extLst>
+          </p:cNvPr>
+          <p:cNvSpPr/>
+          <p:nvPr/>
+        </p:nvSpPr>
+        <p:spPr>
+          <a:xfrm>
+            <a:off x="0" y="6233760"/>
+            <a:ext cx="12189960" cy="622080"/>
+          </a:xfrm>
+          <a:prstGeom prst="rect">
+            <a:avLst/>
+          </a:prstGeom>
+          <a:solidFill>
+            <a:srgbClr val="870F11"/>
+          </a:solidFill>
+          <a:ln>
+            <a:solidFill>
+              <a:srgbClr val="870F11"/>
+            </a:solidFill>
+          </a:ln>
+        </p:spPr>
+        <p:style>
+          <a:lnRef idx="2">
+            <a:schemeClr val="accent1">
+              <a:shade val="50000"/>
+            </a:schemeClr>
+          </a:lnRef>
+          <a:fillRef idx="1">
+            <a:schemeClr val="accent1"/>
+          </a:fillRef>
+          <a:effectRef idx="0">
+            <a:schemeClr val="accent1"/>
+          </a:effectRef>
+          <a:fontRef idx="minor"/>
+        </p:style>
+        <p:txBody>
+          <a:bodyPr/>
+          <a:lstStyle/>
+          <a:p>
+            <a:endParaRPr lang="pt-PT"/>
+          </a:p>
+        </p:txBody>
+      </p:sp>
+      <p:sp>
+        <p:nvSpPr>
+          <p:cNvPr id="58" name="CaixaDeTexto 5">
+            <a:extLst>
+              <a:ext uri="{FF2B5EF4-FFF2-40B4-BE49-F238E27FC236}">
+                <a16:creationId xmlns:a16="http://schemas.microsoft.com/office/drawing/2014/main" id="{0A5A540A-D493-D6BE-7D2A-0FBAD50F45CF}"/>
+              </a:ext>
+            </a:extLst>
+          </p:cNvPr>
+          <p:cNvSpPr/>
+          <p:nvPr/>
+        </p:nvSpPr>
+        <p:spPr>
+          <a:xfrm>
+            <a:off x="1489680" y="1828800"/>
+            <a:ext cx="9024480" cy="829543"/>
+          </a:xfrm>
+          <a:prstGeom prst="rect">
+            <a:avLst/>
+          </a:prstGeom>
+          <a:noFill/>
+          <a:ln w="0">
+            <a:noFill/>
+          </a:ln>
+        </p:spPr>
+        <p:style>
+          <a:lnRef idx="0">
+            <a:scrgbClr r="0" g="0" b="0"/>
+          </a:lnRef>
+          <a:fillRef idx="0">
+            <a:scrgbClr r="0" g="0" b="0"/>
+          </a:fillRef>
+          <a:effectRef idx="0">
+            <a:scrgbClr r="0" g="0" b="0"/>
+          </a:effectRef>
+          <a:fontRef idx="minor"/>
+        </p:style>
+        <p:txBody>
+          <a:bodyPr vertOverflow="overflow" horzOverflow="overflow" lIns="90000" tIns="45000" rIns="90000" bIns="45000" numCol="1" spcCol="0" anchor="t">
+            <a:spAutoFit/>
+          </a:bodyPr>
+          <a:lstStyle/>
+          <a:p>
+            <a:pPr algn="ctr">
+              <a:lnSpc>
+                <a:spcPct val="100000"/>
+              </a:lnSpc>
+              <a:buNone/>
+            </a:pPr>
+            <a:endParaRPr lang="en-US" sz="2400" b="0" strike="noStrike" spc="-1" dirty="0">
+              <a:latin typeface="Arial"/>
+            </a:endParaRPr>
+          </a:p>
+          <a:p>
+            <a:pPr algn="ctr">
+              <a:lnSpc>
+                <a:spcPct val="100000"/>
+              </a:lnSpc>
+              <a:buNone/>
+            </a:pPr>
+            <a:endParaRPr lang="en-US" sz="2400" b="0" strike="noStrike" spc="-1" dirty="0">
+              <a:latin typeface="Arial"/>
+            </a:endParaRPr>
+          </a:p>
+        </p:txBody>
+      </p:sp>
+      <p:pic>
+        <p:nvPicPr>
+          <p:cNvPr id="59" name="Imagem 3">
+            <a:extLst>
+              <a:ext uri="{FF2B5EF4-FFF2-40B4-BE49-F238E27FC236}">
+                <a16:creationId xmlns:a16="http://schemas.microsoft.com/office/drawing/2014/main" id="{105F8328-3408-8040-2C10-C0831162C975}"/>
+              </a:ext>
+            </a:extLst>
+          </p:cNvPr>
+          <p:cNvPicPr/>
+          <p:nvPr/>
+        </p:nvPicPr>
+        <p:blipFill>
+          <a:blip r:embed="rId2"/>
+          <a:stretch/>
+        </p:blipFill>
+        <p:spPr>
+          <a:xfrm>
+            <a:off x="3240" y="6261480"/>
+            <a:ext cx="1236960" cy="709200"/>
+          </a:xfrm>
+          <a:prstGeom prst="rect">
+            <a:avLst/>
+          </a:prstGeom>
+          <a:ln w="0">
+            <a:noFill/>
+          </a:ln>
+        </p:spPr>
+      </p:pic>
+      <p:sp>
+        <p:nvSpPr>
+          <p:cNvPr id="60" name="CaixaDeTexto 1">
+            <a:extLst>
+              <a:ext uri="{FF2B5EF4-FFF2-40B4-BE49-F238E27FC236}">
+                <a16:creationId xmlns:a16="http://schemas.microsoft.com/office/drawing/2014/main" id="{ABF6BC0D-EFA8-5B4F-D0FE-1821BEB292E3}"/>
+              </a:ext>
+            </a:extLst>
+          </p:cNvPr>
+          <p:cNvSpPr/>
+          <p:nvPr/>
+        </p:nvSpPr>
+        <p:spPr>
+          <a:xfrm>
+            <a:off x="6629400" y="6362640"/>
+            <a:ext cx="5855760" cy="337100"/>
+          </a:xfrm>
+          <a:prstGeom prst="rect">
+            <a:avLst/>
+          </a:prstGeom>
+          <a:noFill/>
+          <a:ln w="0">
+            <a:noFill/>
+          </a:ln>
+        </p:spPr>
+        <p:style>
+          <a:lnRef idx="0">
+            <a:scrgbClr r="0" g="0" b="0"/>
+          </a:lnRef>
+          <a:fillRef idx="0">
+            <a:scrgbClr r="0" g="0" b="0"/>
+          </a:fillRef>
+          <a:effectRef idx="0">
+            <a:scrgbClr r="0" g="0" b="0"/>
+          </a:effectRef>
+          <a:fontRef idx="minor"/>
+        </p:style>
+        <p:txBody>
+          <a:bodyPr vertOverflow="overflow" horzOverflow="overflow" lIns="90000" tIns="45000" rIns="90000" bIns="45000" numCol="1" spcCol="0" anchor="t">
+            <a:spAutoFit/>
+          </a:bodyPr>
+          <a:lstStyle/>
+          <a:p>
+            <a:pPr>
+              <a:lnSpc>
+                <a:spcPct val="100000"/>
+              </a:lnSpc>
+              <a:buNone/>
+            </a:pPr>
+            <a:r>
+              <a:rPr lang="pt-PT" sz="1600" b="0" strike="noStrike" spc="-1" dirty="0">
+                <a:solidFill>
+                  <a:srgbClr val="FFFFFF"/>
+                </a:solidFill>
+                <a:latin typeface="Calibri"/>
+                <a:ea typeface="DejaVu Sans"/>
+              </a:rPr>
+              <a:t>Bases de Dados – Jogos Olímpicos   |   Parte 2 - Grupo 8</a:t>
+            </a:r>
+            <a:endParaRPr lang="en-US" sz="1600" b="0" strike="noStrike" spc="-1" dirty="0">
+              <a:latin typeface="Arial"/>
+            </a:endParaRPr>
+          </a:p>
+        </p:txBody>
+      </p:sp>
+      <p:pic>
+        <p:nvPicPr>
+          <p:cNvPr id="16386" name="Imagem 1">
+            <a:extLst>
+              <a:ext uri="{FF2B5EF4-FFF2-40B4-BE49-F238E27FC236}">
+                <a16:creationId xmlns:a16="http://schemas.microsoft.com/office/drawing/2014/main" id="{3D2147A1-D081-4C5F-49D3-AC26AF7FB58B}"/>
+              </a:ext>
+            </a:extLst>
+          </p:cNvPr>
+          <p:cNvPicPr>
+            <a:picLocks noChangeAspect="1" noChangeArrowheads="1"/>
+          </p:cNvPicPr>
+          <p:nvPr/>
+        </p:nvPicPr>
+        <p:blipFill>
+          <a:blip r:embed="rId3">
+            <a:extLst>
+              <a:ext uri="{28A0092B-C50C-407E-A947-70E740481C1C}">
+                <a14:useLocalDpi xmlns:a14="http://schemas.microsoft.com/office/drawing/2010/main" val="0"/>
+              </a:ext>
+            </a:extLst>
+          </a:blip>
+          <a:srcRect/>
+          <a:stretch>
+            <a:fillRect/>
+          </a:stretch>
+        </p:blipFill>
+        <p:spPr bwMode="auto">
+          <a:xfrm>
+            <a:off x="1002121" y="2243571"/>
+            <a:ext cx="10185718" cy="2734917"/>
+          </a:xfrm>
+          <a:prstGeom prst="rect">
+            <a:avLst/>
+          </a:prstGeom>
+          <a:ln w="38100" cap="sq">
+            <a:solidFill>
+              <a:srgbClr val="000000"/>
+            </a:solidFill>
+            <a:prstDash val="solid"/>
+            <a:miter lim="800000"/>
+          </a:ln>
+          <a:effectLst>
+            <a:outerShdw blurRad="50800" dist="38100" dir="2700000" algn="tl" rotWithShape="0">
+              <a:srgbClr val="000000">
+                <a:alpha val="43000"/>
+              </a:srgbClr>
+            </a:outerShdw>
+          </a:effectLst>
+          <a:extLst>
+            <a:ext uri="{909E8E84-426E-40DD-AFC4-6F175D3DCCD1}">
+              <a14:hiddenFill xmlns:a14="http://schemas.microsoft.com/office/drawing/2010/main">
+                <a:solidFill>
+                  <a:srgbClr val="FFFFFF"/>
+                </a:solidFill>
+              </a14:hiddenFill>
+            </a:ext>
+            <a:ext uri="{91240B29-F687-4F45-9708-019B960494DF}">
+              <a14:hiddenLine xmlns:a14="http://schemas.microsoft.com/office/drawing/2010/main" w="9525">
+                <a:solidFill>
+                  <a:srgbClr val="000000"/>
+                </a:solidFill>
+                <a:miter lim="800000"/>
+                <a:headEnd/>
+                <a:tailEnd/>
+              </a14:hiddenLine>
+            </a:ext>
+          </a:extLst>
+        </p:spPr>
+      </p:pic>
+    </p:spTree>
+    <p:extLst>
+      <p:ext uri="{BB962C8B-B14F-4D97-AF65-F5344CB8AC3E}">
+        <p14:creationId xmlns:p14="http://schemas.microsoft.com/office/powerpoint/2010/main" val="2920255066"/>
+      </p:ext>
+    </p:extLst>
+  </p:cSld>
+  <p:clrMapOvr>
+    <a:masterClrMapping/>
+  </p:clrMapOvr>
+</p:sld>
+</file>
+
+<file path=ppt/slides/slide37.xml><?xml version="1.0" encoding="utf-8"?>
+<p:sld xmlns:a="http://schemas.openxmlformats.org/drawingml/2006/main" xmlns:r="http://schemas.openxmlformats.org/officeDocument/2006/relationships" xmlns:p="http://schemas.openxmlformats.org/presentationml/2006/main" show="0">
+  <p:cSld>
+    <p:spTree>
+      <p:nvGrpSpPr>
+        <p:cNvPr id="1" name="">
+          <a:extLst>
+            <a:ext uri="{FF2B5EF4-FFF2-40B4-BE49-F238E27FC236}">
+              <a16:creationId xmlns:a16="http://schemas.microsoft.com/office/drawing/2014/main" id="{B9602CE5-4858-B8B9-6247-9549CBF383FB}"/>
+            </a:ext>
+          </a:extLst>
+        </p:cNvPr>
+        <p:cNvGrpSpPr/>
+        <p:nvPr/>
+      </p:nvGrpSpPr>
+      <p:grpSpPr>
+        <a:xfrm>
+          <a:off x="0" y="0"/>
+          <a:ext cx="0" cy="0"/>
+          <a:chOff x="0" y="0"/>
+          <a:chExt cx="0" cy="0"/>
+        </a:xfrm>
+      </p:grpSpPr>
+      <p:sp>
+        <p:nvSpPr>
+          <p:cNvPr id="56" name="PlaceHolder 1">
+            <a:extLst>
+              <a:ext uri="{FF2B5EF4-FFF2-40B4-BE49-F238E27FC236}">
+                <a16:creationId xmlns:a16="http://schemas.microsoft.com/office/drawing/2014/main" id="{5485EFFE-DD8A-8C97-5DEF-EB69EE5200BA}"/>
+              </a:ext>
+            </a:extLst>
+          </p:cNvPr>
+          <p:cNvSpPr>
+            <a:spLocks noGrp="1"/>
+          </p:cNvSpPr>
+          <p:nvPr>
+            <p:ph type="title"/>
+          </p:nvPr>
+        </p:nvSpPr>
+        <p:spPr>
+          <a:xfrm>
+            <a:off x="1489680" y="576562"/>
+            <a:ext cx="9024480" cy="1096137"/>
+          </a:xfrm>
+          <a:prstGeom prst="rect">
+            <a:avLst/>
+          </a:prstGeom>
+          <a:noFill/>
+          <a:ln w="0">
+            <a:noFill/>
+          </a:ln>
+        </p:spPr>
+        <p:txBody>
+          <a:bodyPr lIns="0" tIns="0" rIns="0" bIns="0" anchor="b">
+            <a:noAutofit/>
+          </a:bodyPr>
+          <a:lstStyle/>
+          <a:p>
+            <a:pPr algn="ctr">
+              <a:lnSpc>
+                <a:spcPct val="90000"/>
+              </a:lnSpc>
+              <a:buNone/>
+            </a:pPr>
+            <a:r>
+              <a:rPr lang="pt-PT" sz="4000" b="0" strike="noStrike" spc="-1" dirty="0">
+                <a:solidFill>
+                  <a:srgbClr val="870F11"/>
+                </a:solidFill>
+                <a:latin typeface="Calibri"/>
+              </a:rPr>
+              <a:t>Tradução das interrogações do utilizador para SQL</a:t>
+            </a:r>
+            <a:endParaRPr lang="en-US" sz="4000" b="0" strike="noStrike" spc="-1" dirty="0">
+              <a:latin typeface="Arial"/>
+            </a:endParaRPr>
+          </a:p>
+        </p:txBody>
+      </p:sp>
+      <p:sp>
+        <p:nvSpPr>
+          <p:cNvPr id="57" name="Retângulo 4">
+            <a:extLst>
+              <a:ext uri="{FF2B5EF4-FFF2-40B4-BE49-F238E27FC236}">
+                <a16:creationId xmlns:a16="http://schemas.microsoft.com/office/drawing/2014/main" id="{23D4FDCD-D292-0132-1760-B908041EE9BC}"/>
+              </a:ext>
+            </a:extLst>
+          </p:cNvPr>
+          <p:cNvSpPr/>
+          <p:nvPr/>
+        </p:nvSpPr>
+        <p:spPr>
+          <a:xfrm>
+            <a:off x="0" y="6233760"/>
+            <a:ext cx="12189960" cy="622080"/>
+          </a:xfrm>
+          <a:prstGeom prst="rect">
+            <a:avLst/>
+          </a:prstGeom>
+          <a:solidFill>
+            <a:srgbClr val="870F11"/>
+          </a:solidFill>
+          <a:ln>
+            <a:solidFill>
+              <a:srgbClr val="870F11"/>
+            </a:solidFill>
+          </a:ln>
+        </p:spPr>
+        <p:style>
+          <a:lnRef idx="2">
+            <a:schemeClr val="accent1">
+              <a:shade val="50000"/>
+            </a:schemeClr>
+          </a:lnRef>
+          <a:fillRef idx="1">
+            <a:schemeClr val="accent1"/>
+          </a:fillRef>
+          <a:effectRef idx="0">
+            <a:schemeClr val="accent1"/>
+          </a:effectRef>
+          <a:fontRef idx="minor"/>
+        </p:style>
+        <p:txBody>
+          <a:bodyPr/>
+          <a:lstStyle/>
+          <a:p>
+            <a:endParaRPr lang="pt-PT"/>
+          </a:p>
+        </p:txBody>
+      </p:sp>
+      <p:sp>
+        <p:nvSpPr>
+          <p:cNvPr id="58" name="CaixaDeTexto 5">
+            <a:extLst>
+              <a:ext uri="{FF2B5EF4-FFF2-40B4-BE49-F238E27FC236}">
+                <a16:creationId xmlns:a16="http://schemas.microsoft.com/office/drawing/2014/main" id="{06B8DCED-8B63-7F0C-76FD-B14849514D63}"/>
+              </a:ext>
+            </a:extLst>
+          </p:cNvPr>
+          <p:cNvSpPr/>
+          <p:nvPr/>
+        </p:nvSpPr>
+        <p:spPr>
+          <a:xfrm>
+            <a:off x="1489680" y="1828800"/>
+            <a:ext cx="9024480" cy="829543"/>
+          </a:xfrm>
+          <a:prstGeom prst="rect">
+            <a:avLst/>
+          </a:prstGeom>
+          <a:noFill/>
+          <a:ln w="0">
+            <a:noFill/>
+          </a:ln>
+        </p:spPr>
+        <p:style>
+          <a:lnRef idx="0">
+            <a:scrgbClr r="0" g="0" b="0"/>
+          </a:lnRef>
+          <a:fillRef idx="0">
+            <a:scrgbClr r="0" g="0" b="0"/>
+          </a:fillRef>
+          <a:effectRef idx="0">
+            <a:scrgbClr r="0" g="0" b="0"/>
+          </a:effectRef>
+          <a:fontRef idx="minor"/>
+        </p:style>
+        <p:txBody>
+          <a:bodyPr vertOverflow="overflow" horzOverflow="overflow" lIns="90000" tIns="45000" rIns="90000" bIns="45000" numCol="1" spcCol="0" anchor="t">
+            <a:spAutoFit/>
+          </a:bodyPr>
+          <a:lstStyle/>
+          <a:p>
+            <a:pPr algn="ctr">
+              <a:lnSpc>
+                <a:spcPct val="100000"/>
+              </a:lnSpc>
+              <a:buNone/>
+            </a:pPr>
+            <a:endParaRPr lang="en-US" sz="2400" b="0" strike="noStrike" spc="-1" dirty="0">
+              <a:latin typeface="Arial"/>
+            </a:endParaRPr>
+          </a:p>
+          <a:p>
+            <a:pPr algn="ctr">
+              <a:lnSpc>
+                <a:spcPct val="100000"/>
+              </a:lnSpc>
+              <a:buNone/>
+            </a:pPr>
+            <a:endParaRPr lang="en-US" sz="2400" b="0" strike="noStrike" spc="-1" dirty="0">
+              <a:latin typeface="Arial"/>
+            </a:endParaRPr>
+          </a:p>
+        </p:txBody>
+      </p:sp>
+      <p:pic>
+        <p:nvPicPr>
+          <p:cNvPr id="59" name="Imagem 3">
+            <a:extLst>
+              <a:ext uri="{FF2B5EF4-FFF2-40B4-BE49-F238E27FC236}">
+                <a16:creationId xmlns:a16="http://schemas.microsoft.com/office/drawing/2014/main" id="{002D8968-B2AC-CA7C-87A6-08CFC54DDA9C}"/>
+              </a:ext>
+            </a:extLst>
+          </p:cNvPr>
+          <p:cNvPicPr/>
+          <p:nvPr/>
+        </p:nvPicPr>
+        <p:blipFill>
+          <a:blip r:embed="rId2"/>
+          <a:stretch/>
+        </p:blipFill>
+        <p:spPr>
+          <a:xfrm>
+            <a:off x="3240" y="6261480"/>
+            <a:ext cx="1236960" cy="709200"/>
+          </a:xfrm>
+          <a:prstGeom prst="rect">
+            <a:avLst/>
+          </a:prstGeom>
+          <a:ln w="0">
+            <a:noFill/>
+          </a:ln>
+        </p:spPr>
+      </p:pic>
+      <p:sp>
+        <p:nvSpPr>
+          <p:cNvPr id="60" name="CaixaDeTexto 1">
+            <a:extLst>
+              <a:ext uri="{FF2B5EF4-FFF2-40B4-BE49-F238E27FC236}">
+                <a16:creationId xmlns:a16="http://schemas.microsoft.com/office/drawing/2014/main" id="{655C1821-37FB-A030-8B68-3AD0A9D907CF}"/>
+              </a:ext>
+            </a:extLst>
+          </p:cNvPr>
+          <p:cNvSpPr/>
+          <p:nvPr/>
+        </p:nvSpPr>
+        <p:spPr>
+          <a:xfrm>
+            <a:off x="6629400" y="6362640"/>
+            <a:ext cx="5855760" cy="337100"/>
+          </a:xfrm>
+          <a:prstGeom prst="rect">
+            <a:avLst/>
+          </a:prstGeom>
+          <a:noFill/>
+          <a:ln w="0">
+            <a:noFill/>
+          </a:ln>
+        </p:spPr>
+        <p:style>
+          <a:lnRef idx="0">
+            <a:scrgbClr r="0" g="0" b="0"/>
+          </a:lnRef>
+          <a:fillRef idx="0">
+            <a:scrgbClr r="0" g="0" b="0"/>
+          </a:fillRef>
+          <a:effectRef idx="0">
+            <a:scrgbClr r="0" g="0" b="0"/>
+          </a:effectRef>
+          <a:fontRef idx="minor"/>
+        </p:style>
+        <p:txBody>
+          <a:bodyPr vertOverflow="overflow" horzOverflow="overflow" lIns="90000" tIns="45000" rIns="90000" bIns="45000" numCol="1" spcCol="0" anchor="t">
+            <a:spAutoFit/>
+          </a:bodyPr>
+          <a:lstStyle/>
+          <a:p>
+            <a:pPr>
+              <a:lnSpc>
+                <a:spcPct val="100000"/>
+              </a:lnSpc>
+              <a:buNone/>
+            </a:pPr>
+            <a:r>
+              <a:rPr lang="pt-PT" sz="1600" b="0" strike="noStrike" spc="-1" dirty="0">
+                <a:solidFill>
+                  <a:srgbClr val="FFFFFF"/>
+                </a:solidFill>
+                <a:latin typeface="Calibri"/>
+                <a:ea typeface="DejaVu Sans"/>
+              </a:rPr>
+              <a:t>Bases de Dados – Jogos Olímpicos   |   Parte 2 - Grupo 8</a:t>
+            </a:r>
+            <a:endParaRPr lang="en-US" sz="1600" b="0" strike="noStrike" spc="-1" dirty="0">
+              <a:latin typeface="Arial"/>
+            </a:endParaRPr>
+          </a:p>
+        </p:txBody>
+      </p:sp>
+      <p:pic>
+        <p:nvPicPr>
+          <p:cNvPr id="18434" name="Picture 2">
+            <a:extLst>
+              <a:ext uri="{FF2B5EF4-FFF2-40B4-BE49-F238E27FC236}">
+                <a16:creationId xmlns:a16="http://schemas.microsoft.com/office/drawing/2014/main" id="{A2639C6B-F819-59A3-AE1F-718A90394978}"/>
+              </a:ext>
+            </a:extLst>
+          </p:cNvPr>
+          <p:cNvPicPr>
+            <a:picLocks noChangeAspect="1" noChangeArrowheads="1"/>
+          </p:cNvPicPr>
+          <p:nvPr/>
+        </p:nvPicPr>
+        <p:blipFill>
+          <a:blip r:embed="rId3">
+            <a:extLst>
+              <a:ext uri="{28A0092B-C50C-407E-A947-70E740481C1C}">
+                <a14:useLocalDpi xmlns:a14="http://schemas.microsoft.com/office/drawing/2010/main" val="0"/>
+              </a:ext>
+            </a:extLst>
+          </a:blip>
+          <a:srcRect l="-15" t="-40" r="-15" b="-40"/>
+          <a:stretch>
+            <a:fillRect/>
+          </a:stretch>
+        </p:blipFill>
+        <p:spPr bwMode="auto">
+          <a:xfrm>
+            <a:off x="1582740" y="2243571"/>
+            <a:ext cx="9024480" cy="3534112"/>
+          </a:xfrm>
+          <a:prstGeom prst="rect">
+            <a:avLst/>
+          </a:prstGeom>
+          <a:ln w="38100" cap="sq">
+            <a:solidFill>
+              <a:srgbClr val="000000"/>
+            </a:solidFill>
+            <a:prstDash val="solid"/>
+            <a:miter lim="800000"/>
+          </a:ln>
+          <a:effectLst>
+            <a:outerShdw blurRad="50800" dist="38100" dir="2700000" algn="tl" rotWithShape="0">
+              <a:srgbClr val="000000">
+                <a:alpha val="43000"/>
+              </a:srgbClr>
+            </a:outerShdw>
+          </a:effectLst>
+          <a:extLst>
+            <a:ext uri="{91240B29-F687-4F45-9708-019B960494DF}">
+              <a14:hiddenLine xmlns:a14="http://schemas.microsoft.com/office/drawing/2010/main" w="9525">
+                <a:solidFill>
+                  <a:srgbClr val="000000"/>
+                </a:solidFill>
+                <a:miter lim="800000"/>
+                <a:headEnd/>
+                <a:tailEnd/>
+              </a14:hiddenLine>
+            </a:ext>
+          </a:extLst>
+        </p:spPr>
+      </p:pic>
+    </p:spTree>
+    <p:extLst>
+      <p:ext uri="{BB962C8B-B14F-4D97-AF65-F5344CB8AC3E}">
+        <p14:creationId xmlns:p14="http://schemas.microsoft.com/office/powerpoint/2010/main" val="401376195"/>
+      </p:ext>
+    </p:extLst>
+  </p:cSld>
+  <p:clrMapOvr>
+    <a:masterClrMapping/>
+  </p:clrMapOvr>
+</p:sld>
+</file>
+
+<file path=ppt/slides/slide38.xml><?xml version="1.0" encoding="utf-8"?>
+<p:sld xmlns:a="http://schemas.openxmlformats.org/drawingml/2006/main" xmlns:r="http://schemas.openxmlformats.org/officeDocument/2006/relationships" xmlns:p="http://schemas.openxmlformats.org/presentationml/2006/main" show="0">
+  <p:cSld>
+    <p:spTree>
+      <p:nvGrpSpPr>
+        <p:cNvPr id="1" name="">
+          <a:extLst>
+            <a:ext uri="{FF2B5EF4-FFF2-40B4-BE49-F238E27FC236}">
+              <a16:creationId xmlns:a16="http://schemas.microsoft.com/office/drawing/2014/main" id="{8F19B2B3-08C6-432C-BCF7-C4403FB79761}"/>
+            </a:ext>
+          </a:extLst>
+        </p:cNvPr>
+        <p:cNvGrpSpPr/>
+        <p:nvPr/>
+      </p:nvGrpSpPr>
+      <p:grpSpPr>
+        <a:xfrm>
+          <a:off x="0" y="0"/>
+          <a:ext cx="0" cy="0"/>
+          <a:chOff x="0" y="0"/>
+          <a:chExt cx="0" cy="0"/>
+        </a:xfrm>
+      </p:grpSpPr>
+      <p:sp>
+        <p:nvSpPr>
+          <p:cNvPr id="56" name="PlaceHolder 1">
+            <a:extLst>
+              <a:ext uri="{FF2B5EF4-FFF2-40B4-BE49-F238E27FC236}">
+                <a16:creationId xmlns:a16="http://schemas.microsoft.com/office/drawing/2014/main" id="{E7061AA5-0EE5-91CA-5B9B-B8E4B619F40F}"/>
+              </a:ext>
+            </a:extLst>
+          </p:cNvPr>
+          <p:cNvSpPr>
+            <a:spLocks noGrp="1"/>
+          </p:cNvSpPr>
+          <p:nvPr>
+            <p:ph type="title"/>
+          </p:nvPr>
+        </p:nvSpPr>
+        <p:spPr>
+          <a:xfrm>
+            <a:off x="1489680" y="576562"/>
+            <a:ext cx="9024480" cy="1096137"/>
+          </a:xfrm>
+          <a:prstGeom prst="rect">
+            <a:avLst/>
+          </a:prstGeom>
+          <a:noFill/>
+          <a:ln w="0">
+            <a:noFill/>
+          </a:ln>
+        </p:spPr>
+        <p:txBody>
+          <a:bodyPr lIns="0" tIns="0" rIns="0" bIns="0" anchor="b">
+            <a:noAutofit/>
+          </a:bodyPr>
+          <a:lstStyle/>
+          <a:p>
+            <a:pPr algn="ctr">
+              <a:lnSpc>
+                <a:spcPct val="90000"/>
+              </a:lnSpc>
+              <a:buNone/>
+            </a:pPr>
+            <a:r>
+              <a:rPr lang="pt-PT" sz="4000" b="0" strike="noStrike" spc="-1" dirty="0">
+                <a:solidFill>
+                  <a:srgbClr val="870F11"/>
+                </a:solidFill>
+                <a:latin typeface="Calibri"/>
+              </a:rPr>
+              <a:t>Tradução das interrogações do utilizador para SQL</a:t>
+            </a:r>
+            <a:endParaRPr lang="en-US" sz="4000" b="0" strike="noStrike" spc="-1" dirty="0">
+              <a:latin typeface="Arial"/>
+            </a:endParaRPr>
+          </a:p>
+        </p:txBody>
+      </p:sp>
+      <p:sp>
+        <p:nvSpPr>
+          <p:cNvPr id="57" name="Retângulo 4">
+            <a:extLst>
+              <a:ext uri="{FF2B5EF4-FFF2-40B4-BE49-F238E27FC236}">
+                <a16:creationId xmlns:a16="http://schemas.microsoft.com/office/drawing/2014/main" id="{43E791B0-B736-1BAE-C323-33CB62D26DCB}"/>
+              </a:ext>
+            </a:extLst>
+          </p:cNvPr>
+          <p:cNvSpPr/>
+          <p:nvPr/>
+        </p:nvSpPr>
+        <p:spPr>
+          <a:xfrm>
+            <a:off x="0" y="6233760"/>
+            <a:ext cx="12189960" cy="622080"/>
+          </a:xfrm>
+          <a:prstGeom prst="rect">
+            <a:avLst/>
+          </a:prstGeom>
+          <a:solidFill>
+            <a:srgbClr val="870F11"/>
+          </a:solidFill>
+          <a:ln>
+            <a:solidFill>
+              <a:srgbClr val="870F11"/>
+            </a:solidFill>
+          </a:ln>
+        </p:spPr>
+        <p:style>
+          <a:lnRef idx="2">
+            <a:schemeClr val="accent1">
+              <a:shade val="50000"/>
+            </a:schemeClr>
+          </a:lnRef>
+          <a:fillRef idx="1">
+            <a:schemeClr val="accent1"/>
+          </a:fillRef>
+          <a:effectRef idx="0">
+            <a:schemeClr val="accent1"/>
+          </a:effectRef>
+          <a:fontRef idx="minor"/>
+        </p:style>
+        <p:txBody>
+          <a:bodyPr/>
+          <a:lstStyle/>
+          <a:p>
+            <a:endParaRPr lang="pt-PT"/>
+          </a:p>
+        </p:txBody>
+      </p:sp>
+      <p:sp>
+        <p:nvSpPr>
+          <p:cNvPr id="58" name="CaixaDeTexto 5">
+            <a:extLst>
+              <a:ext uri="{FF2B5EF4-FFF2-40B4-BE49-F238E27FC236}">
+                <a16:creationId xmlns:a16="http://schemas.microsoft.com/office/drawing/2014/main" id="{C00BEC9D-3108-A847-7879-57D36454D915}"/>
+              </a:ext>
+            </a:extLst>
+          </p:cNvPr>
+          <p:cNvSpPr/>
+          <p:nvPr/>
+        </p:nvSpPr>
+        <p:spPr>
+          <a:xfrm>
+            <a:off x="1489680" y="1828800"/>
+            <a:ext cx="9024480" cy="829543"/>
+          </a:xfrm>
+          <a:prstGeom prst="rect">
+            <a:avLst/>
+          </a:prstGeom>
+          <a:noFill/>
+          <a:ln w="0">
+            <a:noFill/>
+          </a:ln>
+        </p:spPr>
+        <p:style>
+          <a:lnRef idx="0">
+            <a:scrgbClr r="0" g="0" b="0"/>
+          </a:lnRef>
+          <a:fillRef idx="0">
+            <a:scrgbClr r="0" g="0" b="0"/>
+          </a:fillRef>
+          <a:effectRef idx="0">
+            <a:scrgbClr r="0" g="0" b="0"/>
+          </a:effectRef>
+          <a:fontRef idx="minor"/>
+        </p:style>
+        <p:txBody>
+          <a:bodyPr vertOverflow="overflow" horzOverflow="overflow" lIns="90000" tIns="45000" rIns="90000" bIns="45000" numCol="1" spcCol="0" anchor="t">
+            <a:spAutoFit/>
+          </a:bodyPr>
+          <a:lstStyle/>
+          <a:p>
+            <a:pPr algn="ctr">
+              <a:lnSpc>
+                <a:spcPct val="100000"/>
+              </a:lnSpc>
+              <a:buNone/>
+            </a:pPr>
+            <a:endParaRPr lang="en-US" sz="2400" b="0" strike="noStrike" spc="-1" dirty="0">
+              <a:latin typeface="Arial"/>
+            </a:endParaRPr>
+          </a:p>
+          <a:p>
+            <a:pPr algn="ctr">
+              <a:lnSpc>
+                <a:spcPct val="100000"/>
+              </a:lnSpc>
+              <a:buNone/>
+            </a:pPr>
+            <a:endParaRPr lang="en-US" sz="2400" b="0" strike="noStrike" spc="-1" dirty="0">
+              <a:latin typeface="Arial"/>
+            </a:endParaRPr>
+          </a:p>
+        </p:txBody>
+      </p:sp>
+      <p:pic>
+        <p:nvPicPr>
+          <p:cNvPr id="59" name="Imagem 3">
+            <a:extLst>
+              <a:ext uri="{FF2B5EF4-FFF2-40B4-BE49-F238E27FC236}">
+                <a16:creationId xmlns:a16="http://schemas.microsoft.com/office/drawing/2014/main" id="{A1B7BE71-E39F-B03A-4078-85326E5B54EB}"/>
+              </a:ext>
+            </a:extLst>
+          </p:cNvPr>
+          <p:cNvPicPr/>
+          <p:nvPr/>
+        </p:nvPicPr>
+        <p:blipFill>
+          <a:blip r:embed="rId2"/>
+          <a:stretch/>
+        </p:blipFill>
+        <p:spPr>
+          <a:xfrm>
+            <a:off x="3240" y="6261480"/>
+            <a:ext cx="1236960" cy="709200"/>
+          </a:xfrm>
+          <a:prstGeom prst="rect">
+            <a:avLst/>
+          </a:prstGeom>
+          <a:ln w="0">
+            <a:noFill/>
+          </a:ln>
+        </p:spPr>
+      </p:pic>
+      <p:sp>
+        <p:nvSpPr>
+          <p:cNvPr id="60" name="CaixaDeTexto 1">
+            <a:extLst>
+              <a:ext uri="{FF2B5EF4-FFF2-40B4-BE49-F238E27FC236}">
+                <a16:creationId xmlns:a16="http://schemas.microsoft.com/office/drawing/2014/main" id="{7761CD0D-171C-C51D-047C-4A24E1509D82}"/>
+              </a:ext>
+            </a:extLst>
+          </p:cNvPr>
+          <p:cNvSpPr/>
+          <p:nvPr/>
+        </p:nvSpPr>
+        <p:spPr>
+          <a:xfrm>
+            <a:off x="6629400" y="6362640"/>
+            <a:ext cx="5855760" cy="337100"/>
+          </a:xfrm>
+          <a:prstGeom prst="rect">
+            <a:avLst/>
+          </a:prstGeom>
+          <a:noFill/>
+          <a:ln w="0">
+            <a:noFill/>
+          </a:ln>
+        </p:spPr>
+        <p:style>
+          <a:lnRef idx="0">
+            <a:scrgbClr r="0" g="0" b="0"/>
+          </a:lnRef>
+          <a:fillRef idx="0">
+            <a:scrgbClr r="0" g="0" b="0"/>
+          </a:fillRef>
+          <a:effectRef idx="0">
+            <a:scrgbClr r="0" g="0" b="0"/>
+          </a:effectRef>
+          <a:fontRef idx="minor"/>
+        </p:style>
+        <p:txBody>
+          <a:bodyPr vertOverflow="overflow" horzOverflow="overflow" lIns="90000" tIns="45000" rIns="90000" bIns="45000" numCol="1" spcCol="0" anchor="t">
+            <a:spAutoFit/>
+          </a:bodyPr>
+          <a:lstStyle/>
+          <a:p>
+            <a:pPr>
+              <a:lnSpc>
+                <a:spcPct val="100000"/>
+              </a:lnSpc>
+              <a:buNone/>
+            </a:pPr>
+            <a:r>
+              <a:rPr lang="pt-PT" sz="1600" b="0" strike="noStrike" spc="-1" dirty="0">
+                <a:solidFill>
+                  <a:srgbClr val="FFFFFF"/>
+                </a:solidFill>
+                <a:latin typeface="Calibri"/>
+                <a:ea typeface="DejaVu Sans"/>
+              </a:rPr>
+              <a:t>Bases de Dados – Jogos Olímpicos   |   Parte 2 - Grupo 8</a:t>
+            </a:r>
+            <a:endParaRPr lang="en-US" sz="1600" b="0" strike="noStrike" spc="-1" dirty="0">
+              <a:latin typeface="Arial"/>
+            </a:endParaRPr>
+          </a:p>
+        </p:txBody>
+      </p:sp>
+      <p:sp>
+        <p:nvSpPr>
+          <p:cNvPr id="2" name="CaixaDeTexto 1">
+            <a:extLst>
+              <a:ext uri="{FF2B5EF4-FFF2-40B4-BE49-F238E27FC236}">
+                <a16:creationId xmlns:a16="http://schemas.microsoft.com/office/drawing/2014/main" id="{D25B3F85-3D02-0621-868C-7BA1D6B66734}"/>
+              </a:ext>
+            </a:extLst>
+          </p:cNvPr>
+          <p:cNvSpPr txBox="1"/>
+          <p:nvPr/>
+        </p:nvSpPr>
+        <p:spPr>
+          <a:xfrm>
+            <a:off x="2404705" y="2658343"/>
+            <a:ext cx="7194430" cy="1889556"/>
+          </a:xfrm>
+          <a:prstGeom prst="rect">
+            <a:avLst/>
+          </a:prstGeom>
+          <a:noFill/>
+        </p:spPr>
+        <p:txBody>
+          <a:bodyPr wrap="square" rtlCol="0">
+            <a:spAutoFit/>
+          </a:bodyPr>
+          <a:lstStyle/>
+          <a:p>
+            <a:pPr algn="just">
+              <a:lnSpc>
+                <a:spcPct val="150000"/>
+              </a:lnSpc>
+            </a:pPr>
+            <a:r>
+              <a:rPr lang="pt-PT" sz="2000" dirty="0">
+                <a:latin typeface="Consolas" panose="020B0609020204030204" pitchFamily="49" charset="0"/>
+              </a:rPr>
+              <a:t>	Estes são apenas alguns dos exemplos de queries de exploração da base de dados, mas elas já são capazes de demonstrar as capacidades e das possíveis aplicações desta mesma base.</a:t>
+            </a:r>
+          </a:p>
+        </p:txBody>
+      </p:sp>
+    </p:spTree>
+    <p:extLst>
+      <p:ext uri="{BB962C8B-B14F-4D97-AF65-F5344CB8AC3E}">
+        <p14:creationId xmlns:p14="http://schemas.microsoft.com/office/powerpoint/2010/main" val="1372692518"/>
+      </p:ext>
+    </p:extLst>
+  </p:cSld>
+  <p:clrMapOvr>
+    <a:masterClrMapping/>
+  </p:clrMapOvr>
+</p:sld>
+</file>
+
+<file path=ppt/slides/slide39.xml><?xml version="1.0" encoding="utf-8"?>
+<p:sld xmlns:a="http://schemas.openxmlformats.org/drawingml/2006/main" xmlns:r="http://schemas.openxmlformats.org/officeDocument/2006/relationships" xmlns:p="http://schemas.openxmlformats.org/presentationml/2006/main" show="0">
+  <p:cSld>
+    <p:spTree>
+      <p:nvGrpSpPr>
+        <p:cNvPr id="1" name="">
+          <a:extLst>
+            <a:ext uri="{FF2B5EF4-FFF2-40B4-BE49-F238E27FC236}">
+              <a16:creationId xmlns:a16="http://schemas.microsoft.com/office/drawing/2014/main" id="{8EFE96B5-BFDE-85F6-CC2B-208B0B509FB8}"/>
+            </a:ext>
+          </a:extLst>
+        </p:cNvPr>
+        <p:cNvGrpSpPr/>
+        <p:nvPr/>
+      </p:nvGrpSpPr>
+      <p:grpSpPr>
+        <a:xfrm>
+          <a:off x="0" y="0"/>
+          <a:ext cx="0" cy="0"/>
+          <a:chOff x="0" y="0"/>
+          <a:chExt cx="0" cy="0"/>
+        </a:xfrm>
+      </p:grpSpPr>
+      <p:sp>
+        <p:nvSpPr>
+          <p:cNvPr id="56" name="PlaceHolder 1">
+            <a:extLst>
+              <a:ext uri="{FF2B5EF4-FFF2-40B4-BE49-F238E27FC236}">
+                <a16:creationId xmlns:a16="http://schemas.microsoft.com/office/drawing/2014/main" id="{E6B93583-90BC-42CF-CD09-8EDEBAA89226}"/>
+              </a:ext>
+            </a:extLst>
+          </p:cNvPr>
+          <p:cNvSpPr>
+            <a:spLocks noGrp="1"/>
+          </p:cNvSpPr>
+          <p:nvPr>
+            <p:ph type="title"/>
+          </p:nvPr>
+        </p:nvSpPr>
+        <p:spPr>
+          <a:xfrm>
+            <a:off x="1489680" y="576562"/>
+            <a:ext cx="9024480" cy="1096137"/>
+          </a:xfrm>
+          <a:prstGeom prst="rect">
+            <a:avLst/>
+          </a:prstGeom>
+          <a:noFill/>
+          <a:ln w="0">
+            <a:noFill/>
+          </a:ln>
+        </p:spPr>
+        <p:txBody>
+          <a:bodyPr lIns="0" tIns="0" rIns="0" bIns="0" anchor="b">
+            <a:noAutofit/>
+          </a:bodyPr>
+          <a:lstStyle/>
+          <a:p>
+            <a:pPr algn="ctr">
+              <a:lnSpc>
+                <a:spcPct val="90000"/>
+              </a:lnSpc>
+              <a:buNone/>
+            </a:pPr>
+            <a:r>
+              <a:rPr lang="pt-PT" sz="4000" b="0" strike="noStrike" spc="-1" dirty="0">
+                <a:solidFill>
+                  <a:srgbClr val="870F11"/>
+                </a:solidFill>
+                <a:latin typeface="Calibri"/>
+              </a:rPr>
+              <a:t>Tradução das interrogações do utilizador para SQL</a:t>
+            </a:r>
+            <a:endParaRPr lang="en-US" sz="4000" b="0" strike="noStrike" spc="-1" dirty="0">
+              <a:latin typeface="Arial"/>
+            </a:endParaRPr>
+          </a:p>
+        </p:txBody>
+      </p:sp>
+      <p:sp>
+        <p:nvSpPr>
+          <p:cNvPr id="57" name="Retângulo 4">
+            <a:extLst>
+              <a:ext uri="{FF2B5EF4-FFF2-40B4-BE49-F238E27FC236}">
+                <a16:creationId xmlns:a16="http://schemas.microsoft.com/office/drawing/2014/main" id="{C2879FD4-6C58-C78F-CDC2-3F5994F5F602}"/>
+              </a:ext>
+            </a:extLst>
+          </p:cNvPr>
+          <p:cNvSpPr/>
+          <p:nvPr/>
+        </p:nvSpPr>
+        <p:spPr>
+          <a:xfrm>
+            <a:off x="0" y="6233760"/>
+            <a:ext cx="12189960" cy="622080"/>
+          </a:xfrm>
+          <a:prstGeom prst="rect">
+            <a:avLst/>
+          </a:prstGeom>
+          <a:solidFill>
+            <a:srgbClr val="870F11"/>
+          </a:solidFill>
+          <a:ln>
+            <a:solidFill>
+              <a:srgbClr val="870F11"/>
+            </a:solidFill>
+          </a:ln>
+        </p:spPr>
+        <p:style>
+          <a:lnRef idx="2">
+            <a:schemeClr val="accent1">
+              <a:shade val="50000"/>
+            </a:schemeClr>
+          </a:lnRef>
+          <a:fillRef idx="1">
+            <a:schemeClr val="accent1"/>
+          </a:fillRef>
+          <a:effectRef idx="0">
+            <a:schemeClr val="accent1"/>
+          </a:effectRef>
+          <a:fontRef idx="minor"/>
+        </p:style>
+        <p:txBody>
+          <a:bodyPr/>
+          <a:lstStyle/>
+          <a:p>
+            <a:endParaRPr lang="pt-PT"/>
+          </a:p>
+        </p:txBody>
+      </p:sp>
+      <p:sp>
+        <p:nvSpPr>
+          <p:cNvPr id="58" name="CaixaDeTexto 5">
+            <a:extLst>
+              <a:ext uri="{FF2B5EF4-FFF2-40B4-BE49-F238E27FC236}">
+                <a16:creationId xmlns:a16="http://schemas.microsoft.com/office/drawing/2014/main" id="{61203661-EDB4-DF42-5A41-22E2EA24C5CA}"/>
+              </a:ext>
+            </a:extLst>
+          </p:cNvPr>
+          <p:cNvSpPr/>
+          <p:nvPr/>
+        </p:nvSpPr>
+        <p:spPr>
+          <a:xfrm>
+            <a:off x="1489680" y="1828800"/>
+            <a:ext cx="9024480" cy="829543"/>
+          </a:xfrm>
+          <a:prstGeom prst="rect">
+            <a:avLst/>
+          </a:prstGeom>
+          <a:noFill/>
+          <a:ln w="0">
+            <a:noFill/>
+          </a:ln>
+        </p:spPr>
+        <p:style>
+          <a:lnRef idx="0">
+            <a:scrgbClr r="0" g="0" b="0"/>
+          </a:lnRef>
+          <a:fillRef idx="0">
+            <a:scrgbClr r="0" g="0" b="0"/>
+          </a:fillRef>
+          <a:effectRef idx="0">
+            <a:scrgbClr r="0" g="0" b="0"/>
+          </a:effectRef>
+          <a:fontRef idx="minor"/>
+        </p:style>
+        <p:txBody>
+          <a:bodyPr vertOverflow="overflow" horzOverflow="overflow" lIns="90000" tIns="45000" rIns="90000" bIns="45000" numCol="1" spcCol="0" anchor="t">
+            <a:spAutoFit/>
+          </a:bodyPr>
+          <a:lstStyle/>
+          <a:p>
+            <a:pPr algn="ctr">
+              <a:lnSpc>
+                <a:spcPct val="100000"/>
+              </a:lnSpc>
+              <a:buNone/>
+            </a:pPr>
+            <a:endParaRPr lang="en-US" sz="2400" b="0" strike="noStrike" spc="-1" dirty="0">
+              <a:latin typeface="Arial"/>
+            </a:endParaRPr>
+          </a:p>
+          <a:p>
+            <a:pPr algn="ctr">
+              <a:lnSpc>
+                <a:spcPct val="100000"/>
+              </a:lnSpc>
+              <a:buNone/>
+            </a:pPr>
+            <a:endParaRPr lang="en-US" sz="2400" b="0" strike="noStrike" spc="-1" dirty="0">
+              <a:latin typeface="Arial"/>
+            </a:endParaRPr>
+          </a:p>
+        </p:txBody>
+      </p:sp>
+      <p:pic>
+        <p:nvPicPr>
+          <p:cNvPr id="59" name="Imagem 3">
+            <a:extLst>
+              <a:ext uri="{FF2B5EF4-FFF2-40B4-BE49-F238E27FC236}">
+                <a16:creationId xmlns:a16="http://schemas.microsoft.com/office/drawing/2014/main" id="{88A9571C-296F-58F0-0035-BD776466C981}"/>
+              </a:ext>
+            </a:extLst>
+          </p:cNvPr>
+          <p:cNvPicPr/>
+          <p:nvPr/>
+        </p:nvPicPr>
+        <p:blipFill>
+          <a:blip r:embed="rId2"/>
+          <a:stretch/>
+        </p:blipFill>
+        <p:spPr>
+          <a:xfrm>
+            <a:off x="3240" y="6261480"/>
+            <a:ext cx="1236960" cy="709200"/>
+          </a:xfrm>
+          <a:prstGeom prst="rect">
+            <a:avLst/>
+          </a:prstGeom>
+          <a:ln w="0">
+            <a:noFill/>
+          </a:ln>
+        </p:spPr>
+      </p:pic>
+      <p:sp>
+        <p:nvSpPr>
+          <p:cNvPr id="60" name="CaixaDeTexto 1">
+            <a:extLst>
+              <a:ext uri="{FF2B5EF4-FFF2-40B4-BE49-F238E27FC236}">
+                <a16:creationId xmlns:a16="http://schemas.microsoft.com/office/drawing/2014/main" id="{3B223991-32BB-19FC-7139-44C2DDF49104}"/>
+              </a:ext>
+            </a:extLst>
+          </p:cNvPr>
+          <p:cNvSpPr/>
+          <p:nvPr/>
+        </p:nvSpPr>
+        <p:spPr>
+          <a:xfrm>
+            <a:off x="6629400" y="6362640"/>
+            <a:ext cx="5855760" cy="337100"/>
+          </a:xfrm>
+          <a:prstGeom prst="rect">
+            <a:avLst/>
+          </a:prstGeom>
+          <a:noFill/>
+          <a:ln w="0">
+            <a:noFill/>
+          </a:ln>
+        </p:spPr>
+        <p:style>
+          <a:lnRef idx="0">
+            <a:scrgbClr r="0" g="0" b="0"/>
+          </a:lnRef>
+          <a:fillRef idx="0">
+            <a:scrgbClr r="0" g="0" b="0"/>
+          </a:fillRef>
+          <a:effectRef idx="0">
+            <a:scrgbClr r="0" g="0" b="0"/>
+          </a:effectRef>
+          <a:fontRef idx="minor"/>
+        </p:style>
+        <p:txBody>
+          <a:bodyPr vertOverflow="overflow" horzOverflow="overflow" lIns="90000" tIns="45000" rIns="90000" bIns="45000" numCol="1" spcCol="0" anchor="t">
+            <a:spAutoFit/>
+          </a:bodyPr>
+          <a:lstStyle/>
+          <a:p>
+            <a:pPr>
+              <a:lnSpc>
+                <a:spcPct val="100000"/>
+              </a:lnSpc>
+              <a:buNone/>
+            </a:pPr>
+            <a:r>
+              <a:rPr lang="pt-PT" sz="1600" b="0" strike="noStrike" spc="-1" dirty="0">
+                <a:solidFill>
+                  <a:srgbClr val="FFFFFF"/>
+                </a:solidFill>
+                <a:latin typeface="Calibri"/>
+                <a:ea typeface="DejaVu Sans"/>
+              </a:rPr>
+              <a:t>Bases de Dados – Jogos Olímpicos   |   Parte 2 - Grupo 8</a:t>
+            </a:r>
+            <a:endParaRPr lang="en-US" sz="1600" b="0" strike="noStrike" spc="-1" dirty="0">
+              <a:latin typeface="Arial"/>
+            </a:endParaRPr>
+          </a:p>
+        </p:txBody>
+      </p:sp>
+    </p:spTree>
+    <p:extLst>
+      <p:ext uri="{BB962C8B-B14F-4D97-AF65-F5344CB8AC3E}">
+        <p14:creationId xmlns:p14="http://schemas.microsoft.com/office/powerpoint/2010/main" val="1698634826"/>
       </p:ext>
     </p:extLst>
   </p:cSld>
@@ -17371,6 +19229,332 @@
         </p:txBody>
       </p:sp>
     </p:spTree>
+  </p:cSld>
+  <p:clrMapOvr>
+    <a:masterClrMapping/>
+  </p:clrMapOvr>
+</p:sld>
+</file>
+
+<file path=ppt/slides/slide40.xml><?xml version="1.0" encoding="utf-8"?>
+<p:sld xmlns:a="http://schemas.openxmlformats.org/drawingml/2006/main" xmlns:r="http://schemas.openxmlformats.org/officeDocument/2006/relationships" xmlns:p="http://schemas.openxmlformats.org/presentationml/2006/main" show="0">
+  <p:cSld>
+    <p:spTree>
+      <p:nvGrpSpPr>
+        <p:cNvPr id="1" name="">
+          <a:extLst>
+            <a:ext uri="{FF2B5EF4-FFF2-40B4-BE49-F238E27FC236}">
+              <a16:creationId xmlns:a16="http://schemas.microsoft.com/office/drawing/2014/main" id="{8EA051DF-9370-6E1F-A966-FCFFF3AFAA4E}"/>
+            </a:ext>
+          </a:extLst>
+        </p:cNvPr>
+        <p:cNvGrpSpPr/>
+        <p:nvPr/>
+      </p:nvGrpSpPr>
+      <p:grpSpPr>
+        <a:xfrm>
+          <a:off x="0" y="0"/>
+          <a:ext cx="0" cy="0"/>
+          <a:chOff x="0" y="0"/>
+          <a:chExt cx="0" cy="0"/>
+        </a:xfrm>
+      </p:grpSpPr>
+      <p:sp>
+        <p:nvSpPr>
+          <p:cNvPr id="51" name="PlaceHolder 1">
+            <a:extLst>
+              <a:ext uri="{FF2B5EF4-FFF2-40B4-BE49-F238E27FC236}">
+                <a16:creationId xmlns:a16="http://schemas.microsoft.com/office/drawing/2014/main" id="{F5167765-DEF6-8118-1BA0-EACD0A05728A}"/>
+              </a:ext>
+            </a:extLst>
+          </p:cNvPr>
+          <p:cNvSpPr>
+            <a:spLocks noGrp="1"/>
+          </p:cNvSpPr>
+          <p:nvPr>
+            <p:ph type="title"/>
+          </p:nvPr>
+        </p:nvSpPr>
+        <p:spPr>
+          <a:xfrm>
+            <a:off x="1525680" y="275040"/>
+            <a:ext cx="9141840" cy="1153080"/>
+          </a:xfrm>
+          <a:prstGeom prst="rect">
+            <a:avLst/>
+          </a:prstGeom>
+          <a:noFill/>
+          <a:ln w="0">
+            <a:noFill/>
+          </a:ln>
+        </p:spPr>
+        <p:txBody>
+          <a:bodyPr lIns="0" tIns="0" rIns="0" bIns="0" anchor="b">
+            <a:noAutofit/>
+          </a:bodyPr>
+          <a:lstStyle/>
+          <a:p>
+            <a:pPr algn="ctr">
+              <a:lnSpc>
+                <a:spcPct val="90000"/>
+              </a:lnSpc>
+              <a:buNone/>
+            </a:pPr>
+            <a:r>
+              <a:rPr lang="pt-PT" sz="4400" b="0" u="sng" strike="noStrike" spc="-1" dirty="0">
+                <a:solidFill>
+                  <a:srgbClr val="870F11"/>
+                </a:solidFill>
+                <a:uFillTx/>
+                <a:latin typeface="Calibri"/>
+              </a:rPr>
+              <a:t>Conclusão e Trabalho Futuro</a:t>
+            </a:r>
+            <a:endParaRPr lang="en-US" sz="4400" b="0" strike="noStrike" spc="-1" dirty="0">
+              <a:latin typeface="Arial"/>
+            </a:endParaRPr>
+          </a:p>
+        </p:txBody>
+      </p:sp>
+      <p:sp>
+        <p:nvSpPr>
+          <p:cNvPr id="52" name="Retângulo 4">
+            <a:extLst>
+              <a:ext uri="{FF2B5EF4-FFF2-40B4-BE49-F238E27FC236}">
+                <a16:creationId xmlns:a16="http://schemas.microsoft.com/office/drawing/2014/main" id="{69301A0B-E77F-3789-C9E4-6579746AE1F2}"/>
+              </a:ext>
+            </a:extLst>
+          </p:cNvPr>
+          <p:cNvSpPr/>
+          <p:nvPr/>
+        </p:nvSpPr>
+        <p:spPr>
+          <a:xfrm>
+            <a:off x="0" y="6233760"/>
+            <a:ext cx="12189960" cy="622080"/>
+          </a:xfrm>
+          <a:prstGeom prst="rect">
+            <a:avLst/>
+          </a:prstGeom>
+          <a:solidFill>
+            <a:srgbClr val="870F11"/>
+          </a:solidFill>
+          <a:ln>
+            <a:solidFill>
+              <a:srgbClr val="870F11"/>
+            </a:solidFill>
+          </a:ln>
+        </p:spPr>
+        <p:style>
+          <a:lnRef idx="2">
+            <a:schemeClr val="accent1">
+              <a:shade val="50000"/>
+            </a:schemeClr>
+          </a:lnRef>
+          <a:fillRef idx="1">
+            <a:schemeClr val="accent1"/>
+          </a:fillRef>
+          <a:effectRef idx="0">
+            <a:schemeClr val="accent1"/>
+          </a:effectRef>
+          <a:fontRef idx="minor"/>
+        </p:style>
+        <p:txBody>
+          <a:bodyPr/>
+          <a:lstStyle/>
+          <a:p>
+            <a:endParaRPr lang="pt-PT"/>
+          </a:p>
+        </p:txBody>
+      </p:sp>
+      <p:sp>
+        <p:nvSpPr>
+          <p:cNvPr id="53" name="CaixaDeTexto 5">
+            <a:extLst>
+              <a:ext uri="{FF2B5EF4-FFF2-40B4-BE49-F238E27FC236}">
+                <a16:creationId xmlns:a16="http://schemas.microsoft.com/office/drawing/2014/main" id="{9627A777-B39B-0638-8DF6-212D4B3F7B50}"/>
+              </a:ext>
+            </a:extLst>
+          </p:cNvPr>
+          <p:cNvSpPr/>
+          <p:nvPr/>
+        </p:nvSpPr>
+        <p:spPr>
+          <a:xfrm>
+            <a:off x="1814400" y="1845720"/>
+            <a:ext cx="6792840" cy="1598984"/>
+          </a:xfrm>
+          <a:prstGeom prst="rect">
+            <a:avLst/>
+          </a:prstGeom>
+          <a:noFill/>
+          <a:ln w="0">
+            <a:noFill/>
+          </a:ln>
+        </p:spPr>
+        <p:style>
+          <a:lnRef idx="0">
+            <a:scrgbClr r="0" g="0" b="0"/>
+          </a:lnRef>
+          <a:fillRef idx="0">
+            <a:scrgbClr r="0" g="0" b="0"/>
+          </a:fillRef>
+          <a:effectRef idx="0">
+            <a:scrgbClr r="0" g="0" b="0"/>
+          </a:effectRef>
+          <a:fontRef idx="minor"/>
+        </p:style>
+        <p:txBody>
+          <a:bodyPr vertOverflow="overflow" horzOverflow="overflow" lIns="90000" tIns="45000" rIns="90000" bIns="45000" numCol="1" spcCol="0" anchor="t">
+            <a:spAutoFit/>
+          </a:bodyPr>
+          <a:lstStyle/>
+          <a:p>
+            <a:pPr>
+              <a:lnSpc>
+                <a:spcPct val="150000"/>
+              </a:lnSpc>
+              <a:buNone/>
+            </a:pPr>
+            <a:endParaRPr lang="en-US" sz="2000" b="0" strike="noStrike" spc="-1" dirty="0">
+              <a:latin typeface="Arial"/>
+            </a:endParaRPr>
+          </a:p>
+          <a:p>
+            <a:pPr>
+              <a:lnSpc>
+                <a:spcPct val="100000"/>
+              </a:lnSpc>
+              <a:buNone/>
+            </a:pPr>
+            <a:endParaRPr lang="en-US" sz="2000" b="0" strike="noStrike" spc="-1" dirty="0">
+              <a:latin typeface="Arial"/>
+            </a:endParaRPr>
+          </a:p>
+          <a:p>
+            <a:pPr algn="ctr">
+              <a:lnSpc>
+                <a:spcPct val="100000"/>
+              </a:lnSpc>
+              <a:buNone/>
+            </a:pPr>
+            <a:endParaRPr lang="en-US" sz="2400" b="0" strike="noStrike" spc="-1" dirty="0">
+              <a:latin typeface="Arial"/>
+            </a:endParaRPr>
+          </a:p>
+          <a:p>
+            <a:pPr algn="ctr">
+              <a:lnSpc>
+                <a:spcPct val="100000"/>
+              </a:lnSpc>
+              <a:buNone/>
+            </a:pPr>
+            <a:endParaRPr lang="en-US" sz="2400" b="0" strike="noStrike" spc="-1" dirty="0">
+              <a:latin typeface="Arial"/>
+            </a:endParaRPr>
+          </a:p>
+        </p:txBody>
+      </p:sp>
+      <p:pic>
+        <p:nvPicPr>
+          <p:cNvPr id="54" name="Imagem 3">
+            <a:extLst>
+              <a:ext uri="{FF2B5EF4-FFF2-40B4-BE49-F238E27FC236}">
+                <a16:creationId xmlns:a16="http://schemas.microsoft.com/office/drawing/2014/main" id="{6E7FEA2B-DBA8-4F6D-6745-525908B5D127}"/>
+              </a:ext>
+            </a:extLst>
+          </p:cNvPr>
+          <p:cNvPicPr/>
+          <p:nvPr/>
+        </p:nvPicPr>
+        <p:blipFill>
+          <a:blip r:embed="rId2"/>
+          <a:stretch/>
+        </p:blipFill>
+        <p:spPr>
+          <a:xfrm>
+            <a:off x="3240" y="6261480"/>
+            <a:ext cx="1236960" cy="709200"/>
+          </a:xfrm>
+          <a:prstGeom prst="rect">
+            <a:avLst/>
+          </a:prstGeom>
+          <a:ln w="0">
+            <a:noFill/>
+          </a:ln>
+        </p:spPr>
+      </p:pic>
+      <p:sp>
+        <p:nvSpPr>
+          <p:cNvPr id="55" name="CaixaDeTexto 3">
+            <a:extLst>
+              <a:ext uri="{FF2B5EF4-FFF2-40B4-BE49-F238E27FC236}">
+                <a16:creationId xmlns:a16="http://schemas.microsoft.com/office/drawing/2014/main" id="{BF610D12-74BC-50E5-A694-277F36CC9E56}"/>
+              </a:ext>
+            </a:extLst>
+          </p:cNvPr>
+          <p:cNvSpPr/>
+          <p:nvPr/>
+        </p:nvSpPr>
+        <p:spPr>
+          <a:xfrm>
+            <a:off x="6629400" y="6362640"/>
+            <a:ext cx="5855760" cy="337100"/>
+          </a:xfrm>
+          <a:prstGeom prst="rect">
+            <a:avLst/>
+          </a:prstGeom>
+          <a:noFill/>
+          <a:ln w="0">
+            <a:noFill/>
+          </a:ln>
+        </p:spPr>
+        <p:style>
+          <a:lnRef idx="0">
+            <a:scrgbClr r="0" g="0" b="0"/>
+          </a:lnRef>
+          <a:fillRef idx="0">
+            <a:scrgbClr r="0" g="0" b="0"/>
+          </a:fillRef>
+          <a:effectRef idx="0">
+            <a:scrgbClr r="0" g="0" b="0"/>
+          </a:effectRef>
+          <a:fontRef idx="minor"/>
+        </p:style>
+        <p:txBody>
+          <a:bodyPr vertOverflow="overflow" horzOverflow="overflow" lIns="90000" tIns="45000" rIns="90000" bIns="45000" numCol="1" spcCol="0" anchor="t">
+            <a:spAutoFit/>
+          </a:bodyPr>
+          <a:lstStyle/>
+          <a:p>
+            <a:pPr>
+              <a:lnSpc>
+                <a:spcPct val="100000"/>
+              </a:lnSpc>
+              <a:buNone/>
+            </a:pPr>
+            <a:r>
+              <a:rPr lang="pt-PT" sz="1600" b="0" strike="noStrike" spc="-1" dirty="0">
+                <a:solidFill>
+                  <a:srgbClr val="FFFFFF"/>
+                </a:solidFill>
+                <a:latin typeface="Calibri"/>
+                <a:ea typeface="DejaVu Sans"/>
+              </a:rPr>
+              <a:t>Bases de Dados – Jogos Olímpicos   |   Parte 2 - Grupo 8</a:t>
+            </a:r>
+            <a:endParaRPr lang="en-US" sz="1600" b="0" strike="noStrike" spc="-1" dirty="0">
+              <a:latin typeface="Arial"/>
+            </a:endParaRPr>
+          </a:p>
+        </p:txBody>
+      </p:sp>
+    </p:spTree>
+    <p:extLst>
+      <p:ext uri="{BB962C8B-B14F-4D97-AF65-F5344CB8AC3E}">
+        <p14:creationId xmlns:p14="http://schemas.microsoft.com/office/powerpoint/2010/main" val="106293796"/>
+      </p:ext>
+    </p:extLst>
   </p:cSld>
   <p:clrMapOvr>
     <a:masterClrMapping/>

</xml_diff>